<commit_message>
removed logo from presentation
</commit_message>
<xml_diff>
--- a/KPZ_demo_prezentacja.pptx
+++ b/KPZ_demo_prezentacja.pptx
@@ -142,7 +142,7 @@
   </p:defaultTextStyle>
   <p:extLst>
     <p:ext uri="{EFAFB233-063F-42B5-8137-9DF3F51BA10A}">
-      <p15:sldGuideLst xmlns:p15="http://schemas.microsoft.com/office/powerpoint/2012/main" xmlns="">
+      <p15:sldGuideLst xmlns:p15="http://schemas.microsoft.com/office/powerpoint/2012/main">
         <p15:guide id="1" orient="horz" pos="2160">
           <p15:clr>
             <a:srgbClr val="A4A3A4"/>
@@ -181,7 +181,7 @@
           <p:cNvPr id="5" name="Rectangle 3">
             <a:extLst>
               <a:ext uri="{FF2B5EF4-FFF2-40B4-BE49-F238E27FC236}">
-                <a16:creationId xmlns:a16="http://schemas.microsoft.com/office/drawing/2014/main" xmlns="" id="{CA5B9C77-D4D3-441E-BB9B-5E2F7761E137}"/>
+                <a16:creationId xmlns:a16="http://schemas.microsoft.com/office/drawing/2014/main" id="{CA5B9C77-D4D3-441E-BB9B-5E2F7761E137}"/>
               </a:ext>
             </a:extLst>
           </p:cNvPr>
@@ -232,7 +232,7 @@
           <p:cNvPr id="7" name="TextBox 9">
             <a:extLst>
               <a:ext uri="{FF2B5EF4-FFF2-40B4-BE49-F238E27FC236}">
-                <a16:creationId xmlns:a16="http://schemas.microsoft.com/office/drawing/2014/main" xmlns="" id="{DD99C688-3F4E-490B-9932-45C391BF8A34}"/>
+                <a16:creationId xmlns:a16="http://schemas.microsoft.com/office/drawing/2014/main" id="{DD99C688-3F4E-490B-9932-45C391BF8A34}"/>
               </a:ext>
             </a:extLst>
           </p:cNvPr>
@@ -372,7 +372,7 @@
                   <a:schemeClr val="tx2"/>
                 </a:solidFill>
               </a:rPr>
-              <a:t>/10</a:t>
+              <a:t>/7</a:t>
             </a:r>
           </a:p>
         </p:txBody>
@@ -458,7 +458,7 @@
           <p:cNvPr id="8" name="Rectangle 3">
             <a:extLst>
               <a:ext uri="{FF2B5EF4-FFF2-40B4-BE49-F238E27FC236}">
-                <a16:creationId xmlns:a16="http://schemas.microsoft.com/office/drawing/2014/main" xmlns="" id="{D2E113B1-2917-400B-B4AD-1ECA90971DDB}"/>
+                <a16:creationId xmlns:a16="http://schemas.microsoft.com/office/drawing/2014/main" id="{D2E113B1-2917-400B-B4AD-1ECA90971DDB}"/>
               </a:ext>
             </a:extLst>
           </p:cNvPr>
@@ -505,7 +505,7 @@
           <p:cNvPr id="3" name="Obraz 2">
             <a:extLst>
               <a:ext uri="{FF2B5EF4-FFF2-40B4-BE49-F238E27FC236}">
-                <a16:creationId xmlns:a16="http://schemas.microsoft.com/office/drawing/2014/main" xmlns="" id="{42396A27-F493-4DD9-AE67-6CF420624B5A}"/>
+                <a16:creationId xmlns:a16="http://schemas.microsoft.com/office/drawing/2014/main" id="{42396A27-F493-4DD9-AE67-6CF420624B5A}"/>
               </a:ext>
             </a:extLst>
           </p:cNvPr>
@@ -518,7 +518,7 @@
           <a:blip r:embed="rId2">
             <a:extLst>
               <a:ext uri="{28A0092B-C50C-407E-A947-70E740481C1C}">
-                <a14:useLocalDpi xmlns:a14="http://schemas.microsoft.com/office/drawing/2010/main" xmlns="" val="0"/>
+                <a14:useLocalDpi xmlns:a14="http://schemas.microsoft.com/office/drawing/2010/main" val="0"/>
               </a:ext>
             </a:extLst>
           </a:blip>
@@ -536,69 +536,10 @@
           </a:prstGeom>
         </p:spPr>
       </p:pic>
-      <p:sp>
-        <p:nvSpPr>
-          <p:cNvPr id="12" name="Prostokąt 11">
-            <a:extLst>
-              <a:ext uri="{FF2B5EF4-FFF2-40B4-BE49-F238E27FC236}">
-                <a16:creationId xmlns:a16="http://schemas.microsoft.com/office/drawing/2014/main" xmlns="" id="{2C8FC13A-64CB-4BD3-9EAF-40D9E92CDEA0}"/>
-              </a:ext>
-            </a:extLst>
-          </p:cNvPr>
-          <p:cNvSpPr/>
-          <p:nvPr/>
-        </p:nvSpPr>
-        <p:spPr>
-          <a:xfrm>
-            <a:off x="179764" y="601376"/>
-            <a:ext cx="1326197" cy="371320"/>
-          </a:xfrm>
-          <a:prstGeom prst="rect">
-            <a:avLst/>
-          </a:prstGeom>
-        </p:spPr>
-        <p:txBody>
-          <a:bodyPr wrap="none">
-            <a:spAutoFit/>
-          </a:bodyPr>
-          <a:lstStyle/>
-          <a:p>
-            <a:pPr>
-              <a:lnSpc>
-                <a:spcPct val="107000"/>
-              </a:lnSpc>
-              <a:spcAft>
-                <a:spcPts val="800"/>
-              </a:spcAft>
-            </a:pPr>
-            <a:r>
-              <a:rPr lang="pl-PL" sz="1800" dirty="0">
-                <a:solidFill>
-                  <a:schemeClr val="bg1"/>
-                </a:solidFill>
-                <a:effectLst/>
-                <a:latin typeface="NokiaKokia" panose="020B0500000000000000" pitchFamily="34" charset="0"/>
-                <a:ea typeface="Calibri" panose="020F0502020204030204" pitchFamily="34" charset="0"/>
-                <a:cs typeface="Times New Roman" panose="02020603050405020304" pitchFamily="18" charset="0"/>
-              </a:rPr>
-              <a:t>NOKIA</a:t>
-            </a:r>
-            <a:endParaRPr lang="pl-PL" sz="1800" dirty="0">
-              <a:solidFill>
-                <a:schemeClr val="bg1"/>
-              </a:solidFill>
-              <a:effectLst/>
-              <a:latin typeface="Calibri" panose="020F0502020204030204" pitchFamily="34" charset="0"/>
-              <a:ea typeface="Calibri" panose="020F0502020204030204" pitchFamily="34" charset="0"/>
-              <a:cs typeface="Times New Roman" panose="02020603050405020304" pitchFamily="18" charset="0"/>
-            </a:endParaRPr>
-          </a:p>
-        </p:txBody>
-      </p:sp>
     </p:spTree>
     <p:extLst>
       <p:ext uri="{BB962C8B-B14F-4D97-AF65-F5344CB8AC3E}">
-        <p14:creationId xmlns:p14="http://schemas.microsoft.com/office/powerpoint/2010/main" xmlns="" val="1784064873"/>
+        <p14:creationId xmlns:p14="http://schemas.microsoft.com/office/powerpoint/2010/main" val="1784064873"/>
       </p:ext>
     </p:extLst>
   </p:cSld>
@@ -705,7 +646,7 @@
     </p:spTree>
     <p:extLst>
       <p:ext uri="{BB962C8B-B14F-4D97-AF65-F5344CB8AC3E}">
-        <p14:creationId xmlns:p14="http://schemas.microsoft.com/office/powerpoint/2010/main" xmlns="" val="1718259841"/>
+        <p14:creationId xmlns:p14="http://schemas.microsoft.com/office/powerpoint/2010/main" val="1718259841"/>
       </p:ext>
     </p:extLst>
   </p:cSld>
@@ -821,7 +762,7 @@
     </p:spTree>
     <p:extLst>
       <p:ext uri="{BB962C8B-B14F-4D97-AF65-F5344CB8AC3E}">
-        <p14:creationId xmlns:p14="http://schemas.microsoft.com/office/powerpoint/2010/main" xmlns="" val="3627402816"/>
+        <p14:creationId xmlns:p14="http://schemas.microsoft.com/office/powerpoint/2010/main" val="3627402816"/>
       </p:ext>
     </p:extLst>
   </p:cSld>
@@ -856,7 +797,7 @@
           <p:cNvPr id="4" name="TextBox 5">
             <a:extLst>
               <a:ext uri="{FF2B5EF4-FFF2-40B4-BE49-F238E27FC236}">
-                <a16:creationId xmlns:a16="http://schemas.microsoft.com/office/drawing/2014/main" xmlns="" id="{DFE9BCC0-C79F-40AF-90D2-64E61EFBEAE7}"/>
+                <a16:creationId xmlns:a16="http://schemas.microsoft.com/office/drawing/2014/main" id="{DFE9BCC0-C79F-40AF-90D2-64E61EFBEAE7}"/>
               </a:ext>
             </a:extLst>
           </p:cNvPr>
@@ -988,7 +929,7 @@
             </a:fld>
             <a:r>
               <a:rPr lang="pl-PL" altLang="pl-PL" sz="1400" dirty="0"/>
-              <a:t>/10</a:t>
+              <a:t>/7</a:t>
             </a:r>
           </a:p>
         </p:txBody>
@@ -1071,10 +1012,46 @@
           </a:p>
         </p:txBody>
       </p:sp>
+      <p:pic>
+        <p:nvPicPr>
+          <p:cNvPr id="5" name="Obraz 4">
+            <a:extLst>
+              <a:ext uri="{FF2B5EF4-FFF2-40B4-BE49-F238E27FC236}">
+                <a16:creationId xmlns:a16="http://schemas.microsoft.com/office/drawing/2014/main" id="{E718F432-C3B3-473A-BF3F-43BE196B4943}"/>
+              </a:ext>
+            </a:extLst>
+          </p:cNvPr>
+          <p:cNvPicPr>
+            <a:picLocks noChangeAspect="1"/>
+          </p:cNvPicPr>
+          <p:nvPr userDrawn="1"/>
+        </p:nvPicPr>
+        <p:blipFill>
+          <a:blip r:embed="rId2">
+            <a:extLst>
+              <a:ext uri="{28A0092B-C50C-407E-A947-70E740481C1C}">
+                <a14:useLocalDpi xmlns:a14="http://schemas.microsoft.com/office/drawing/2010/main" val="0"/>
+              </a:ext>
+            </a:extLst>
+          </a:blip>
+          <a:stretch>
+            <a:fillRect/>
+          </a:stretch>
+        </p:blipFill>
+        <p:spPr>
+          <a:xfrm>
+            <a:off x="568630" y="10832"/>
+            <a:ext cx="740224" cy="433031"/>
+          </a:xfrm>
+          <a:prstGeom prst="rect">
+            <a:avLst/>
+          </a:prstGeom>
+        </p:spPr>
+      </p:pic>
     </p:spTree>
     <p:extLst>
       <p:ext uri="{BB962C8B-B14F-4D97-AF65-F5344CB8AC3E}">
-        <p14:creationId xmlns:p14="http://schemas.microsoft.com/office/powerpoint/2010/main" xmlns="" val="3750990269"/>
+        <p14:creationId xmlns:p14="http://schemas.microsoft.com/office/powerpoint/2010/main" val="3750990269"/>
       </p:ext>
     </p:extLst>
   </p:cSld>
@@ -1203,7 +1180,7 @@
     </p:spTree>
     <p:extLst>
       <p:ext uri="{BB962C8B-B14F-4D97-AF65-F5344CB8AC3E}">
-        <p14:creationId xmlns:p14="http://schemas.microsoft.com/office/powerpoint/2010/main" xmlns="" val="4259682770"/>
+        <p14:creationId xmlns:p14="http://schemas.microsoft.com/office/powerpoint/2010/main" val="4259682770"/>
       </p:ext>
     </p:extLst>
   </p:cSld>
@@ -1426,7 +1403,7 @@
     </p:spTree>
     <p:extLst>
       <p:ext uri="{BB962C8B-B14F-4D97-AF65-F5344CB8AC3E}">
-        <p14:creationId xmlns:p14="http://schemas.microsoft.com/office/powerpoint/2010/main" xmlns="" val="2681908981"/>
+        <p14:creationId xmlns:p14="http://schemas.microsoft.com/office/powerpoint/2010/main" val="2681908981"/>
       </p:ext>
     </p:extLst>
   </p:cSld>
@@ -1788,7 +1765,7 @@
     </p:spTree>
     <p:extLst>
       <p:ext uri="{BB962C8B-B14F-4D97-AF65-F5344CB8AC3E}">
-        <p14:creationId xmlns:p14="http://schemas.microsoft.com/office/powerpoint/2010/main" xmlns="" val="2962412355"/>
+        <p14:creationId xmlns:p14="http://schemas.microsoft.com/office/powerpoint/2010/main" val="2962412355"/>
       </p:ext>
     </p:extLst>
   </p:cSld>
@@ -1843,7 +1820,7 @@
     </p:spTree>
     <p:extLst>
       <p:ext uri="{BB962C8B-B14F-4D97-AF65-F5344CB8AC3E}">
-        <p14:creationId xmlns:p14="http://schemas.microsoft.com/office/powerpoint/2010/main" xmlns="" val="422807088"/>
+        <p14:creationId xmlns:p14="http://schemas.microsoft.com/office/powerpoint/2010/main" val="422807088"/>
       </p:ext>
     </p:extLst>
   </p:cSld>
@@ -1876,7 +1853,7 @@
     </p:spTree>
     <p:extLst>
       <p:ext uri="{BB962C8B-B14F-4D97-AF65-F5344CB8AC3E}">
-        <p14:creationId xmlns:p14="http://schemas.microsoft.com/office/powerpoint/2010/main" xmlns="" val="2404759365"/>
+        <p14:creationId xmlns:p14="http://schemas.microsoft.com/office/powerpoint/2010/main" val="2404759365"/>
       </p:ext>
     </p:extLst>
   </p:cSld>
@@ -2089,7 +2066,7 @@
     </p:spTree>
     <p:extLst>
       <p:ext uri="{BB962C8B-B14F-4D97-AF65-F5344CB8AC3E}">
-        <p14:creationId xmlns:p14="http://schemas.microsoft.com/office/powerpoint/2010/main" xmlns="" val="2482575914"/>
+        <p14:creationId xmlns:p14="http://schemas.microsoft.com/office/powerpoint/2010/main" val="2482575914"/>
       </p:ext>
     </p:extLst>
   </p:cSld>
@@ -2283,7 +2260,7 @@
     </p:spTree>
     <p:extLst>
       <p:ext uri="{BB962C8B-B14F-4D97-AF65-F5344CB8AC3E}">
-        <p14:creationId xmlns:p14="http://schemas.microsoft.com/office/powerpoint/2010/main" xmlns="" val="2716895199"/>
+        <p14:creationId xmlns:p14="http://schemas.microsoft.com/office/powerpoint/2010/main" val="2716895199"/>
       </p:ext>
     </p:extLst>
   </p:cSld>
@@ -2326,7 +2303,7 @@
           <p:cNvPr id="9226" name="Rectangle 10">
             <a:extLst>
               <a:ext uri="{FF2B5EF4-FFF2-40B4-BE49-F238E27FC236}">
-                <a16:creationId xmlns:a16="http://schemas.microsoft.com/office/drawing/2014/main" xmlns="" id="{F5120B57-D8A3-4286-AE3F-64C5886BAD80}"/>
+                <a16:creationId xmlns:a16="http://schemas.microsoft.com/office/drawing/2014/main" id="{F5120B57-D8A3-4286-AE3F-64C5886BAD80}"/>
               </a:ext>
             </a:extLst>
           </p:cNvPr>
@@ -2377,7 +2354,7 @@
           <p:cNvPr id="9229" name="Rectangle 13">
             <a:extLst>
               <a:ext uri="{FF2B5EF4-FFF2-40B4-BE49-F238E27FC236}">
-                <a16:creationId xmlns:a16="http://schemas.microsoft.com/office/drawing/2014/main" xmlns="" id="{66A2E32D-DF41-4AF2-A688-8B85673894F7}"/>
+                <a16:creationId xmlns:a16="http://schemas.microsoft.com/office/drawing/2014/main" id="{66A2E32D-DF41-4AF2-A688-8B85673894F7}"/>
               </a:ext>
             </a:extLst>
           </p:cNvPr>
@@ -2428,7 +2405,7 @@
           <p:cNvPr id="1028" name="Rectangle 14">
             <a:extLst>
               <a:ext uri="{FF2B5EF4-FFF2-40B4-BE49-F238E27FC236}">
-                <a16:creationId xmlns:a16="http://schemas.microsoft.com/office/drawing/2014/main" xmlns="" id="{45F50165-B05B-493A-AEEF-F254BCA6B6DF}"/>
+                <a16:creationId xmlns:a16="http://schemas.microsoft.com/office/drawing/2014/main" id="{45F50165-B05B-493A-AEEF-F254BCA6B6DF}"/>
               </a:ext>
             </a:extLst>
           </p:cNvPr>
@@ -2453,14 +2430,14 @@
           </a:ln>
           <a:extLst>
             <a:ext uri="{909E8E84-426E-40DD-AFC4-6F175D3DCCD1}">
-              <a14:hiddenFill xmlns:a14="http://schemas.microsoft.com/office/drawing/2010/main" xmlns="">
+              <a14:hiddenFill xmlns:a14="http://schemas.microsoft.com/office/drawing/2010/main">
                 <a:solidFill>
                   <a:srgbClr val="FFFFFF"/>
                 </a:solidFill>
               </a14:hiddenFill>
             </a:ext>
             <a:ext uri="{91240B29-F687-4F45-9708-019B960494DF}">
-              <a14:hiddenLine xmlns:a14="http://schemas.microsoft.com/office/drawing/2010/main" xmlns="" w="9525">
+              <a14:hiddenLine xmlns:a14="http://schemas.microsoft.com/office/drawing/2010/main" w="9525">
                 <a:solidFill>
                   <a:srgbClr val="000000"/>
                 </a:solidFill>
@@ -2492,7 +2469,7 @@
           <p:cNvPr id="1029" name="Rectangle 15">
             <a:extLst>
               <a:ext uri="{FF2B5EF4-FFF2-40B4-BE49-F238E27FC236}">
-                <a16:creationId xmlns:a16="http://schemas.microsoft.com/office/drawing/2014/main" xmlns="" id="{9C40C515-5845-4CF1-BE3F-D0423A677E77}"/>
+                <a16:creationId xmlns:a16="http://schemas.microsoft.com/office/drawing/2014/main" id="{9C40C515-5845-4CF1-BE3F-D0423A677E77}"/>
               </a:ext>
             </a:extLst>
           </p:cNvPr>
@@ -2517,14 +2494,14 @@
           </a:ln>
           <a:extLst>
             <a:ext uri="{909E8E84-426E-40DD-AFC4-6F175D3DCCD1}">
-              <a14:hiddenFill xmlns:a14="http://schemas.microsoft.com/office/drawing/2010/main" xmlns="">
+              <a14:hiddenFill xmlns:a14="http://schemas.microsoft.com/office/drawing/2010/main">
                 <a:solidFill>
                   <a:srgbClr val="FFFFFF"/>
                 </a:solidFill>
               </a14:hiddenFill>
             </a:ext>
             <a:ext uri="{91240B29-F687-4F45-9708-019B960494DF}">
-              <a14:hiddenLine xmlns:a14="http://schemas.microsoft.com/office/drawing/2010/main" xmlns="" w="9525">
+              <a14:hiddenLine xmlns:a14="http://schemas.microsoft.com/office/drawing/2010/main" w="9525">
                 <a:solidFill>
                   <a:srgbClr val="000000"/>
                 </a:solidFill>
@@ -2584,7 +2561,7 @@
           <p:cNvPr id="7" name="Rectangle 13">
             <a:extLst>
               <a:ext uri="{FF2B5EF4-FFF2-40B4-BE49-F238E27FC236}">
-                <a16:creationId xmlns:a16="http://schemas.microsoft.com/office/drawing/2014/main" xmlns="" id="{FB397D73-CFF0-487D-B2A3-DDC21C8EF00B}"/>
+                <a16:creationId xmlns:a16="http://schemas.microsoft.com/office/drawing/2014/main" id="{FB397D73-CFF0-487D-B2A3-DDC21C8EF00B}"/>
               </a:ext>
             </a:extLst>
           </p:cNvPr>
@@ -2630,42 +2607,6 @@
           </a:p>
         </p:txBody>
       </p:sp>
-      <p:pic>
-        <p:nvPicPr>
-          <p:cNvPr id="3" name="Obraz 2">
-            <a:extLst>
-              <a:ext uri="{FF2B5EF4-FFF2-40B4-BE49-F238E27FC236}">
-                <a16:creationId xmlns:a16="http://schemas.microsoft.com/office/drawing/2014/main" xmlns="" id="{6E7E5C4E-56EF-4974-B504-BAFF5077C6A9}"/>
-              </a:ext>
-            </a:extLst>
-          </p:cNvPr>
-          <p:cNvPicPr>
-            <a:picLocks noChangeAspect="1"/>
-          </p:cNvPicPr>
-          <p:nvPr/>
-        </p:nvPicPr>
-        <p:blipFill>
-          <a:blip r:embed="rId13">
-            <a:extLst>
-              <a:ext uri="{28A0092B-C50C-407E-A947-70E740481C1C}">
-                <a14:useLocalDpi xmlns:a14="http://schemas.microsoft.com/office/drawing/2010/main" xmlns="" val="0"/>
-              </a:ext>
-            </a:extLst>
-          </a:blip>
-          <a:stretch>
-            <a:fillRect/>
-          </a:stretch>
-        </p:blipFill>
-        <p:spPr>
-          <a:xfrm>
-            <a:off x="503238" y="0"/>
-            <a:ext cx="1152904" cy="481013"/>
-          </a:xfrm>
-          <a:prstGeom prst="rect">
-            <a:avLst/>
-          </a:prstGeom>
-        </p:spPr>
-      </p:pic>
     </p:spTree>
   </p:cSld>
   <p:clrMap bg1="lt1" tx1="dk1" bg2="lt2" tx2="dk2" accent1="accent1" accent2="accent2" accent3="accent3" accent4="accent4" accent5="accent5" accent6="accent6" hlink="hlink" folHlink="folHlink"/>
@@ -3077,7 +3018,7 @@
           <p:cNvPr id="2" name="Tytuł 1">
             <a:extLst>
               <a:ext uri="{FF2B5EF4-FFF2-40B4-BE49-F238E27FC236}">
-                <a16:creationId xmlns:a16="http://schemas.microsoft.com/office/drawing/2014/main" xmlns="" id="{45F55A9B-1210-435F-9415-BA38BD7FF731}"/>
+                <a16:creationId xmlns:a16="http://schemas.microsoft.com/office/drawing/2014/main" id="{45F55A9B-1210-435F-9415-BA38BD7FF731}"/>
               </a:ext>
             </a:extLst>
           </p:cNvPr>
@@ -3109,7 +3050,7 @@
           <p:cNvPr id="3" name="Podtytuł 2">
             <a:extLst>
               <a:ext uri="{FF2B5EF4-FFF2-40B4-BE49-F238E27FC236}">
-                <a16:creationId xmlns:a16="http://schemas.microsoft.com/office/drawing/2014/main" xmlns="" id="{8E61C64F-E88E-4C1F-8315-8A7EDAED341A}"/>
+                <a16:creationId xmlns:a16="http://schemas.microsoft.com/office/drawing/2014/main" id="{8E61C64F-E88E-4C1F-8315-8A7EDAED341A}"/>
               </a:ext>
             </a:extLst>
           </p:cNvPr>
@@ -3137,7 +3078,7 @@
           <p:cNvPr id="5" name="Grafika 4" descr="Wykres słupkowy">
             <a:extLst>
               <a:ext uri="{FF2B5EF4-FFF2-40B4-BE49-F238E27FC236}">
-                <a16:creationId xmlns:a16="http://schemas.microsoft.com/office/drawing/2014/main" xmlns="" id="{73373B95-B776-4378-BE2F-A78B140DB0A7}"/>
+                <a16:creationId xmlns:a16="http://schemas.microsoft.com/office/drawing/2014/main" id="{73373B95-B776-4378-BE2F-A78B140DB0A7}"/>
               </a:ext>
             </a:extLst>
           </p:cNvPr>
@@ -3150,10 +3091,10 @@
           <a:blip r:embed="rId2" cstate="print">
             <a:extLst>
               <a:ext uri="{28A0092B-C50C-407E-A947-70E740481C1C}">
-                <a14:useLocalDpi xmlns:a14="http://schemas.microsoft.com/office/drawing/2010/main" xmlns="" val="0"/>
+                <a14:useLocalDpi xmlns:a14="http://schemas.microsoft.com/office/drawing/2010/main" val="0"/>
               </a:ext>
               <a:ext uri="{96DAC541-7B7A-43D3-8B79-37D633B846F1}">
-                <asvg:svgBlip xmlns:asvg="http://schemas.microsoft.com/office/drawing/2016/SVG/main" xmlns="" r:embed="rId3"/>
+                <asvg:svgBlip xmlns:asvg="http://schemas.microsoft.com/office/drawing/2016/SVG/main" r:embed="rId3"/>
               </a:ext>
             </a:extLst>
           </a:blip>
@@ -3176,7 +3117,7 @@
           <p:cNvPr id="7" name="Grafika 6" descr="Wykres kołowy">
             <a:extLst>
               <a:ext uri="{FF2B5EF4-FFF2-40B4-BE49-F238E27FC236}">
-                <a16:creationId xmlns:a16="http://schemas.microsoft.com/office/drawing/2014/main" xmlns="" id="{60AB31B3-4171-4ABB-BBB3-DB4D2E67D757}"/>
+                <a16:creationId xmlns:a16="http://schemas.microsoft.com/office/drawing/2014/main" id="{60AB31B3-4171-4ABB-BBB3-DB4D2E67D757}"/>
               </a:ext>
             </a:extLst>
           </p:cNvPr>
@@ -3189,10 +3130,10 @@
           <a:blip r:embed="rId4" cstate="print">
             <a:extLst>
               <a:ext uri="{28A0092B-C50C-407E-A947-70E740481C1C}">
-                <a14:useLocalDpi xmlns:a14="http://schemas.microsoft.com/office/drawing/2010/main" xmlns="" val="0"/>
+                <a14:useLocalDpi xmlns:a14="http://schemas.microsoft.com/office/drawing/2010/main" val="0"/>
               </a:ext>
               <a:ext uri="{96DAC541-7B7A-43D3-8B79-37D633B846F1}">
-                <asvg:svgBlip xmlns:asvg="http://schemas.microsoft.com/office/drawing/2016/SVG/main" xmlns="" r:embed="rId5"/>
+                <asvg:svgBlip xmlns:asvg="http://schemas.microsoft.com/office/drawing/2016/SVG/main" r:embed="rId5"/>
               </a:ext>
             </a:extLst>
           </a:blip>
@@ -3215,7 +3156,7 @@
           <p:cNvPr id="9" name="Grafika 8" descr="Baza danych">
             <a:extLst>
               <a:ext uri="{FF2B5EF4-FFF2-40B4-BE49-F238E27FC236}">
-                <a16:creationId xmlns:a16="http://schemas.microsoft.com/office/drawing/2014/main" xmlns="" id="{0C10A884-C8C8-411A-84C5-764D8E2F17A8}"/>
+                <a16:creationId xmlns:a16="http://schemas.microsoft.com/office/drawing/2014/main" id="{0C10A884-C8C8-411A-84C5-764D8E2F17A8}"/>
               </a:ext>
             </a:extLst>
           </p:cNvPr>
@@ -3228,10 +3169,10 @@
           <a:blip r:embed="rId6" cstate="print">
             <a:extLst>
               <a:ext uri="{28A0092B-C50C-407E-A947-70E740481C1C}">
-                <a14:useLocalDpi xmlns:a14="http://schemas.microsoft.com/office/drawing/2010/main" xmlns="" val="0"/>
+                <a14:useLocalDpi xmlns:a14="http://schemas.microsoft.com/office/drawing/2010/main" val="0"/>
               </a:ext>
               <a:ext uri="{96DAC541-7B7A-43D3-8B79-37D633B846F1}">
-                <asvg:svgBlip xmlns:asvg="http://schemas.microsoft.com/office/drawing/2016/SVG/main" xmlns="" r:embed="rId7"/>
+                <asvg:svgBlip xmlns:asvg="http://schemas.microsoft.com/office/drawing/2016/SVG/main" r:embed="rId7"/>
               </a:ext>
             </a:extLst>
           </a:blip>
@@ -3252,7 +3193,7 @@
     </p:spTree>
     <p:extLst>
       <p:ext uri="{BB962C8B-B14F-4D97-AF65-F5344CB8AC3E}">
-        <p14:creationId xmlns:p14="http://schemas.microsoft.com/office/powerpoint/2010/main" xmlns="" val="2680376130"/>
+        <p14:creationId xmlns:p14="http://schemas.microsoft.com/office/powerpoint/2010/main" val="2680376130"/>
       </p:ext>
     </p:extLst>
   </p:cSld>
@@ -3287,7 +3228,7 @@
           <p:cNvPr id="2" name="Tytuł 1">
             <a:extLst>
               <a:ext uri="{FF2B5EF4-FFF2-40B4-BE49-F238E27FC236}">
-                <a16:creationId xmlns:a16="http://schemas.microsoft.com/office/drawing/2014/main" xmlns="" id="{C6D4EF99-DFB3-4C73-BD0C-8A52F0D0B5D5}"/>
+                <a16:creationId xmlns:a16="http://schemas.microsoft.com/office/drawing/2014/main" id="{C6D4EF99-DFB3-4C73-BD0C-8A52F0D0B5D5}"/>
               </a:ext>
             </a:extLst>
           </p:cNvPr>
@@ -3352,7 +3293,7 @@
     </p:spTree>
     <p:extLst>
       <p:ext uri="{BB962C8B-B14F-4D97-AF65-F5344CB8AC3E}">
-        <p14:creationId xmlns:p14="http://schemas.microsoft.com/office/powerpoint/2010/main" xmlns="" val="1738780496"/>
+        <p14:creationId xmlns:p14="http://schemas.microsoft.com/office/powerpoint/2010/main" val="1738780496"/>
       </p:ext>
     </p:extLst>
   </p:cSld>
@@ -3387,7 +3328,7 @@
           <p:cNvPr id="2" name="Tytuł 1">
             <a:extLst>
               <a:ext uri="{FF2B5EF4-FFF2-40B4-BE49-F238E27FC236}">
-                <a16:creationId xmlns:a16="http://schemas.microsoft.com/office/drawing/2014/main" xmlns="" id="{D88E388D-F616-4C05-8BD4-EFFDD7B25FC4}"/>
+                <a16:creationId xmlns:a16="http://schemas.microsoft.com/office/drawing/2014/main" id="{D88E388D-F616-4C05-8BD4-EFFDD7B25FC4}"/>
               </a:ext>
             </a:extLst>
           </p:cNvPr>
@@ -3544,7 +3485,7 @@
     </p:spTree>
     <p:extLst>
       <p:ext uri="{BB962C8B-B14F-4D97-AF65-F5344CB8AC3E}">
-        <p14:creationId xmlns:p14="http://schemas.microsoft.com/office/powerpoint/2010/main" xmlns="" val="34365763"/>
+        <p14:creationId xmlns:p14="http://schemas.microsoft.com/office/powerpoint/2010/main" val="34365763"/>
       </p:ext>
     </p:extLst>
   </p:cSld>
@@ -3579,7 +3520,7 @@
           <p:cNvPr id="2" name="Tytuł 1">
             <a:extLst>
               <a:ext uri="{FF2B5EF4-FFF2-40B4-BE49-F238E27FC236}">
-                <a16:creationId xmlns:a16="http://schemas.microsoft.com/office/drawing/2014/main" xmlns="" id="{D6EBCBCD-85D6-4B2E-B1F0-AF9425A5A1F0}"/>
+                <a16:creationId xmlns:a16="http://schemas.microsoft.com/office/drawing/2014/main" id="{D6EBCBCD-85D6-4B2E-B1F0-AF9425A5A1F0}"/>
               </a:ext>
             </a:extLst>
           </p:cNvPr>
@@ -3630,7 +3571,7 @@
     </p:spTree>
     <p:extLst>
       <p:ext uri="{BB962C8B-B14F-4D97-AF65-F5344CB8AC3E}">
-        <p14:creationId xmlns:p14="http://schemas.microsoft.com/office/powerpoint/2010/main" xmlns="" val="1630868643"/>
+        <p14:creationId xmlns:p14="http://schemas.microsoft.com/office/powerpoint/2010/main" val="1630868643"/>
       </p:ext>
     </p:extLst>
   </p:cSld>
@@ -3665,7 +3606,7 @@
           <p:cNvPr id="2" name="Tytuł 1">
             <a:extLst>
               <a:ext uri="{FF2B5EF4-FFF2-40B4-BE49-F238E27FC236}">
-                <a16:creationId xmlns:a16="http://schemas.microsoft.com/office/drawing/2014/main" xmlns="" id="{6D40C0CF-5FB4-4ECA-BC2D-DF895AC35A9B}"/>
+                <a16:creationId xmlns:a16="http://schemas.microsoft.com/office/drawing/2014/main" id="{6D40C0CF-5FB4-4ECA-BC2D-DF895AC35A9B}"/>
               </a:ext>
             </a:extLst>
           </p:cNvPr>
@@ -3716,7 +3657,7 @@
     </p:spTree>
     <p:extLst>
       <p:ext uri="{BB962C8B-B14F-4D97-AF65-F5344CB8AC3E}">
-        <p14:creationId xmlns:p14="http://schemas.microsoft.com/office/powerpoint/2010/main" xmlns="" val="1748067500"/>
+        <p14:creationId xmlns:p14="http://schemas.microsoft.com/office/powerpoint/2010/main" val="1748067500"/>
       </p:ext>
     </p:extLst>
   </p:cSld>
@@ -3751,7 +3692,7 @@
           <p:cNvPr id="2" name="Tytuł 1">
             <a:extLst>
               <a:ext uri="{FF2B5EF4-FFF2-40B4-BE49-F238E27FC236}">
-                <a16:creationId xmlns:a16="http://schemas.microsoft.com/office/drawing/2014/main" xmlns="" id="{A5F6F896-CAC7-4082-A689-EE20A8EC993A}"/>
+                <a16:creationId xmlns:a16="http://schemas.microsoft.com/office/drawing/2014/main" id="{A5F6F896-CAC7-4082-A689-EE20A8EC993A}"/>
               </a:ext>
             </a:extLst>
           </p:cNvPr>
@@ -3806,7 +3747,7 @@
     </p:spTree>
     <p:extLst>
       <p:ext uri="{BB962C8B-B14F-4D97-AF65-F5344CB8AC3E}">
-        <p14:creationId xmlns:p14="http://schemas.microsoft.com/office/powerpoint/2010/main" xmlns="" val="2437516177"/>
+        <p14:creationId xmlns:p14="http://schemas.microsoft.com/office/powerpoint/2010/main" val="2437516177"/>
       </p:ext>
     </p:extLst>
   </p:cSld>
@@ -3841,7 +3782,7 @@
           <p:cNvPr id="2" name="Tytuł 1">
             <a:extLst>
               <a:ext uri="{FF2B5EF4-FFF2-40B4-BE49-F238E27FC236}">
-                <a16:creationId xmlns:a16="http://schemas.microsoft.com/office/drawing/2014/main" xmlns="" id="{72ABCDFA-3F8B-4ADA-975D-9509A63AF39B}"/>
+                <a16:creationId xmlns:a16="http://schemas.microsoft.com/office/drawing/2014/main" id="{72ABCDFA-3F8B-4ADA-975D-9509A63AF39B}"/>
               </a:ext>
             </a:extLst>
           </p:cNvPr>
@@ -3869,7 +3810,7 @@
           <p:cNvPr id="3" name="Podtytuł 2">
             <a:extLst>
               <a:ext uri="{FF2B5EF4-FFF2-40B4-BE49-F238E27FC236}">
-                <a16:creationId xmlns:a16="http://schemas.microsoft.com/office/drawing/2014/main" xmlns="" id="{8C4860A1-8B8B-411E-9F4E-E3E5BADDF037}"/>
+                <a16:creationId xmlns:a16="http://schemas.microsoft.com/office/drawing/2014/main" id="{8C4860A1-8B8B-411E-9F4E-E3E5BADDF037}"/>
               </a:ext>
             </a:extLst>
           </p:cNvPr>
@@ -3892,7 +3833,7 @@
     </p:spTree>
     <p:extLst>
       <p:ext uri="{BB962C8B-B14F-4D97-AF65-F5344CB8AC3E}">
-        <p14:creationId xmlns:p14="http://schemas.microsoft.com/office/powerpoint/2010/main" xmlns="" val="2769593954"/>
+        <p14:creationId xmlns:p14="http://schemas.microsoft.com/office/powerpoint/2010/main" val="2769593954"/>
       </p:ext>
     </p:extLst>
   </p:cSld>
@@ -4171,7 +4112,7 @@
   </a:extraClrSchemeLst>
   <a:extLst>
     <a:ext uri="{05A4C25C-085E-4340-85A3-A5531E510DB2}">
-      <thm15:themeFamily xmlns:thm15="http://schemas.microsoft.com/office/thememl/2012/main" xmlns="" name="MOTYW_NOKIA_PPT" id="{DE75715B-F8D1-48F8-B78E-A6035CB9A332}" vid="{DAA3D893-641D-4767-9886-1E708AEF2D9C}"/>
+      <thm15:themeFamily xmlns:thm15="http://schemas.microsoft.com/office/thememl/2012/main" name="MOTYW_NOKIA_PPT" id="{DE75715B-F8D1-48F8-B78E-A6035CB9A332}" vid="{DAA3D893-641D-4767-9886-1E708AEF2D9C}"/>
     </a:ext>
   </a:extLst>
 </a:theme>

</xml_diff>

<commit_message>
added more examples to presentation
</commit_message>
<xml_diff>
--- a/KPZ_demo_prezentacja.pptx
+++ b/KPZ_demo_prezentacja.pptx
@@ -1,28 +1,127 @@
 
 <file path=ppt/presentation.xml><?xml version="1.0" encoding="utf-8"?>
-<p:presentation xmlns:a="http://schemas.openxmlformats.org/drawingml/2006/main" xmlns:p="http://schemas.openxmlformats.org/presentationml/2006/main" xmlns:r="http://schemas.openxmlformats.org/officeDocument/2006/relationships" xmlns:p14="http://schemas.microsoft.com/office/powerpoint/2010/main" xmlns:p15="http://schemas.microsoft.com/office/powerpoint/2012/main" xmlns:mc="http://schemas.openxmlformats.org/markup-compatibility/2006">
+<p:presentation xmlns:a="http://schemas.openxmlformats.org/drawingml/2006/main" xmlns:r="http://schemas.openxmlformats.org/officeDocument/2006/relationships" xmlns:p="http://schemas.openxmlformats.org/presentationml/2006/main">
   <p:sldMasterIdLst>
-    <p:sldMasterId id="2147483648" r:id="rId2"/>
-    <p:sldMasterId id="2147483661" r:id="rId3"/>
+    <p:sldMasterId id="2147483648" r:id="rId1"/>
+    <p:sldMasterId id="2147483661" r:id="rId2"/>
   </p:sldMasterIdLst>
   <p:sldIdLst>
-    <p:sldId id="256" r:id="rId4"/>
-    <p:sldId id="257" r:id="rId5"/>
-    <p:sldId id="258" r:id="rId6"/>
+    <p:sldId id="256" r:id="rId3"/>
+    <p:sldId id="257" r:id="rId4"/>
+    <p:sldId id="258" r:id="rId5"/>
+    <p:sldId id="265" r:id="rId6"/>
     <p:sldId id="259" r:id="rId7"/>
     <p:sldId id="260" r:id="rId8"/>
-    <p:sldId id="261" r:id="rId9"/>
-    <p:sldId id="262" r:id="rId10"/>
-    <p:sldId id="263" r:id="rId11"/>
-    <p:sldId id="264" r:id="rId12"/>
+    <p:sldId id="266" r:id="rId9"/>
+    <p:sldId id="261" r:id="rId10"/>
+    <p:sldId id="267" r:id="rId11"/>
+    <p:sldId id="262" r:id="rId12"/>
+    <p:sldId id="268" r:id="rId13"/>
+    <p:sldId id="263" r:id="rId14"/>
+    <p:sldId id="264" r:id="rId15"/>
   </p:sldIdLst>
-  <p:sldSz cx="9144000" cy="6858000"/>
-  <p:notesSz cx="7559675" cy="10691812"/>
+  <p:sldSz cx="9144000" cy="6858000" type="screen4x3"/>
+  <p:notesSz cx="7559675" cy="10691813"/>
+  <p:defaultTextStyle>
+    <a:defPPr>
+      <a:defRPr lang="pl-PL"/>
+    </a:defPPr>
+    <a:lvl1pPr marL="0" algn="l" defTabSz="914400" rtl="0" eaLnBrk="1" latinLnBrk="0" hangingPunct="1">
+      <a:defRPr sz="1800" kern="1200">
+        <a:solidFill>
+          <a:schemeClr val="tx1"/>
+        </a:solidFill>
+        <a:latin typeface="+mn-lt"/>
+        <a:ea typeface="+mn-ea"/>
+        <a:cs typeface="+mn-cs"/>
+      </a:defRPr>
+    </a:lvl1pPr>
+    <a:lvl2pPr marL="457200" algn="l" defTabSz="914400" rtl="0" eaLnBrk="1" latinLnBrk="0" hangingPunct="1">
+      <a:defRPr sz="1800" kern="1200">
+        <a:solidFill>
+          <a:schemeClr val="tx1"/>
+        </a:solidFill>
+        <a:latin typeface="+mn-lt"/>
+        <a:ea typeface="+mn-ea"/>
+        <a:cs typeface="+mn-cs"/>
+      </a:defRPr>
+    </a:lvl2pPr>
+    <a:lvl3pPr marL="914400" algn="l" defTabSz="914400" rtl="0" eaLnBrk="1" latinLnBrk="0" hangingPunct="1">
+      <a:defRPr sz="1800" kern="1200">
+        <a:solidFill>
+          <a:schemeClr val="tx1"/>
+        </a:solidFill>
+        <a:latin typeface="+mn-lt"/>
+        <a:ea typeface="+mn-ea"/>
+        <a:cs typeface="+mn-cs"/>
+      </a:defRPr>
+    </a:lvl3pPr>
+    <a:lvl4pPr marL="1371600" algn="l" defTabSz="914400" rtl="0" eaLnBrk="1" latinLnBrk="0" hangingPunct="1">
+      <a:defRPr sz="1800" kern="1200">
+        <a:solidFill>
+          <a:schemeClr val="tx1"/>
+        </a:solidFill>
+        <a:latin typeface="+mn-lt"/>
+        <a:ea typeface="+mn-ea"/>
+        <a:cs typeface="+mn-cs"/>
+      </a:defRPr>
+    </a:lvl4pPr>
+    <a:lvl5pPr marL="1828800" algn="l" defTabSz="914400" rtl="0" eaLnBrk="1" latinLnBrk="0" hangingPunct="1">
+      <a:defRPr sz="1800" kern="1200">
+        <a:solidFill>
+          <a:schemeClr val="tx1"/>
+        </a:solidFill>
+        <a:latin typeface="+mn-lt"/>
+        <a:ea typeface="+mn-ea"/>
+        <a:cs typeface="+mn-cs"/>
+      </a:defRPr>
+    </a:lvl5pPr>
+    <a:lvl6pPr marL="2286000" algn="l" defTabSz="914400" rtl="0" eaLnBrk="1" latinLnBrk="0" hangingPunct="1">
+      <a:defRPr sz="1800" kern="1200">
+        <a:solidFill>
+          <a:schemeClr val="tx1"/>
+        </a:solidFill>
+        <a:latin typeface="+mn-lt"/>
+        <a:ea typeface="+mn-ea"/>
+        <a:cs typeface="+mn-cs"/>
+      </a:defRPr>
+    </a:lvl6pPr>
+    <a:lvl7pPr marL="2743200" algn="l" defTabSz="914400" rtl="0" eaLnBrk="1" latinLnBrk="0" hangingPunct="1">
+      <a:defRPr sz="1800" kern="1200">
+        <a:solidFill>
+          <a:schemeClr val="tx1"/>
+        </a:solidFill>
+        <a:latin typeface="+mn-lt"/>
+        <a:ea typeface="+mn-ea"/>
+        <a:cs typeface="+mn-cs"/>
+      </a:defRPr>
+    </a:lvl7pPr>
+    <a:lvl8pPr marL="3200400" algn="l" defTabSz="914400" rtl="0" eaLnBrk="1" latinLnBrk="0" hangingPunct="1">
+      <a:defRPr sz="1800" kern="1200">
+        <a:solidFill>
+          <a:schemeClr val="tx1"/>
+        </a:solidFill>
+        <a:latin typeface="+mn-lt"/>
+        <a:ea typeface="+mn-ea"/>
+        <a:cs typeface="+mn-cs"/>
+      </a:defRPr>
+    </a:lvl8pPr>
+    <a:lvl9pPr marL="3657600" algn="l" defTabSz="914400" rtl="0" eaLnBrk="1" latinLnBrk="0" hangingPunct="1">
+      <a:defRPr sz="1800" kern="1200">
+        <a:solidFill>
+          <a:schemeClr val="tx1"/>
+        </a:solidFill>
+        <a:latin typeface="+mn-lt"/>
+        <a:ea typeface="+mn-ea"/>
+        <a:cs typeface="+mn-cs"/>
+      </a:defRPr>
+    </a:lvl9pPr>
+  </p:defaultTextStyle>
 </p:presentation>
 </file>
 
 <file path=ppt/slideLayouts/slideLayout1.xml><?xml version="1.0" encoding="utf-8"?>
-<p:sldLayout xmlns:a="http://schemas.openxmlformats.org/drawingml/2006/main" xmlns:p="http://schemas.openxmlformats.org/presentationml/2006/main" xmlns:r="http://schemas.openxmlformats.org/officeDocument/2006/relationships" xmlns:p14="http://schemas.microsoft.com/office/powerpoint/2010/main" xmlns:p15="http://schemas.microsoft.com/office/powerpoint/2012/main" xmlns:mc="http://schemas.openxmlformats.org/markup-compatibility/2006" type="blank" preserve="1">
+<p:sldLayout xmlns:a="http://schemas.openxmlformats.org/drawingml/2006/main" xmlns:r="http://schemas.openxmlformats.org/officeDocument/2006/relationships" xmlns:p="http://schemas.openxmlformats.org/presentationml/2006/main" type="blank" preserve="1">
   <p:cSld name="Blank Slide">
     <p:spTree>
       <p:nvGrpSpPr>
@@ -40,11 +139,14 @@
       </p:grpSpPr>
     </p:spTree>
   </p:cSld>
+  <p:clrMapOvr>
+    <a:masterClrMapping/>
+  </p:clrMapOvr>
 </p:sldLayout>
 </file>
 
 <file path=ppt/slideLayouts/slideLayout10.xml><?xml version="1.0" encoding="utf-8"?>
-<p:sldLayout xmlns:a="http://schemas.openxmlformats.org/drawingml/2006/main" xmlns:p="http://schemas.openxmlformats.org/presentationml/2006/main" xmlns:r="http://schemas.openxmlformats.org/officeDocument/2006/relationships" xmlns:p14="http://schemas.microsoft.com/office/powerpoint/2010/main" xmlns:p15="http://schemas.microsoft.com/office/powerpoint/2012/main" xmlns:mc="http://schemas.openxmlformats.org/markup-compatibility/2006" type="objOverTx" preserve="1">
+<p:sldLayout xmlns:a="http://schemas.openxmlformats.org/drawingml/2006/main" xmlns:r="http://schemas.openxmlformats.org/officeDocument/2006/relationships" xmlns:p="http://schemas.openxmlformats.org/presentationml/2006/main" type="objOverTx" preserve="1">
   <p:cSld name="Title, Content over Content">
     <p:spTree>
       <p:nvGrpSpPr>
@@ -80,9 +182,10 @@
           </a:prstGeom>
         </p:spPr>
         <p:txBody>
-          <a:bodyPr lIns="0" rIns="0" tIns="0" bIns="0" anchor="ctr"/>
-          <a:p>
-            <a:endParaRPr b="0" lang="pl-PL" sz="2700" spc="-1" strike="noStrike">
+          <a:bodyPr lIns="0" tIns="0" rIns="0" bIns="0" anchor="ctr"/>
+          <a:lstStyle/>
+          <a:p>
+            <a:endParaRPr lang="pl-PL" sz="2700" b="0" strike="noStrike" spc="-1">
               <a:solidFill>
                 <a:srgbClr val="000000"/>
               </a:solidFill>
@@ -111,11 +214,12 @@
           </a:prstGeom>
         </p:spPr>
         <p:txBody>
-          <a:bodyPr lIns="0" rIns="0" tIns="0" bIns="0">
+          <a:bodyPr lIns="0" tIns="0" rIns="0" bIns="0">
             <a:normAutofit/>
           </a:bodyPr>
-          <a:p>
-            <a:endParaRPr b="0" lang="pl-PL" sz="2400" spc="-1" strike="noStrike">
+          <a:lstStyle/>
+          <a:p>
+            <a:endParaRPr lang="pl-PL" sz="2400" b="0" strike="noStrike" spc="-1">
               <a:solidFill>
                 <a:srgbClr val="000000"/>
               </a:solidFill>
@@ -144,11 +248,12 @@
           </a:prstGeom>
         </p:spPr>
         <p:txBody>
-          <a:bodyPr lIns="0" rIns="0" tIns="0" bIns="0">
+          <a:bodyPr lIns="0" tIns="0" rIns="0" bIns="0">
             <a:normAutofit/>
           </a:bodyPr>
-          <a:p>
-            <a:endParaRPr b="0" lang="pl-PL" sz="2400" spc="-1" strike="noStrike">
+          <a:lstStyle/>
+          <a:p>
+            <a:endParaRPr lang="pl-PL" sz="2400" b="0" strike="noStrike" spc="-1">
               <a:solidFill>
                 <a:srgbClr val="000000"/>
               </a:solidFill>
@@ -159,11 +264,14 @@
       </p:sp>
     </p:spTree>
   </p:cSld>
+  <p:clrMapOvr>
+    <a:masterClrMapping/>
+  </p:clrMapOvr>
 </p:sldLayout>
 </file>
 
 <file path=ppt/slideLayouts/slideLayout11.xml><?xml version="1.0" encoding="utf-8"?>
-<p:sldLayout xmlns:a="http://schemas.openxmlformats.org/drawingml/2006/main" xmlns:p="http://schemas.openxmlformats.org/presentationml/2006/main" xmlns:r="http://schemas.openxmlformats.org/officeDocument/2006/relationships" xmlns:p14="http://schemas.microsoft.com/office/powerpoint/2010/main" xmlns:p15="http://schemas.microsoft.com/office/powerpoint/2012/main" xmlns:mc="http://schemas.openxmlformats.org/markup-compatibility/2006" type="fourObj" preserve="1">
+<p:sldLayout xmlns:a="http://schemas.openxmlformats.org/drawingml/2006/main" xmlns:r="http://schemas.openxmlformats.org/officeDocument/2006/relationships" xmlns:p="http://schemas.openxmlformats.org/presentationml/2006/main" type="fourObj" preserve="1">
   <p:cSld name="Title, 4 Content">
     <p:spTree>
       <p:nvGrpSpPr>
@@ -199,9 +307,10 @@
           </a:prstGeom>
         </p:spPr>
         <p:txBody>
-          <a:bodyPr lIns="0" rIns="0" tIns="0" bIns="0" anchor="ctr"/>
-          <a:p>
-            <a:endParaRPr b="0" lang="pl-PL" sz="2700" spc="-1" strike="noStrike">
+          <a:bodyPr lIns="0" tIns="0" rIns="0" bIns="0" anchor="ctr"/>
+          <a:lstStyle/>
+          <a:p>
+            <a:endParaRPr lang="pl-PL" sz="2700" b="0" strike="noStrike" spc="-1">
               <a:solidFill>
                 <a:srgbClr val="000000"/>
               </a:solidFill>
@@ -230,11 +339,12 @@
           </a:prstGeom>
         </p:spPr>
         <p:txBody>
-          <a:bodyPr lIns="0" rIns="0" tIns="0" bIns="0">
+          <a:bodyPr lIns="0" tIns="0" rIns="0" bIns="0">
             <a:normAutofit/>
           </a:bodyPr>
-          <a:p>
-            <a:endParaRPr b="0" lang="pl-PL" sz="2400" spc="-1" strike="noStrike">
+          <a:lstStyle/>
+          <a:p>
+            <a:endParaRPr lang="pl-PL" sz="2400" b="0" strike="noStrike" spc="-1">
               <a:solidFill>
                 <a:srgbClr val="000000"/>
               </a:solidFill>
@@ -263,11 +373,12 @@
           </a:prstGeom>
         </p:spPr>
         <p:txBody>
-          <a:bodyPr lIns="0" rIns="0" tIns="0" bIns="0">
+          <a:bodyPr lIns="0" tIns="0" rIns="0" bIns="0">
             <a:normAutofit/>
           </a:bodyPr>
-          <a:p>
-            <a:endParaRPr b="0" lang="pl-PL" sz="2400" spc="-1" strike="noStrike">
+          <a:lstStyle/>
+          <a:p>
+            <a:endParaRPr lang="pl-PL" sz="2400" b="0" strike="noStrike" spc="-1">
               <a:solidFill>
                 <a:srgbClr val="000000"/>
               </a:solidFill>
@@ -296,11 +407,12 @@
           </a:prstGeom>
         </p:spPr>
         <p:txBody>
-          <a:bodyPr lIns="0" rIns="0" tIns="0" bIns="0">
+          <a:bodyPr lIns="0" tIns="0" rIns="0" bIns="0">
             <a:normAutofit/>
           </a:bodyPr>
-          <a:p>
-            <a:endParaRPr b="0" lang="pl-PL" sz="2400" spc="-1" strike="noStrike">
+          <a:lstStyle/>
+          <a:p>
+            <a:endParaRPr lang="pl-PL" sz="2400" b="0" strike="noStrike" spc="-1">
               <a:solidFill>
                 <a:srgbClr val="000000"/>
               </a:solidFill>
@@ -329,11 +441,12 @@
           </a:prstGeom>
         </p:spPr>
         <p:txBody>
-          <a:bodyPr lIns="0" rIns="0" tIns="0" bIns="0">
+          <a:bodyPr lIns="0" tIns="0" rIns="0" bIns="0">
             <a:normAutofit/>
           </a:bodyPr>
-          <a:p>
-            <a:endParaRPr b="0" lang="pl-PL" sz="2400" spc="-1" strike="noStrike">
+          <a:lstStyle/>
+          <a:p>
+            <a:endParaRPr lang="pl-PL" sz="2400" b="0" strike="noStrike" spc="-1">
               <a:solidFill>
                 <a:srgbClr val="000000"/>
               </a:solidFill>
@@ -344,11 +457,14 @@
       </p:sp>
     </p:spTree>
   </p:cSld>
+  <p:clrMapOvr>
+    <a:masterClrMapping/>
+  </p:clrMapOvr>
 </p:sldLayout>
 </file>
 
 <file path=ppt/slideLayouts/slideLayout12.xml><?xml version="1.0" encoding="utf-8"?>
-<p:sldLayout xmlns:a="http://schemas.openxmlformats.org/drawingml/2006/main" xmlns:p="http://schemas.openxmlformats.org/presentationml/2006/main" xmlns:r="http://schemas.openxmlformats.org/officeDocument/2006/relationships" xmlns:p14="http://schemas.microsoft.com/office/powerpoint/2010/main" xmlns:p15="http://schemas.microsoft.com/office/powerpoint/2012/main" xmlns:mc="http://schemas.openxmlformats.org/markup-compatibility/2006" type="blank" preserve="1">
+<p:sldLayout xmlns:a="http://schemas.openxmlformats.org/drawingml/2006/main" xmlns:r="http://schemas.openxmlformats.org/officeDocument/2006/relationships" xmlns:p="http://schemas.openxmlformats.org/presentationml/2006/main" type="blank" preserve="1">
   <p:cSld name="Title, 6 Content">
     <p:spTree>
       <p:nvGrpSpPr>
@@ -384,9 +500,10 @@
           </a:prstGeom>
         </p:spPr>
         <p:txBody>
-          <a:bodyPr lIns="0" rIns="0" tIns="0" bIns="0" anchor="ctr"/>
-          <a:p>
-            <a:endParaRPr b="0" lang="pl-PL" sz="2700" spc="-1" strike="noStrike">
+          <a:bodyPr lIns="0" tIns="0" rIns="0" bIns="0" anchor="ctr"/>
+          <a:lstStyle/>
+          <a:p>
+            <a:endParaRPr lang="pl-PL" sz="2700" b="0" strike="noStrike" spc="-1">
               <a:solidFill>
                 <a:srgbClr val="000000"/>
               </a:solidFill>
@@ -415,11 +532,12 @@
           </a:prstGeom>
         </p:spPr>
         <p:txBody>
-          <a:bodyPr lIns="0" rIns="0" tIns="0" bIns="0">
+          <a:bodyPr lIns="0" tIns="0" rIns="0" bIns="0">
             <a:normAutofit/>
           </a:bodyPr>
-          <a:p>
-            <a:endParaRPr b="0" lang="pl-PL" sz="2400" spc="-1" strike="noStrike">
+          <a:lstStyle/>
+          <a:p>
+            <a:endParaRPr lang="pl-PL" sz="2400" b="0" strike="noStrike" spc="-1">
               <a:solidFill>
                 <a:srgbClr val="000000"/>
               </a:solidFill>
@@ -448,11 +566,12 @@
           </a:prstGeom>
         </p:spPr>
         <p:txBody>
-          <a:bodyPr lIns="0" rIns="0" tIns="0" bIns="0">
+          <a:bodyPr lIns="0" tIns="0" rIns="0" bIns="0">
             <a:normAutofit/>
           </a:bodyPr>
-          <a:p>
-            <a:endParaRPr b="0" lang="pl-PL" sz="2400" spc="-1" strike="noStrike">
+          <a:lstStyle/>
+          <a:p>
+            <a:endParaRPr lang="pl-PL" sz="2400" b="0" strike="noStrike" spc="-1">
               <a:solidFill>
                 <a:srgbClr val="000000"/>
               </a:solidFill>
@@ -481,11 +600,12 @@
           </a:prstGeom>
         </p:spPr>
         <p:txBody>
-          <a:bodyPr lIns="0" rIns="0" tIns="0" bIns="0">
+          <a:bodyPr lIns="0" tIns="0" rIns="0" bIns="0">
             <a:normAutofit/>
           </a:bodyPr>
-          <a:p>
-            <a:endParaRPr b="0" lang="pl-PL" sz="2400" spc="-1" strike="noStrike">
+          <a:lstStyle/>
+          <a:p>
+            <a:endParaRPr lang="pl-PL" sz="2400" b="0" strike="noStrike" spc="-1">
               <a:solidFill>
                 <a:srgbClr val="000000"/>
               </a:solidFill>
@@ -514,11 +634,12 @@
           </a:prstGeom>
         </p:spPr>
         <p:txBody>
-          <a:bodyPr lIns="0" rIns="0" tIns="0" bIns="0">
+          <a:bodyPr lIns="0" tIns="0" rIns="0" bIns="0">
             <a:normAutofit/>
           </a:bodyPr>
-          <a:p>
-            <a:endParaRPr b="0" lang="pl-PL" sz="2400" spc="-1" strike="noStrike">
+          <a:lstStyle/>
+          <a:p>
+            <a:endParaRPr lang="pl-PL" sz="2400" b="0" strike="noStrike" spc="-1">
               <a:solidFill>
                 <a:srgbClr val="000000"/>
               </a:solidFill>
@@ -547,11 +668,12 @@
           </a:prstGeom>
         </p:spPr>
         <p:txBody>
-          <a:bodyPr lIns="0" rIns="0" tIns="0" bIns="0">
+          <a:bodyPr lIns="0" tIns="0" rIns="0" bIns="0">
             <a:normAutofit/>
           </a:bodyPr>
-          <a:p>
-            <a:endParaRPr b="0" lang="pl-PL" sz="2400" spc="-1" strike="noStrike">
+          <a:lstStyle/>
+          <a:p>
+            <a:endParaRPr lang="pl-PL" sz="2400" b="0" strike="noStrike" spc="-1">
               <a:solidFill>
                 <a:srgbClr val="000000"/>
               </a:solidFill>
@@ -580,11 +702,12 @@
           </a:prstGeom>
         </p:spPr>
         <p:txBody>
-          <a:bodyPr lIns="0" rIns="0" tIns="0" bIns="0">
+          <a:bodyPr lIns="0" tIns="0" rIns="0" bIns="0">
             <a:normAutofit/>
           </a:bodyPr>
-          <a:p>
-            <a:endParaRPr b="0" lang="pl-PL" sz="2400" spc="-1" strike="noStrike">
+          <a:lstStyle/>
+          <a:p>
+            <a:endParaRPr lang="pl-PL" sz="2400" b="0" strike="noStrike" spc="-1">
               <a:solidFill>
                 <a:srgbClr val="000000"/>
               </a:solidFill>
@@ -595,11 +718,14 @@
       </p:sp>
     </p:spTree>
   </p:cSld>
+  <p:clrMapOvr>
+    <a:masterClrMapping/>
+  </p:clrMapOvr>
 </p:sldLayout>
 </file>
 
 <file path=ppt/slideLayouts/slideLayout13.xml><?xml version="1.0" encoding="utf-8"?>
-<p:sldLayout xmlns:a="http://schemas.openxmlformats.org/drawingml/2006/main" xmlns:p="http://schemas.openxmlformats.org/presentationml/2006/main" xmlns:r="http://schemas.openxmlformats.org/officeDocument/2006/relationships" xmlns:p14="http://schemas.microsoft.com/office/powerpoint/2010/main" xmlns:p15="http://schemas.microsoft.com/office/powerpoint/2012/main" xmlns:mc="http://schemas.openxmlformats.org/markup-compatibility/2006" type="blank" preserve="1">
+<p:sldLayout xmlns:a="http://schemas.openxmlformats.org/drawingml/2006/main" xmlns:r="http://schemas.openxmlformats.org/officeDocument/2006/relationships" xmlns:p="http://schemas.openxmlformats.org/presentationml/2006/main" type="blank" preserve="1">
   <p:cSld name="Blank Slide">
     <p:spTree>
       <p:nvGrpSpPr>
@@ -617,11 +743,14 @@
       </p:grpSpPr>
     </p:spTree>
   </p:cSld>
+  <p:clrMapOvr>
+    <a:masterClrMapping/>
+  </p:clrMapOvr>
 </p:sldLayout>
 </file>
 
 <file path=ppt/slideLayouts/slideLayout14.xml><?xml version="1.0" encoding="utf-8"?>
-<p:sldLayout xmlns:a="http://schemas.openxmlformats.org/drawingml/2006/main" xmlns:p="http://schemas.openxmlformats.org/presentationml/2006/main" xmlns:r="http://schemas.openxmlformats.org/officeDocument/2006/relationships" xmlns:p14="http://schemas.microsoft.com/office/powerpoint/2010/main" xmlns:p15="http://schemas.microsoft.com/office/powerpoint/2012/main" xmlns:mc="http://schemas.openxmlformats.org/markup-compatibility/2006" type="tx" preserve="1">
+<p:sldLayout xmlns:a="http://schemas.openxmlformats.org/drawingml/2006/main" xmlns:r="http://schemas.openxmlformats.org/officeDocument/2006/relationships" xmlns:p="http://schemas.openxmlformats.org/presentationml/2006/main" type="tx" preserve="1">
   <p:cSld name="Title Slide">
     <p:spTree>
       <p:nvGrpSpPr>
@@ -657,9 +786,10 @@
           </a:prstGeom>
         </p:spPr>
         <p:txBody>
-          <a:bodyPr lIns="0" rIns="0" tIns="0" bIns="0" anchor="ctr"/>
-          <a:p>
-            <a:endParaRPr b="0" lang="pl-PL" sz="2700" spc="-1" strike="noStrike">
+          <a:bodyPr lIns="0" tIns="0" rIns="0" bIns="0" anchor="ctr"/>
+          <a:lstStyle/>
+          <a:p>
+            <a:endParaRPr lang="pl-PL" sz="2700" b="0" strike="noStrike" spc="-1">
               <a:solidFill>
                 <a:srgbClr val="000000"/>
               </a:solidFill>
@@ -688,10 +818,11 @@
           </a:prstGeom>
         </p:spPr>
         <p:txBody>
-          <a:bodyPr lIns="0" rIns="0" tIns="0" bIns="0" anchor="ctr"/>
+          <a:bodyPr lIns="0" tIns="0" rIns="0" bIns="0" anchor="ctr"/>
+          <a:lstStyle/>
           <a:p>
             <a:pPr algn="ctr"/>
-            <a:endParaRPr b="0" lang="en-US" sz="3200" spc="-1" strike="noStrike">
+            <a:endParaRPr lang="en-US" sz="3200" b="0" strike="noStrike" spc="-1">
               <a:latin typeface="Arial"/>
             </a:endParaRPr>
           </a:p>
@@ -699,11 +830,14 @@
       </p:sp>
     </p:spTree>
   </p:cSld>
+  <p:clrMapOvr>
+    <a:masterClrMapping/>
+  </p:clrMapOvr>
 </p:sldLayout>
 </file>
 
 <file path=ppt/slideLayouts/slideLayout15.xml><?xml version="1.0" encoding="utf-8"?>
-<p:sldLayout xmlns:a="http://schemas.openxmlformats.org/drawingml/2006/main" xmlns:p="http://schemas.openxmlformats.org/presentationml/2006/main" xmlns:r="http://schemas.openxmlformats.org/officeDocument/2006/relationships" xmlns:p14="http://schemas.microsoft.com/office/powerpoint/2010/main" xmlns:p15="http://schemas.microsoft.com/office/powerpoint/2012/main" xmlns:mc="http://schemas.openxmlformats.org/markup-compatibility/2006" type="obj" preserve="1">
+<p:sldLayout xmlns:a="http://schemas.openxmlformats.org/drawingml/2006/main" xmlns:r="http://schemas.openxmlformats.org/officeDocument/2006/relationships" xmlns:p="http://schemas.openxmlformats.org/presentationml/2006/main" type="obj" preserve="1">
   <p:cSld name="Title, Content">
     <p:spTree>
       <p:nvGrpSpPr>
@@ -739,9 +873,10 @@
           </a:prstGeom>
         </p:spPr>
         <p:txBody>
-          <a:bodyPr lIns="0" rIns="0" tIns="0" bIns="0" anchor="ctr"/>
-          <a:p>
-            <a:endParaRPr b="0" lang="pl-PL" sz="2700" spc="-1" strike="noStrike">
+          <a:bodyPr lIns="0" tIns="0" rIns="0" bIns="0" anchor="ctr"/>
+          <a:lstStyle/>
+          <a:p>
+            <a:endParaRPr lang="pl-PL" sz="2700" b="0" strike="noStrike" spc="-1">
               <a:solidFill>
                 <a:srgbClr val="000000"/>
               </a:solidFill>
@@ -770,11 +905,12 @@
           </a:prstGeom>
         </p:spPr>
         <p:txBody>
-          <a:bodyPr lIns="0" rIns="0" tIns="0" bIns="0">
+          <a:bodyPr lIns="0" tIns="0" rIns="0" bIns="0">
             <a:normAutofit/>
           </a:bodyPr>
-          <a:p>
-            <a:endParaRPr b="0" lang="pl-PL" sz="2400" spc="-1" strike="noStrike">
+          <a:lstStyle/>
+          <a:p>
+            <a:endParaRPr lang="pl-PL" sz="2400" b="0" strike="noStrike" spc="-1">
               <a:solidFill>
                 <a:srgbClr val="000000"/>
               </a:solidFill>
@@ -785,11 +921,14 @@
       </p:sp>
     </p:spTree>
   </p:cSld>
+  <p:clrMapOvr>
+    <a:masterClrMapping/>
+  </p:clrMapOvr>
 </p:sldLayout>
 </file>
 
 <file path=ppt/slideLayouts/slideLayout16.xml><?xml version="1.0" encoding="utf-8"?>
-<p:sldLayout xmlns:a="http://schemas.openxmlformats.org/drawingml/2006/main" xmlns:p="http://schemas.openxmlformats.org/presentationml/2006/main" xmlns:r="http://schemas.openxmlformats.org/officeDocument/2006/relationships" xmlns:p14="http://schemas.microsoft.com/office/powerpoint/2010/main" xmlns:p15="http://schemas.microsoft.com/office/powerpoint/2012/main" xmlns:mc="http://schemas.openxmlformats.org/markup-compatibility/2006" type="twoObj" preserve="1">
+<p:sldLayout xmlns:a="http://schemas.openxmlformats.org/drawingml/2006/main" xmlns:r="http://schemas.openxmlformats.org/officeDocument/2006/relationships" xmlns:p="http://schemas.openxmlformats.org/presentationml/2006/main" type="twoObj" preserve="1">
   <p:cSld name="Title, 2 Content">
     <p:spTree>
       <p:nvGrpSpPr>
@@ -825,9 +964,10 @@
           </a:prstGeom>
         </p:spPr>
         <p:txBody>
-          <a:bodyPr lIns="0" rIns="0" tIns="0" bIns="0" anchor="ctr"/>
-          <a:p>
-            <a:endParaRPr b="0" lang="pl-PL" sz="2700" spc="-1" strike="noStrike">
+          <a:bodyPr lIns="0" tIns="0" rIns="0" bIns="0" anchor="ctr"/>
+          <a:lstStyle/>
+          <a:p>
+            <a:endParaRPr lang="pl-PL" sz="2700" b="0" strike="noStrike" spc="-1">
               <a:solidFill>
                 <a:srgbClr val="000000"/>
               </a:solidFill>
@@ -856,11 +996,12 @@
           </a:prstGeom>
         </p:spPr>
         <p:txBody>
-          <a:bodyPr lIns="0" rIns="0" tIns="0" bIns="0">
+          <a:bodyPr lIns="0" tIns="0" rIns="0" bIns="0">
             <a:normAutofit/>
           </a:bodyPr>
-          <a:p>
-            <a:endParaRPr b="0" lang="pl-PL" sz="2400" spc="-1" strike="noStrike">
+          <a:lstStyle/>
+          <a:p>
+            <a:endParaRPr lang="pl-PL" sz="2400" b="0" strike="noStrike" spc="-1">
               <a:solidFill>
                 <a:srgbClr val="000000"/>
               </a:solidFill>
@@ -889,11 +1030,12 @@
           </a:prstGeom>
         </p:spPr>
         <p:txBody>
-          <a:bodyPr lIns="0" rIns="0" tIns="0" bIns="0">
+          <a:bodyPr lIns="0" tIns="0" rIns="0" bIns="0">
             <a:normAutofit/>
           </a:bodyPr>
-          <a:p>
-            <a:endParaRPr b="0" lang="pl-PL" sz="2400" spc="-1" strike="noStrike">
+          <a:lstStyle/>
+          <a:p>
+            <a:endParaRPr lang="pl-PL" sz="2400" b="0" strike="noStrike" spc="-1">
               <a:solidFill>
                 <a:srgbClr val="000000"/>
               </a:solidFill>
@@ -904,11 +1046,14 @@
       </p:sp>
     </p:spTree>
   </p:cSld>
+  <p:clrMapOvr>
+    <a:masterClrMapping/>
+  </p:clrMapOvr>
 </p:sldLayout>
 </file>
 
 <file path=ppt/slideLayouts/slideLayout17.xml><?xml version="1.0" encoding="utf-8"?>
-<p:sldLayout xmlns:a="http://schemas.openxmlformats.org/drawingml/2006/main" xmlns:p="http://schemas.openxmlformats.org/presentationml/2006/main" xmlns:r="http://schemas.openxmlformats.org/officeDocument/2006/relationships" xmlns:p14="http://schemas.microsoft.com/office/powerpoint/2010/main" xmlns:p15="http://schemas.microsoft.com/office/powerpoint/2012/main" xmlns:mc="http://schemas.openxmlformats.org/markup-compatibility/2006" type="titleOnly" preserve="1">
+<p:sldLayout xmlns:a="http://schemas.openxmlformats.org/drawingml/2006/main" xmlns:r="http://schemas.openxmlformats.org/officeDocument/2006/relationships" xmlns:p="http://schemas.openxmlformats.org/presentationml/2006/main" type="titleOnly" preserve="1">
   <p:cSld name="Title Only">
     <p:spTree>
       <p:nvGrpSpPr>
@@ -944,9 +1089,10 @@
           </a:prstGeom>
         </p:spPr>
         <p:txBody>
-          <a:bodyPr lIns="0" rIns="0" tIns="0" bIns="0" anchor="ctr"/>
-          <a:p>
-            <a:endParaRPr b="0" lang="pl-PL" sz="2700" spc="-1" strike="noStrike">
+          <a:bodyPr lIns="0" tIns="0" rIns="0" bIns="0" anchor="ctr"/>
+          <a:lstStyle/>
+          <a:p>
+            <a:endParaRPr lang="pl-PL" sz="2700" b="0" strike="noStrike" spc="-1">
               <a:solidFill>
                 <a:srgbClr val="000000"/>
               </a:solidFill>
@@ -957,11 +1103,14 @@
       </p:sp>
     </p:spTree>
   </p:cSld>
+  <p:clrMapOvr>
+    <a:masterClrMapping/>
+  </p:clrMapOvr>
 </p:sldLayout>
 </file>
 
 <file path=ppt/slideLayouts/slideLayout18.xml><?xml version="1.0" encoding="utf-8"?>
-<p:sldLayout xmlns:a="http://schemas.openxmlformats.org/drawingml/2006/main" xmlns:p="http://schemas.openxmlformats.org/presentationml/2006/main" xmlns:r="http://schemas.openxmlformats.org/officeDocument/2006/relationships" xmlns:p14="http://schemas.microsoft.com/office/powerpoint/2010/main" xmlns:p15="http://schemas.microsoft.com/office/powerpoint/2012/main" xmlns:mc="http://schemas.openxmlformats.org/markup-compatibility/2006" type="objOnly" preserve="1">
+<p:sldLayout xmlns:a="http://schemas.openxmlformats.org/drawingml/2006/main" xmlns:r="http://schemas.openxmlformats.org/officeDocument/2006/relationships" xmlns:p="http://schemas.openxmlformats.org/presentationml/2006/main" type="objOnly" preserve="1">
   <p:cSld name="Centered Text">
     <p:spTree>
       <p:nvGrpSpPr>
@@ -997,10 +1146,11 @@
           </a:prstGeom>
         </p:spPr>
         <p:txBody>
-          <a:bodyPr lIns="0" rIns="0" tIns="0" bIns="0" anchor="ctr"/>
+          <a:bodyPr lIns="0" tIns="0" rIns="0" bIns="0" anchor="ctr"/>
+          <a:lstStyle/>
           <a:p>
             <a:pPr algn="ctr"/>
-            <a:endParaRPr b="0" lang="en-US" sz="3200" spc="-1" strike="noStrike">
+            <a:endParaRPr lang="en-US" sz="3200" b="0" strike="noStrike" spc="-1">
               <a:latin typeface="Arial"/>
             </a:endParaRPr>
           </a:p>
@@ -1008,11 +1158,14 @@
       </p:sp>
     </p:spTree>
   </p:cSld>
+  <p:clrMapOvr>
+    <a:masterClrMapping/>
+  </p:clrMapOvr>
 </p:sldLayout>
 </file>
 
 <file path=ppt/slideLayouts/slideLayout19.xml><?xml version="1.0" encoding="utf-8"?>
-<p:sldLayout xmlns:a="http://schemas.openxmlformats.org/drawingml/2006/main" xmlns:p="http://schemas.openxmlformats.org/presentationml/2006/main" xmlns:r="http://schemas.openxmlformats.org/officeDocument/2006/relationships" xmlns:p14="http://schemas.microsoft.com/office/powerpoint/2010/main" xmlns:p15="http://schemas.microsoft.com/office/powerpoint/2012/main" xmlns:mc="http://schemas.openxmlformats.org/markup-compatibility/2006" type="twoObjAndObj" preserve="1">
+<p:sldLayout xmlns:a="http://schemas.openxmlformats.org/drawingml/2006/main" xmlns:r="http://schemas.openxmlformats.org/officeDocument/2006/relationships" xmlns:p="http://schemas.openxmlformats.org/presentationml/2006/main" type="twoObjAndObj" preserve="1">
   <p:cSld name="Title, 2 Content and Content">
     <p:spTree>
       <p:nvGrpSpPr>
@@ -1048,9 +1201,10 @@
           </a:prstGeom>
         </p:spPr>
         <p:txBody>
-          <a:bodyPr lIns="0" rIns="0" tIns="0" bIns="0" anchor="ctr"/>
-          <a:p>
-            <a:endParaRPr b="0" lang="pl-PL" sz="2700" spc="-1" strike="noStrike">
+          <a:bodyPr lIns="0" tIns="0" rIns="0" bIns="0" anchor="ctr"/>
+          <a:lstStyle/>
+          <a:p>
+            <a:endParaRPr lang="pl-PL" sz="2700" b="0" strike="noStrike" spc="-1">
               <a:solidFill>
                 <a:srgbClr val="000000"/>
               </a:solidFill>
@@ -1079,11 +1233,12 @@
           </a:prstGeom>
         </p:spPr>
         <p:txBody>
-          <a:bodyPr lIns="0" rIns="0" tIns="0" bIns="0">
+          <a:bodyPr lIns="0" tIns="0" rIns="0" bIns="0">
             <a:normAutofit/>
           </a:bodyPr>
-          <a:p>
-            <a:endParaRPr b="0" lang="pl-PL" sz="2400" spc="-1" strike="noStrike">
+          <a:lstStyle/>
+          <a:p>
+            <a:endParaRPr lang="pl-PL" sz="2400" b="0" strike="noStrike" spc="-1">
               <a:solidFill>
                 <a:srgbClr val="000000"/>
               </a:solidFill>
@@ -1112,11 +1267,12 @@
           </a:prstGeom>
         </p:spPr>
         <p:txBody>
-          <a:bodyPr lIns="0" rIns="0" tIns="0" bIns="0">
+          <a:bodyPr lIns="0" tIns="0" rIns="0" bIns="0">
             <a:normAutofit/>
           </a:bodyPr>
-          <a:p>
-            <a:endParaRPr b="0" lang="pl-PL" sz="2400" spc="-1" strike="noStrike">
+          <a:lstStyle/>
+          <a:p>
+            <a:endParaRPr lang="pl-PL" sz="2400" b="0" strike="noStrike" spc="-1">
               <a:solidFill>
                 <a:srgbClr val="000000"/>
               </a:solidFill>
@@ -1145,11 +1301,12 @@
           </a:prstGeom>
         </p:spPr>
         <p:txBody>
-          <a:bodyPr lIns="0" rIns="0" tIns="0" bIns="0">
+          <a:bodyPr lIns="0" tIns="0" rIns="0" bIns="0">
             <a:normAutofit/>
           </a:bodyPr>
-          <a:p>
-            <a:endParaRPr b="0" lang="pl-PL" sz="2400" spc="-1" strike="noStrike">
+          <a:lstStyle/>
+          <a:p>
+            <a:endParaRPr lang="pl-PL" sz="2400" b="0" strike="noStrike" spc="-1">
               <a:solidFill>
                 <a:srgbClr val="000000"/>
               </a:solidFill>
@@ -1160,11 +1317,14 @@
       </p:sp>
     </p:spTree>
   </p:cSld>
+  <p:clrMapOvr>
+    <a:masterClrMapping/>
+  </p:clrMapOvr>
 </p:sldLayout>
 </file>
 
 <file path=ppt/slideLayouts/slideLayout2.xml><?xml version="1.0" encoding="utf-8"?>
-<p:sldLayout xmlns:a="http://schemas.openxmlformats.org/drawingml/2006/main" xmlns:p="http://schemas.openxmlformats.org/presentationml/2006/main" xmlns:r="http://schemas.openxmlformats.org/officeDocument/2006/relationships" xmlns:p14="http://schemas.microsoft.com/office/powerpoint/2010/main" xmlns:p15="http://schemas.microsoft.com/office/powerpoint/2012/main" xmlns:mc="http://schemas.openxmlformats.org/markup-compatibility/2006" type="tx" preserve="1">
+<p:sldLayout xmlns:a="http://schemas.openxmlformats.org/drawingml/2006/main" xmlns:r="http://schemas.openxmlformats.org/officeDocument/2006/relationships" xmlns:p="http://schemas.openxmlformats.org/presentationml/2006/main" type="tx" preserve="1">
   <p:cSld name="Title Slide">
     <p:spTree>
       <p:nvGrpSpPr>
@@ -1200,9 +1360,10 @@
           </a:prstGeom>
         </p:spPr>
         <p:txBody>
-          <a:bodyPr lIns="0" rIns="0" tIns="0" bIns="0" anchor="ctr"/>
-          <a:p>
-            <a:endParaRPr b="0" lang="pl-PL" sz="2700" spc="-1" strike="noStrike">
+          <a:bodyPr lIns="0" tIns="0" rIns="0" bIns="0" anchor="ctr"/>
+          <a:lstStyle/>
+          <a:p>
+            <a:endParaRPr lang="pl-PL" sz="2700" b="0" strike="noStrike" spc="-1">
               <a:solidFill>
                 <a:srgbClr val="000000"/>
               </a:solidFill>
@@ -1231,10 +1392,11 @@
           </a:prstGeom>
         </p:spPr>
         <p:txBody>
-          <a:bodyPr lIns="0" rIns="0" tIns="0" bIns="0" anchor="ctr"/>
+          <a:bodyPr lIns="0" tIns="0" rIns="0" bIns="0" anchor="ctr"/>
+          <a:lstStyle/>
           <a:p>
             <a:pPr algn="ctr"/>
-            <a:endParaRPr b="0" lang="en-US" sz="3200" spc="-1" strike="noStrike">
+            <a:endParaRPr lang="en-US" sz="3200" b="0" strike="noStrike" spc="-1">
               <a:latin typeface="Arial"/>
             </a:endParaRPr>
           </a:p>
@@ -1242,11 +1404,14 @@
       </p:sp>
     </p:spTree>
   </p:cSld>
+  <p:clrMapOvr>
+    <a:masterClrMapping/>
+  </p:clrMapOvr>
 </p:sldLayout>
 </file>
 
 <file path=ppt/slideLayouts/slideLayout20.xml><?xml version="1.0" encoding="utf-8"?>
-<p:sldLayout xmlns:a="http://schemas.openxmlformats.org/drawingml/2006/main" xmlns:p="http://schemas.openxmlformats.org/presentationml/2006/main" xmlns:r="http://schemas.openxmlformats.org/officeDocument/2006/relationships" xmlns:p14="http://schemas.microsoft.com/office/powerpoint/2010/main" xmlns:p15="http://schemas.microsoft.com/office/powerpoint/2012/main" xmlns:mc="http://schemas.openxmlformats.org/markup-compatibility/2006" type="objAndTwoObj" preserve="1">
+<p:sldLayout xmlns:a="http://schemas.openxmlformats.org/drawingml/2006/main" xmlns:r="http://schemas.openxmlformats.org/officeDocument/2006/relationships" xmlns:p="http://schemas.openxmlformats.org/presentationml/2006/main" type="objAndTwoObj" preserve="1">
   <p:cSld name="Title Content and 2 Content">
     <p:spTree>
       <p:nvGrpSpPr>
@@ -1282,9 +1447,10 @@
           </a:prstGeom>
         </p:spPr>
         <p:txBody>
-          <a:bodyPr lIns="0" rIns="0" tIns="0" bIns="0" anchor="ctr"/>
-          <a:p>
-            <a:endParaRPr b="0" lang="pl-PL" sz="2700" spc="-1" strike="noStrike">
+          <a:bodyPr lIns="0" tIns="0" rIns="0" bIns="0" anchor="ctr"/>
+          <a:lstStyle/>
+          <a:p>
+            <a:endParaRPr lang="pl-PL" sz="2700" b="0" strike="noStrike" spc="-1">
               <a:solidFill>
                 <a:srgbClr val="000000"/>
               </a:solidFill>
@@ -1313,11 +1479,12 @@
           </a:prstGeom>
         </p:spPr>
         <p:txBody>
-          <a:bodyPr lIns="0" rIns="0" tIns="0" bIns="0">
+          <a:bodyPr lIns="0" tIns="0" rIns="0" bIns="0">
             <a:normAutofit/>
           </a:bodyPr>
-          <a:p>
-            <a:endParaRPr b="0" lang="pl-PL" sz="2400" spc="-1" strike="noStrike">
+          <a:lstStyle/>
+          <a:p>
+            <a:endParaRPr lang="pl-PL" sz="2400" b="0" strike="noStrike" spc="-1">
               <a:solidFill>
                 <a:srgbClr val="000000"/>
               </a:solidFill>
@@ -1346,11 +1513,12 @@
           </a:prstGeom>
         </p:spPr>
         <p:txBody>
-          <a:bodyPr lIns="0" rIns="0" tIns="0" bIns="0">
+          <a:bodyPr lIns="0" tIns="0" rIns="0" bIns="0">
             <a:normAutofit/>
           </a:bodyPr>
-          <a:p>
-            <a:endParaRPr b="0" lang="pl-PL" sz="2400" spc="-1" strike="noStrike">
+          <a:lstStyle/>
+          <a:p>
+            <a:endParaRPr lang="pl-PL" sz="2400" b="0" strike="noStrike" spc="-1">
               <a:solidFill>
                 <a:srgbClr val="000000"/>
               </a:solidFill>
@@ -1379,11 +1547,12 @@
           </a:prstGeom>
         </p:spPr>
         <p:txBody>
-          <a:bodyPr lIns="0" rIns="0" tIns="0" bIns="0">
+          <a:bodyPr lIns="0" tIns="0" rIns="0" bIns="0">
             <a:normAutofit/>
           </a:bodyPr>
-          <a:p>
-            <a:endParaRPr b="0" lang="pl-PL" sz="2400" spc="-1" strike="noStrike">
+          <a:lstStyle/>
+          <a:p>
+            <a:endParaRPr lang="pl-PL" sz="2400" b="0" strike="noStrike" spc="-1">
               <a:solidFill>
                 <a:srgbClr val="000000"/>
               </a:solidFill>
@@ -1394,11 +1563,14 @@
       </p:sp>
     </p:spTree>
   </p:cSld>
+  <p:clrMapOvr>
+    <a:masterClrMapping/>
+  </p:clrMapOvr>
 </p:sldLayout>
 </file>
 
 <file path=ppt/slideLayouts/slideLayout21.xml><?xml version="1.0" encoding="utf-8"?>
-<p:sldLayout xmlns:a="http://schemas.openxmlformats.org/drawingml/2006/main" xmlns:p="http://schemas.openxmlformats.org/presentationml/2006/main" xmlns:r="http://schemas.openxmlformats.org/officeDocument/2006/relationships" xmlns:p14="http://schemas.microsoft.com/office/powerpoint/2010/main" xmlns:p15="http://schemas.microsoft.com/office/powerpoint/2012/main" xmlns:mc="http://schemas.openxmlformats.org/markup-compatibility/2006" type="twoObjOverTx" preserve="1">
+<p:sldLayout xmlns:a="http://schemas.openxmlformats.org/drawingml/2006/main" xmlns:r="http://schemas.openxmlformats.org/officeDocument/2006/relationships" xmlns:p="http://schemas.openxmlformats.org/presentationml/2006/main" type="twoObjOverTx" preserve="1">
   <p:cSld name="Title, 2 Content over Content">
     <p:spTree>
       <p:nvGrpSpPr>
@@ -1434,9 +1606,10 @@
           </a:prstGeom>
         </p:spPr>
         <p:txBody>
-          <a:bodyPr lIns="0" rIns="0" tIns="0" bIns="0" anchor="ctr"/>
-          <a:p>
-            <a:endParaRPr b="0" lang="pl-PL" sz="2700" spc="-1" strike="noStrike">
+          <a:bodyPr lIns="0" tIns="0" rIns="0" bIns="0" anchor="ctr"/>
+          <a:lstStyle/>
+          <a:p>
+            <a:endParaRPr lang="pl-PL" sz="2700" b="0" strike="noStrike" spc="-1">
               <a:solidFill>
                 <a:srgbClr val="000000"/>
               </a:solidFill>
@@ -1465,11 +1638,12 @@
           </a:prstGeom>
         </p:spPr>
         <p:txBody>
-          <a:bodyPr lIns="0" rIns="0" tIns="0" bIns="0">
+          <a:bodyPr lIns="0" tIns="0" rIns="0" bIns="0">
             <a:normAutofit/>
           </a:bodyPr>
-          <a:p>
-            <a:endParaRPr b="0" lang="pl-PL" sz="2400" spc="-1" strike="noStrike">
+          <a:lstStyle/>
+          <a:p>
+            <a:endParaRPr lang="pl-PL" sz="2400" b="0" strike="noStrike" spc="-1">
               <a:solidFill>
                 <a:srgbClr val="000000"/>
               </a:solidFill>
@@ -1498,11 +1672,12 @@
           </a:prstGeom>
         </p:spPr>
         <p:txBody>
-          <a:bodyPr lIns="0" rIns="0" tIns="0" bIns="0">
+          <a:bodyPr lIns="0" tIns="0" rIns="0" bIns="0">
             <a:normAutofit/>
           </a:bodyPr>
-          <a:p>
-            <a:endParaRPr b="0" lang="pl-PL" sz="2400" spc="-1" strike="noStrike">
+          <a:lstStyle/>
+          <a:p>
+            <a:endParaRPr lang="pl-PL" sz="2400" b="0" strike="noStrike" spc="-1">
               <a:solidFill>
                 <a:srgbClr val="000000"/>
               </a:solidFill>
@@ -1531,11 +1706,12 @@
           </a:prstGeom>
         </p:spPr>
         <p:txBody>
-          <a:bodyPr lIns="0" rIns="0" tIns="0" bIns="0">
+          <a:bodyPr lIns="0" tIns="0" rIns="0" bIns="0">
             <a:normAutofit/>
           </a:bodyPr>
-          <a:p>
-            <a:endParaRPr b="0" lang="pl-PL" sz="2400" spc="-1" strike="noStrike">
+          <a:lstStyle/>
+          <a:p>
+            <a:endParaRPr lang="pl-PL" sz="2400" b="0" strike="noStrike" spc="-1">
               <a:solidFill>
                 <a:srgbClr val="000000"/>
               </a:solidFill>
@@ -1546,11 +1722,14 @@
       </p:sp>
     </p:spTree>
   </p:cSld>
+  <p:clrMapOvr>
+    <a:masterClrMapping/>
+  </p:clrMapOvr>
 </p:sldLayout>
 </file>
 
 <file path=ppt/slideLayouts/slideLayout22.xml><?xml version="1.0" encoding="utf-8"?>
-<p:sldLayout xmlns:a="http://schemas.openxmlformats.org/drawingml/2006/main" xmlns:p="http://schemas.openxmlformats.org/presentationml/2006/main" xmlns:r="http://schemas.openxmlformats.org/officeDocument/2006/relationships" xmlns:p14="http://schemas.microsoft.com/office/powerpoint/2010/main" xmlns:p15="http://schemas.microsoft.com/office/powerpoint/2012/main" xmlns:mc="http://schemas.openxmlformats.org/markup-compatibility/2006" type="objOverTx" preserve="1">
+<p:sldLayout xmlns:a="http://schemas.openxmlformats.org/drawingml/2006/main" xmlns:r="http://schemas.openxmlformats.org/officeDocument/2006/relationships" xmlns:p="http://schemas.openxmlformats.org/presentationml/2006/main" type="objOverTx" preserve="1">
   <p:cSld name="Title, Content over Content">
     <p:spTree>
       <p:nvGrpSpPr>
@@ -1586,9 +1765,10 @@
           </a:prstGeom>
         </p:spPr>
         <p:txBody>
-          <a:bodyPr lIns="0" rIns="0" tIns="0" bIns="0" anchor="ctr"/>
-          <a:p>
-            <a:endParaRPr b="0" lang="pl-PL" sz="2700" spc="-1" strike="noStrike">
+          <a:bodyPr lIns="0" tIns="0" rIns="0" bIns="0" anchor="ctr"/>
+          <a:lstStyle/>
+          <a:p>
+            <a:endParaRPr lang="pl-PL" sz="2700" b="0" strike="noStrike" spc="-1">
               <a:solidFill>
                 <a:srgbClr val="000000"/>
               </a:solidFill>
@@ -1617,11 +1797,12 @@
           </a:prstGeom>
         </p:spPr>
         <p:txBody>
-          <a:bodyPr lIns="0" rIns="0" tIns="0" bIns="0">
+          <a:bodyPr lIns="0" tIns="0" rIns="0" bIns="0">
             <a:normAutofit/>
           </a:bodyPr>
-          <a:p>
-            <a:endParaRPr b="0" lang="pl-PL" sz="2400" spc="-1" strike="noStrike">
+          <a:lstStyle/>
+          <a:p>
+            <a:endParaRPr lang="pl-PL" sz="2400" b="0" strike="noStrike" spc="-1">
               <a:solidFill>
                 <a:srgbClr val="000000"/>
               </a:solidFill>
@@ -1650,11 +1831,12 @@
           </a:prstGeom>
         </p:spPr>
         <p:txBody>
-          <a:bodyPr lIns="0" rIns="0" tIns="0" bIns="0">
+          <a:bodyPr lIns="0" tIns="0" rIns="0" bIns="0">
             <a:normAutofit/>
           </a:bodyPr>
-          <a:p>
-            <a:endParaRPr b="0" lang="pl-PL" sz="2400" spc="-1" strike="noStrike">
+          <a:lstStyle/>
+          <a:p>
+            <a:endParaRPr lang="pl-PL" sz="2400" b="0" strike="noStrike" spc="-1">
               <a:solidFill>
                 <a:srgbClr val="000000"/>
               </a:solidFill>
@@ -1665,11 +1847,14 @@
       </p:sp>
     </p:spTree>
   </p:cSld>
+  <p:clrMapOvr>
+    <a:masterClrMapping/>
+  </p:clrMapOvr>
 </p:sldLayout>
 </file>
 
 <file path=ppt/slideLayouts/slideLayout23.xml><?xml version="1.0" encoding="utf-8"?>
-<p:sldLayout xmlns:a="http://schemas.openxmlformats.org/drawingml/2006/main" xmlns:p="http://schemas.openxmlformats.org/presentationml/2006/main" xmlns:r="http://schemas.openxmlformats.org/officeDocument/2006/relationships" xmlns:p14="http://schemas.microsoft.com/office/powerpoint/2010/main" xmlns:p15="http://schemas.microsoft.com/office/powerpoint/2012/main" xmlns:mc="http://schemas.openxmlformats.org/markup-compatibility/2006" type="fourObj" preserve="1">
+<p:sldLayout xmlns:a="http://schemas.openxmlformats.org/drawingml/2006/main" xmlns:r="http://schemas.openxmlformats.org/officeDocument/2006/relationships" xmlns:p="http://schemas.openxmlformats.org/presentationml/2006/main" type="fourObj" preserve="1">
   <p:cSld name="Title, 4 Content">
     <p:spTree>
       <p:nvGrpSpPr>
@@ -1705,9 +1890,10 @@
           </a:prstGeom>
         </p:spPr>
         <p:txBody>
-          <a:bodyPr lIns="0" rIns="0" tIns="0" bIns="0" anchor="ctr"/>
-          <a:p>
-            <a:endParaRPr b="0" lang="pl-PL" sz="2700" spc="-1" strike="noStrike">
+          <a:bodyPr lIns="0" tIns="0" rIns="0" bIns="0" anchor="ctr"/>
+          <a:lstStyle/>
+          <a:p>
+            <a:endParaRPr lang="pl-PL" sz="2700" b="0" strike="noStrike" spc="-1">
               <a:solidFill>
                 <a:srgbClr val="000000"/>
               </a:solidFill>
@@ -1736,11 +1922,12 @@
           </a:prstGeom>
         </p:spPr>
         <p:txBody>
-          <a:bodyPr lIns="0" rIns="0" tIns="0" bIns="0">
+          <a:bodyPr lIns="0" tIns="0" rIns="0" bIns="0">
             <a:normAutofit/>
           </a:bodyPr>
-          <a:p>
-            <a:endParaRPr b="0" lang="pl-PL" sz="2400" spc="-1" strike="noStrike">
+          <a:lstStyle/>
+          <a:p>
+            <a:endParaRPr lang="pl-PL" sz="2400" b="0" strike="noStrike" spc="-1">
               <a:solidFill>
                 <a:srgbClr val="000000"/>
               </a:solidFill>
@@ -1769,11 +1956,12 @@
           </a:prstGeom>
         </p:spPr>
         <p:txBody>
-          <a:bodyPr lIns="0" rIns="0" tIns="0" bIns="0">
+          <a:bodyPr lIns="0" tIns="0" rIns="0" bIns="0">
             <a:normAutofit/>
           </a:bodyPr>
-          <a:p>
-            <a:endParaRPr b="0" lang="pl-PL" sz="2400" spc="-1" strike="noStrike">
+          <a:lstStyle/>
+          <a:p>
+            <a:endParaRPr lang="pl-PL" sz="2400" b="0" strike="noStrike" spc="-1">
               <a:solidFill>
                 <a:srgbClr val="000000"/>
               </a:solidFill>
@@ -1802,11 +1990,12 @@
           </a:prstGeom>
         </p:spPr>
         <p:txBody>
-          <a:bodyPr lIns="0" rIns="0" tIns="0" bIns="0">
+          <a:bodyPr lIns="0" tIns="0" rIns="0" bIns="0">
             <a:normAutofit/>
           </a:bodyPr>
-          <a:p>
-            <a:endParaRPr b="0" lang="pl-PL" sz="2400" spc="-1" strike="noStrike">
+          <a:lstStyle/>
+          <a:p>
+            <a:endParaRPr lang="pl-PL" sz="2400" b="0" strike="noStrike" spc="-1">
               <a:solidFill>
                 <a:srgbClr val="000000"/>
               </a:solidFill>
@@ -1835,11 +2024,12 @@
           </a:prstGeom>
         </p:spPr>
         <p:txBody>
-          <a:bodyPr lIns="0" rIns="0" tIns="0" bIns="0">
+          <a:bodyPr lIns="0" tIns="0" rIns="0" bIns="0">
             <a:normAutofit/>
           </a:bodyPr>
-          <a:p>
-            <a:endParaRPr b="0" lang="pl-PL" sz="2400" spc="-1" strike="noStrike">
+          <a:lstStyle/>
+          <a:p>
+            <a:endParaRPr lang="pl-PL" sz="2400" b="0" strike="noStrike" spc="-1">
               <a:solidFill>
                 <a:srgbClr val="000000"/>
               </a:solidFill>
@@ -1850,11 +2040,14 @@
       </p:sp>
     </p:spTree>
   </p:cSld>
+  <p:clrMapOvr>
+    <a:masterClrMapping/>
+  </p:clrMapOvr>
 </p:sldLayout>
 </file>
 
 <file path=ppt/slideLayouts/slideLayout24.xml><?xml version="1.0" encoding="utf-8"?>
-<p:sldLayout xmlns:a="http://schemas.openxmlformats.org/drawingml/2006/main" xmlns:p="http://schemas.openxmlformats.org/presentationml/2006/main" xmlns:r="http://schemas.openxmlformats.org/officeDocument/2006/relationships" xmlns:p14="http://schemas.microsoft.com/office/powerpoint/2010/main" xmlns:p15="http://schemas.microsoft.com/office/powerpoint/2012/main" xmlns:mc="http://schemas.openxmlformats.org/markup-compatibility/2006" type="blank" preserve="1">
+<p:sldLayout xmlns:a="http://schemas.openxmlformats.org/drawingml/2006/main" xmlns:r="http://schemas.openxmlformats.org/officeDocument/2006/relationships" xmlns:p="http://schemas.openxmlformats.org/presentationml/2006/main" type="blank" preserve="1">
   <p:cSld name="Title, 6 Content">
     <p:spTree>
       <p:nvGrpSpPr>
@@ -1890,9 +2083,10 @@
           </a:prstGeom>
         </p:spPr>
         <p:txBody>
-          <a:bodyPr lIns="0" rIns="0" tIns="0" bIns="0" anchor="ctr"/>
-          <a:p>
-            <a:endParaRPr b="0" lang="pl-PL" sz="2700" spc="-1" strike="noStrike">
+          <a:bodyPr lIns="0" tIns="0" rIns="0" bIns="0" anchor="ctr"/>
+          <a:lstStyle/>
+          <a:p>
+            <a:endParaRPr lang="pl-PL" sz="2700" b="0" strike="noStrike" spc="-1">
               <a:solidFill>
                 <a:srgbClr val="000000"/>
               </a:solidFill>
@@ -1921,11 +2115,12 @@
           </a:prstGeom>
         </p:spPr>
         <p:txBody>
-          <a:bodyPr lIns="0" rIns="0" tIns="0" bIns="0">
+          <a:bodyPr lIns="0" tIns="0" rIns="0" bIns="0">
             <a:normAutofit/>
           </a:bodyPr>
-          <a:p>
-            <a:endParaRPr b="0" lang="pl-PL" sz="2400" spc="-1" strike="noStrike">
+          <a:lstStyle/>
+          <a:p>
+            <a:endParaRPr lang="pl-PL" sz="2400" b="0" strike="noStrike" spc="-1">
               <a:solidFill>
                 <a:srgbClr val="000000"/>
               </a:solidFill>
@@ -1954,11 +2149,12 @@
           </a:prstGeom>
         </p:spPr>
         <p:txBody>
-          <a:bodyPr lIns="0" rIns="0" tIns="0" bIns="0">
+          <a:bodyPr lIns="0" tIns="0" rIns="0" bIns="0">
             <a:normAutofit/>
           </a:bodyPr>
-          <a:p>
-            <a:endParaRPr b="0" lang="pl-PL" sz="2400" spc="-1" strike="noStrike">
+          <a:lstStyle/>
+          <a:p>
+            <a:endParaRPr lang="pl-PL" sz="2400" b="0" strike="noStrike" spc="-1">
               <a:solidFill>
                 <a:srgbClr val="000000"/>
               </a:solidFill>
@@ -1987,11 +2183,12 @@
           </a:prstGeom>
         </p:spPr>
         <p:txBody>
-          <a:bodyPr lIns="0" rIns="0" tIns="0" bIns="0">
+          <a:bodyPr lIns="0" tIns="0" rIns="0" bIns="0">
             <a:normAutofit/>
           </a:bodyPr>
-          <a:p>
-            <a:endParaRPr b="0" lang="pl-PL" sz="2400" spc="-1" strike="noStrike">
+          <a:lstStyle/>
+          <a:p>
+            <a:endParaRPr lang="pl-PL" sz="2400" b="0" strike="noStrike" spc="-1">
               <a:solidFill>
                 <a:srgbClr val="000000"/>
               </a:solidFill>
@@ -2020,11 +2217,12 @@
           </a:prstGeom>
         </p:spPr>
         <p:txBody>
-          <a:bodyPr lIns="0" rIns="0" tIns="0" bIns="0">
+          <a:bodyPr lIns="0" tIns="0" rIns="0" bIns="0">
             <a:normAutofit/>
           </a:bodyPr>
-          <a:p>
-            <a:endParaRPr b="0" lang="pl-PL" sz="2400" spc="-1" strike="noStrike">
+          <a:lstStyle/>
+          <a:p>
+            <a:endParaRPr lang="pl-PL" sz="2400" b="0" strike="noStrike" spc="-1">
               <a:solidFill>
                 <a:srgbClr val="000000"/>
               </a:solidFill>
@@ -2053,11 +2251,12 @@
           </a:prstGeom>
         </p:spPr>
         <p:txBody>
-          <a:bodyPr lIns="0" rIns="0" tIns="0" bIns="0">
+          <a:bodyPr lIns="0" tIns="0" rIns="0" bIns="0">
             <a:normAutofit/>
           </a:bodyPr>
-          <a:p>
-            <a:endParaRPr b="0" lang="pl-PL" sz="2400" spc="-1" strike="noStrike">
+          <a:lstStyle/>
+          <a:p>
+            <a:endParaRPr lang="pl-PL" sz="2400" b="0" strike="noStrike" spc="-1">
               <a:solidFill>
                 <a:srgbClr val="000000"/>
               </a:solidFill>
@@ -2086,11 +2285,12 @@
           </a:prstGeom>
         </p:spPr>
         <p:txBody>
-          <a:bodyPr lIns="0" rIns="0" tIns="0" bIns="0">
+          <a:bodyPr lIns="0" tIns="0" rIns="0" bIns="0">
             <a:normAutofit/>
           </a:bodyPr>
-          <a:p>
-            <a:endParaRPr b="0" lang="pl-PL" sz="2400" spc="-1" strike="noStrike">
+          <a:lstStyle/>
+          <a:p>
+            <a:endParaRPr lang="pl-PL" sz="2400" b="0" strike="noStrike" spc="-1">
               <a:solidFill>
                 <a:srgbClr val="000000"/>
               </a:solidFill>
@@ -2101,11 +2301,14 @@
       </p:sp>
     </p:spTree>
   </p:cSld>
+  <p:clrMapOvr>
+    <a:masterClrMapping/>
+  </p:clrMapOvr>
 </p:sldLayout>
 </file>
 
 <file path=ppt/slideLayouts/slideLayout3.xml><?xml version="1.0" encoding="utf-8"?>
-<p:sldLayout xmlns:a="http://schemas.openxmlformats.org/drawingml/2006/main" xmlns:p="http://schemas.openxmlformats.org/presentationml/2006/main" xmlns:r="http://schemas.openxmlformats.org/officeDocument/2006/relationships" xmlns:p14="http://schemas.microsoft.com/office/powerpoint/2010/main" xmlns:p15="http://schemas.microsoft.com/office/powerpoint/2012/main" xmlns:mc="http://schemas.openxmlformats.org/markup-compatibility/2006" type="obj" preserve="1">
+<p:sldLayout xmlns:a="http://schemas.openxmlformats.org/drawingml/2006/main" xmlns:r="http://schemas.openxmlformats.org/officeDocument/2006/relationships" xmlns:p="http://schemas.openxmlformats.org/presentationml/2006/main" type="obj" preserve="1">
   <p:cSld name="Title, Content">
     <p:spTree>
       <p:nvGrpSpPr>
@@ -2141,9 +2344,10 @@
           </a:prstGeom>
         </p:spPr>
         <p:txBody>
-          <a:bodyPr lIns="0" rIns="0" tIns="0" bIns="0" anchor="ctr"/>
-          <a:p>
-            <a:endParaRPr b="0" lang="pl-PL" sz="2700" spc="-1" strike="noStrike">
+          <a:bodyPr lIns="0" tIns="0" rIns="0" bIns="0" anchor="ctr"/>
+          <a:lstStyle/>
+          <a:p>
+            <a:endParaRPr lang="pl-PL" sz="2700" b="0" strike="noStrike" spc="-1">
               <a:solidFill>
                 <a:srgbClr val="000000"/>
               </a:solidFill>
@@ -2172,11 +2376,12 @@
           </a:prstGeom>
         </p:spPr>
         <p:txBody>
-          <a:bodyPr lIns="0" rIns="0" tIns="0" bIns="0">
+          <a:bodyPr lIns="0" tIns="0" rIns="0" bIns="0">
             <a:normAutofit/>
           </a:bodyPr>
-          <a:p>
-            <a:endParaRPr b="0" lang="pl-PL" sz="2400" spc="-1" strike="noStrike">
+          <a:lstStyle/>
+          <a:p>
+            <a:endParaRPr lang="pl-PL" sz="2400" b="0" strike="noStrike" spc="-1">
               <a:solidFill>
                 <a:srgbClr val="000000"/>
               </a:solidFill>
@@ -2187,11 +2392,14 @@
       </p:sp>
     </p:spTree>
   </p:cSld>
+  <p:clrMapOvr>
+    <a:masterClrMapping/>
+  </p:clrMapOvr>
 </p:sldLayout>
 </file>
 
 <file path=ppt/slideLayouts/slideLayout4.xml><?xml version="1.0" encoding="utf-8"?>
-<p:sldLayout xmlns:a="http://schemas.openxmlformats.org/drawingml/2006/main" xmlns:p="http://schemas.openxmlformats.org/presentationml/2006/main" xmlns:r="http://schemas.openxmlformats.org/officeDocument/2006/relationships" xmlns:p14="http://schemas.microsoft.com/office/powerpoint/2010/main" xmlns:p15="http://schemas.microsoft.com/office/powerpoint/2012/main" xmlns:mc="http://schemas.openxmlformats.org/markup-compatibility/2006" type="twoObj" preserve="1">
+<p:sldLayout xmlns:a="http://schemas.openxmlformats.org/drawingml/2006/main" xmlns:r="http://schemas.openxmlformats.org/officeDocument/2006/relationships" xmlns:p="http://schemas.openxmlformats.org/presentationml/2006/main" type="twoObj" preserve="1">
   <p:cSld name="Title, 2 Content">
     <p:spTree>
       <p:nvGrpSpPr>
@@ -2227,9 +2435,10 @@
           </a:prstGeom>
         </p:spPr>
         <p:txBody>
-          <a:bodyPr lIns="0" rIns="0" tIns="0" bIns="0" anchor="ctr"/>
-          <a:p>
-            <a:endParaRPr b="0" lang="pl-PL" sz="2700" spc="-1" strike="noStrike">
+          <a:bodyPr lIns="0" tIns="0" rIns="0" bIns="0" anchor="ctr"/>
+          <a:lstStyle/>
+          <a:p>
+            <a:endParaRPr lang="pl-PL" sz="2700" b="0" strike="noStrike" spc="-1">
               <a:solidFill>
                 <a:srgbClr val="000000"/>
               </a:solidFill>
@@ -2258,11 +2467,12 @@
           </a:prstGeom>
         </p:spPr>
         <p:txBody>
-          <a:bodyPr lIns="0" rIns="0" tIns="0" bIns="0">
+          <a:bodyPr lIns="0" tIns="0" rIns="0" bIns="0">
             <a:normAutofit/>
           </a:bodyPr>
-          <a:p>
-            <a:endParaRPr b="0" lang="pl-PL" sz="2400" spc="-1" strike="noStrike">
+          <a:lstStyle/>
+          <a:p>
+            <a:endParaRPr lang="pl-PL" sz="2400" b="0" strike="noStrike" spc="-1">
               <a:solidFill>
                 <a:srgbClr val="000000"/>
               </a:solidFill>
@@ -2291,11 +2501,12 @@
           </a:prstGeom>
         </p:spPr>
         <p:txBody>
-          <a:bodyPr lIns="0" rIns="0" tIns="0" bIns="0">
+          <a:bodyPr lIns="0" tIns="0" rIns="0" bIns="0">
             <a:normAutofit/>
           </a:bodyPr>
-          <a:p>
-            <a:endParaRPr b="0" lang="pl-PL" sz="2400" spc="-1" strike="noStrike">
+          <a:lstStyle/>
+          <a:p>
+            <a:endParaRPr lang="pl-PL" sz="2400" b="0" strike="noStrike" spc="-1">
               <a:solidFill>
                 <a:srgbClr val="000000"/>
               </a:solidFill>
@@ -2306,11 +2517,14 @@
       </p:sp>
     </p:spTree>
   </p:cSld>
+  <p:clrMapOvr>
+    <a:masterClrMapping/>
+  </p:clrMapOvr>
 </p:sldLayout>
 </file>
 
 <file path=ppt/slideLayouts/slideLayout5.xml><?xml version="1.0" encoding="utf-8"?>
-<p:sldLayout xmlns:a="http://schemas.openxmlformats.org/drawingml/2006/main" xmlns:p="http://schemas.openxmlformats.org/presentationml/2006/main" xmlns:r="http://schemas.openxmlformats.org/officeDocument/2006/relationships" xmlns:p14="http://schemas.microsoft.com/office/powerpoint/2010/main" xmlns:p15="http://schemas.microsoft.com/office/powerpoint/2012/main" xmlns:mc="http://schemas.openxmlformats.org/markup-compatibility/2006" type="titleOnly" preserve="1">
+<p:sldLayout xmlns:a="http://schemas.openxmlformats.org/drawingml/2006/main" xmlns:r="http://schemas.openxmlformats.org/officeDocument/2006/relationships" xmlns:p="http://schemas.openxmlformats.org/presentationml/2006/main" type="titleOnly" preserve="1">
   <p:cSld name="Title Only">
     <p:spTree>
       <p:nvGrpSpPr>
@@ -2346,9 +2560,10 @@
           </a:prstGeom>
         </p:spPr>
         <p:txBody>
-          <a:bodyPr lIns="0" rIns="0" tIns="0" bIns="0" anchor="ctr"/>
-          <a:p>
-            <a:endParaRPr b="0" lang="pl-PL" sz="2700" spc="-1" strike="noStrike">
+          <a:bodyPr lIns="0" tIns="0" rIns="0" bIns="0" anchor="ctr"/>
+          <a:lstStyle/>
+          <a:p>
+            <a:endParaRPr lang="pl-PL" sz="2700" b="0" strike="noStrike" spc="-1">
               <a:solidFill>
                 <a:srgbClr val="000000"/>
               </a:solidFill>
@@ -2359,11 +2574,14 @@
       </p:sp>
     </p:spTree>
   </p:cSld>
+  <p:clrMapOvr>
+    <a:masterClrMapping/>
+  </p:clrMapOvr>
 </p:sldLayout>
 </file>
 
 <file path=ppt/slideLayouts/slideLayout6.xml><?xml version="1.0" encoding="utf-8"?>
-<p:sldLayout xmlns:a="http://schemas.openxmlformats.org/drawingml/2006/main" xmlns:p="http://schemas.openxmlformats.org/presentationml/2006/main" xmlns:r="http://schemas.openxmlformats.org/officeDocument/2006/relationships" xmlns:p14="http://schemas.microsoft.com/office/powerpoint/2010/main" xmlns:p15="http://schemas.microsoft.com/office/powerpoint/2012/main" xmlns:mc="http://schemas.openxmlformats.org/markup-compatibility/2006" type="objOnly" preserve="1">
+<p:sldLayout xmlns:a="http://schemas.openxmlformats.org/drawingml/2006/main" xmlns:r="http://schemas.openxmlformats.org/officeDocument/2006/relationships" xmlns:p="http://schemas.openxmlformats.org/presentationml/2006/main" type="objOnly" preserve="1">
   <p:cSld name="Centered Text">
     <p:spTree>
       <p:nvGrpSpPr>
@@ -2399,10 +2617,11 @@
           </a:prstGeom>
         </p:spPr>
         <p:txBody>
-          <a:bodyPr lIns="0" rIns="0" tIns="0" bIns="0" anchor="ctr"/>
+          <a:bodyPr lIns="0" tIns="0" rIns="0" bIns="0" anchor="ctr"/>
+          <a:lstStyle/>
           <a:p>
             <a:pPr algn="ctr"/>
-            <a:endParaRPr b="0" lang="en-US" sz="3200" spc="-1" strike="noStrike">
+            <a:endParaRPr lang="en-US" sz="3200" b="0" strike="noStrike" spc="-1">
               <a:latin typeface="Arial"/>
             </a:endParaRPr>
           </a:p>
@@ -2410,11 +2629,14 @@
       </p:sp>
     </p:spTree>
   </p:cSld>
+  <p:clrMapOvr>
+    <a:masterClrMapping/>
+  </p:clrMapOvr>
 </p:sldLayout>
 </file>
 
 <file path=ppt/slideLayouts/slideLayout7.xml><?xml version="1.0" encoding="utf-8"?>
-<p:sldLayout xmlns:a="http://schemas.openxmlformats.org/drawingml/2006/main" xmlns:p="http://schemas.openxmlformats.org/presentationml/2006/main" xmlns:r="http://schemas.openxmlformats.org/officeDocument/2006/relationships" xmlns:p14="http://schemas.microsoft.com/office/powerpoint/2010/main" xmlns:p15="http://schemas.microsoft.com/office/powerpoint/2012/main" xmlns:mc="http://schemas.openxmlformats.org/markup-compatibility/2006" type="twoObjAndObj" preserve="1">
+<p:sldLayout xmlns:a="http://schemas.openxmlformats.org/drawingml/2006/main" xmlns:r="http://schemas.openxmlformats.org/officeDocument/2006/relationships" xmlns:p="http://schemas.openxmlformats.org/presentationml/2006/main" type="twoObjAndObj" preserve="1">
   <p:cSld name="Title, 2 Content and Content">
     <p:spTree>
       <p:nvGrpSpPr>
@@ -2450,9 +2672,10 @@
           </a:prstGeom>
         </p:spPr>
         <p:txBody>
-          <a:bodyPr lIns="0" rIns="0" tIns="0" bIns="0" anchor="ctr"/>
-          <a:p>
-            <a:endParaRPr b="0" lang="pl-PL" sz="2700" spc="-1" strike="noStrike">
+          <a:bodyPr lIns="0" tIns="0" rIns="0" bIns="0" anchor="ctr"/>
+          <a:lstStyle/>
+          <a:p>
+            <a:endParaRPr lang="pl-PL" sz="2700" b="0" strike="noStrike" spc="-1">
               <a:solidFill>
                 <a:srgbClr val="000000"/>
               </a:solidFill>
@@ -2481,11 +2704,12 @@
           </a:prstGeom>
         </p:spPr>
         <p:txBody>
-          <a:bodyPr lIns="0" rIns="0" tIns="0" bIns="0">
+          <a:bodyPr lIns="0" tIns="0" rIns="0" bIns="0">
             <a:normAutofit/>
           </a:bodyPr>
-          <a:p>
-            <a:endParaRPr b="0" lang="pl-PL" sz="2400" spc="-1" strike="noStrike">
+          <a:lstStyle/>
+          <a:p>
+            <a:endParaRPr lang="pl-PL" sz="2400" b="0" strike="noStrike" spc="-1">
               <a:solidFill>
                 <a:srgbClr val="000000"/>
               </a:solidFill>
@@ -2514,11 +2738,12 @@
           </a:prstGeom>
         </p:spPr>
         <p:txBody>
-          <a:bodyPr lIns="0" rIns="0" tIns="0" bIns="0">
+          <a:bodyPr lIns="0" tIns="0" rIns="0" bIns="0">
             <a:normAutofit/>
           </a:bodyPr>
-          <a:p>
-            <a:endParaRPr b="0" lang="pl-PL" sz="2400" spc="-1" strike="noStrike">
+          <a:lstStyle/>
+          <a:p>
+            <a:endParaRPr lang="pl-PL" sz="2400" b="0" strike="noStrike" spc="-1">
               <a:solidFill>
                 <a:srgbClr val="000000"/>
               </a:solidFill>
@@ -2547,11 +2772,12 @@
           </a:prstGeom>
         </p:spPr>
         <p:txBody>
-          <a:bodyPr lIns="0" rIns="0" tIns="0" bIns="0">
+          <a:bodyPr lIns="0" tIns="0" rIns="0" bIns="0">
             <a:normAutofit/>
           </a:bodyPr>
-          <a:p>
-            <a:endParaRPr b="0" lang="pl-PL" sz="2400" spc="-1" strike="noStrike">
+          <a:lstStyle/>
+          <a:p>
+            <a:endParaRPr lang="pl-PL" sz="2400" b="0" strike="noStrike" spc="-1">
               <a:solidFill>
                 <a:srgbClr val="000000"/>
               </a:solidFill>
@@ -2562,11 +2788,14 @@
       </p:sp>
     </p:spTree>
   </p:cSld>
+  <p:clrMapOvr>
+    <a:masterClrMapping/>
+  </p:clrMapOvr>
 </p:sldLayout>
 </file>
 
 <file path=ppt/slideLayouts/slideLayout8.xml><?xml version="1.0" encoding="utf-8"?>
-<p:sldLayout xmlns:a="http://schemas.openxmlformats.org/drawingml/2006/main" xmlns:p="http://schemas.openxmlformats.org/presentationml/2006/main" xmlns:r="http://schemas.openxmlformats.org/officeDocument/2006/relationships" xmlns:p14="http://schemas.microsoft.com/office/powerpoint/2010/main" xmlns:p15="http://schemas.microsoft.com/office/powerpoint/2012/main" xmlns:mc="http://schemas.openxmlformats.org/markup-compatibility/2006" type="objAndTwoObj" preserve="1">
+<p:sldLayout xmlns:a="http://schemas.openxmlformats.org/drawingml/2006/main" xmlns:r="http://schemas.openxmlformats.org/officeDocument/2006/relationships" xmlns:p="http://schemas.openxmlformats.org/presentationml/2006/main" type="objAndTwoObj" preserve="1">
   <p:cSld name="Title Content and 2 Content">
     <p:spTree>
       <p:nvGrpSpPr>
@@ -2602,9 +2831,10 @@
           </a:prstGeom>
         </p:spPr>
         <p:txBody>
-          <a:bodyPr lIns="0" rIns="0" tIns="0" bIns="0" anchor="ctr"/>
-          <a:p>
-            <a:endParaRPr b="0" lang="pl-PL" sz="2700" spc="-1" strike="noStrike">
+          <a:bodyPr lIns="0" tIns="0" rIns="0" bIns="0" anchor="ctr"/>
+          <a:lstStyle/>
+          <a:p>
+            <a:endParaRPr lang="pl-PL" sz="2700" b="0" strike="noStrike" spc="-1">
               <a:solidFill>
                 <a:srgbClr val="000000"/>
               </a:solidFill>
@@ -2633,11 +2863,12 @@
           </a:prstGeom>
         </p:spPr>
         <p:txBody>
-          <a:bodyPr lIns="0" rIns="0" tIns="0" bIns="0">
+          <a:bodyPr lIns="0" tIns="0" rIns="0" bIns="0">
             <a:normAutofit/>
           </a:bodyPr>
-          <a:p>
-            <a:endParaRPr b="0" lang="pl-PL" sz="2400" spc="-1" strike="noStrike">
+          <a:lstStyle/>
+          <a:p>
+            <a:endParaRPr lang="pl-PL" sz="2400" b="0" strike="noStrike" spc="-1">
               <a:solidFill>
                 <a:srgbClr val="000000"/>
               </a:solidFill>
@@ -2666,11 +2897,12 @@
           </a:prstGeom>
         </p:spPr>
         <p:txBody>
-          <a:bodyPr lIns="0" rIns="0" tIns="0" bIns="0">
+          <a:bodyPr lIns="0" tIns="0" rIns="0" bIns="0">
             <a:normAutofit/>
           </a:bodyPr>
-          <a:p>
-            <a:endParaRPr b="0" lang="pl-PL" sz="2400" spc="-1" strike="noStrike">
+          <a:lstStyle/>
+          <a:p>
+            <a:endParaRPr lang="pl-PL" sz="2400" b="0" strike="noStrike" spc="-1">
               <a:solidFill>
                 <a:srgbClr val="000000"/>
               </a:solidFill>
@@ -2699,11 +2931,12 @@
           </a:prstGeom>
         </p:spPr>
         <p:txBody>
-          <a:bodyPr lIns="0" rIns="0" tIns="0" bIns="0">
+          <a:bodyPr lIns="0" tIns="0" rIns="0" bIns="0">
             <a:normAutofit/>
           </a:bodyPr>
-          <a:p>
-            <a:endParaRPr b="0" lang="pl-PL" sz="2400" spc="-1" strike="noStrike">
+          <a:lstStyle/>
+          <a:p>
+            <a:endParaRPr lang="pl-PL" sz="2400" b="0" strike="noStrike" spc="-1">
               <a:solidFill>
                 <a:srgbClr val="000000"/>
               </a:solidFill>
@@ -2714,11 +2947,14 @@
       </p:sp>
     </p:spTree>
   </p:cSld>
+  <p:clrMapOvr>
+    <a:masterClrMapping/>
+  </p:clrMapOvr>
 </p:sldLayout>
 </file>
 
 <file path=ppt/slideLayouts/slideLayout9.xml><?xml version="1.0" encoding="utf-8"?>
-<p:sldLayout xmlns:a="http://schemas.openxmlformats.org/drawingml/2006/main" xmlns:p="http://schemas.openxmlformats.org/presentationml/2006/main" xmlns:r="http://schemas.openxmlformats.org/officeDocument/2006/relationships" xmlns:p14="http://schemas.microsoft.com/office/powerpoint/2010/main" xmlns:p15="http://schemas.microsoft.com/office/powerpoint/2012/main" xmlns:mc="http://schemas.openxmlformats.org/markup-compatibility/2006" type="twoObjOverTx" preserve="1">
+<p:sldLayout xmlns:a="http://schemas.openxmlformats.org/drawingml/2006/main" xmlns:r="http://schemas.openxmlformats.org/officeDocument/2006/relationships" xmlns:p="http://schemas.openxmlformats.org/presentationml/2006/main" type="twoObjOverTx" preserve="1">
   <p:cSld name="Title, 2 Content over Content">
     <p:spTree>
       <p:nvGrpSpPr>
@@ -2754,9 +2990,10 @@
           </a:prstGeom>
         </p:spPr>
         <p:txBody>
-          <a:bodyPr lIns="0" rIns="0" tIns="0" bIns="0" anchor="ctr"/>
-          <a:p>
-            <a:endParaRPr b="0" lang="pl-PL" sz="2700" spc="-1" strike="noStrike">
+          <a:bodyPr lIns="0" tIns="0" rIns="0" bIns="0" anchor="ctr"/>
+          <a:lstStyle/>
+          <a:p>
+            <a:endParaRPr lang="pl-PL" sz="2700" b="0" strike="noStrike" spc="-1">
               <a:solidFill>
                 <a:srgbClr val="000000"/>
               </a:solidFill>
@@ -2785,11 +3022,12 @@
           </a:prstGeom>
         </p:spPr>
         <p:txBody>
-          <a:bodyPr lIns="0" rIns="0" tIns="0" bIns="0">
+          <a:bodyPr lIns="0" tIns="0" rIns="0" bIns="0">
             <a:normAutofit/>
           </a:bodyPr>
-          <a:p>
-            <a:endParaRPr b="0" lang="pl-PL" sz="2400" spc="-1" strike="noStrike">
+          <a:lstStyle/>
+          <a:p>
+            <a:endParaRPr lang="pl-PL" sz="2400" b="0" strike="noStrike" spc="-1">
               <a:solidFill>
                 <a:srgbClr val="000000"/>
               </a:solidFill>
@@ -2818,11 +3056,12 @@
           </a:prstGeom>
         </p:spPr>
         <p:txBody>
-          <a:bodyPr lIns="0" rIns="0" tIns="0" bIns="0">
+          <a:bodyPr lIns="0" tIns="0" rIns="0" bIns="0">
             <a:normAutofit/>
           </a:bodyPr>
-          <a:p>
-            <a:endParaRPr b="0" lang="pl-PL" sz="2400" spc="-1" strike="noStrike">
+          <a:lstStyle/>
+          <a:p>
+            <a:endParaRPr lang="pl-PL" sz="2400" b="0" strike="noStrike" spc="-1">
               <a:solidFill>
                 <a:srgbClr val="000000"/>
               </a:solidFill>
@@ -2851,11 +3090,12 @@
           </a:prstGeom>
         </p:spPr>
         <p:txBody>
-          <a:bodyPr lIns="0" rIns="0" tIns="0" bIns="0">
+          <a:bodyPr lIns="0" tIns="0" rIns="0" bIns="0">
             <a:normAutofit/>
           </a:bodyPr>
-          <a:p>
-            <a:endParaRPr b="0" lang="pl-PL" sz="2400" spc="-1" strike="noStrike">
+          <a:lstStyle/>
+          <a:p>
+            <a:endParaRPr lang="pl-PL" sz="2400" b="0" strike="noStrike" spc="-1">
               <a:solidFill>
                 <a:srgbClr val="000000"/>
               </a:solidFill>
@@ -2866,17 +3106,21 @@
       </p:sp>
     </p:spTree>
   </p:cSld>
+  <p:clrMapOvr>
+    <a:masterClrMapping/>
+  </p:clrMapOvr>
 </p:sldLayout>
 </file>
 
 <file path=ppt/slideMasters/slideMaster1.xml><?xml version="1.0" encoding="utf-8"?>
-<p:sldMaster xmlns:a="http://schemas.openxmlformats.org/drawingml/2006/main" xmlns:p="http://schemas.openxmlformats.org/presentationml/2006/main" xmlns:r="http://schemas.openxmlformats.org/officeDocument/2006/relationships" xmlns:p14="http://schemas.microsoft.com/office/powerpoint/2010/main" xmlns:p15="http://schemas.microsoft.com/office/powerpoint/2012/main" xmlns:mc="http://schemas.openxmlformats.org/markup-compatibility/2006">
+<p:sldMaster xmlns:a="http://schemas.openxmlformats.org/drawingml/2006/main" xmlns:r="http://schemas.openxmlformats.org/officeDocument/2006/relationships" xmlns:p="http://schemas.openxmlformats.org/presentationml/2006/main">
   <p:cSld>
     <p:bg>
       <p:bgPr>
         <a:solidFill>
-          <a:srgbClr val="ffffff"/>
+          <a:srgbClr val="FFFFFF"/>
         </a:solidFill>
+        <a:effectLst/>
       </p:bgPr>
     </p:bg>
     <p:spTree>
@@ -2895,7 +3139,7 @@
       </p:grpSpPr>
       <p:sp>
         <p:nvSpPr>
-          <p:cNvPr id="0" name="CustomShape 1" hidden="1"/>
+          <p:cNvPr id="9" name="CustomShape 1" hidden="1"/>
           <p:cNvSpPr/>
           <p:nvPr/>
         </p:nvSpPr>
@@ -2915,15 +3159,21 @@
           </a:ln>
         </p:spPr>
         <p:style>
-          <a:lnRef idx="0"/>
-          <a:fillRef idx="0"/>
-          <a:effectRef idx="0"/>
+          <a:lnRef idx="0">
+            <a:scrgbClr r="0" g="0" b="0"/>
+          </a:lnRef>
+          <a:fillRef idx="0">
+            <a:scrgbClr r="0" g="0" b="0"/>
+          </a:fillRef>
+          <a:effectRef idx="0">
+            <a:scrgbClr r="0" g="0" b="0"/>
+          </a:effectRef>
           <a:fontRef idx="minor"/>
         </p:style>
       </p:sp>
       <p:sp>
         <p:nvSpPr>
-          <p:cNvPr id="1" name="CustomShape 2" hidden="1"/>
+          <p:cNvPr id="10" name="CustomShape 2" hidden="1"/>
           <p:cNvSpPr/>
           <p:nvPr/>
         </p:nvSpPr>
@@ -2943,9 +3193,15 @@
           </a:ln>
         </p:spPr>
         <p:style>
-          <a:lnRef idx="0"/>
-          <a:fillRef idx="0"/>
-          <a:effectRef idx="0"/>
+          <a:lnRef idx="0">
+            <a:scrgbClr r="0" g="0" b="0"/>
+          </a:lnRef>
+          <a:fillRef idx="0">
+            <a:scrgbClr r="0" g="0" b="0"/>
+          </a:fillRef>
+          <a:effectRef idx="0">
+            <a:scrgbClr r="0" g="0" b="0"/>
+          </a:effectRef>
           <a:fontRef idx="minor"/>
         </p:style>
       </p:sp>
@@ -2971,9 +3227,15 @@
           </a:ln>
         </p:spPr>
         <p:style>
-          <a:lnRef idx="0"/>
-          <a:fillRef idx="0"/>
-          <a:effectRef idx="0"/>
+          <a:lnRef idx="0">
+            <a:scrgbClr r="0" g="0" b="0"/>
+          </a:lnRef>
+          <a:fillRef idx="0">
+            <a:scrgbClr r="0" g="0" b="0"/>
+          </a:fillRef>
+          <a:effectRef idx="0">
+            <a:scrgbClr r="0" g="0" b="0"/>
+          </a:effectRef>
           <a:fontRef idx="minor"/>
         </p:style>
       </p:sp>
@@ -2999,9 +3261,15 @@
           </a:ln>
         </p:spPr>
         <p:style>
-          <a:lnRef idx="0"/>
-          <a:fillRef idx="0"/>
-          <a:effectRef idx="0"/>
+          <a:lnRef idx="0">
+            <a:scrgbClr r="0" g="0" b="0"/>
+          </a:lnRef>
+          <a:fillRef idx="0">
+            <a:scrgbClr r="0" g="0" b="0"/>
+          </a:fillRef>
+          <a:effectRef idx="0">
+            <a:scrgbClr r="0" g="0" b="0"/>
+          </a:effectRef>
           <a:fontRef idx="minor"/>
         </p:style>
       </p:sp>
@@ -3025,13 +3293,20 @@
           </a:ln>
         </p:spPr>
         <p:style>
-          <a:lnRef idx="0"/>
-          <a:fillRef idx="0"/>
-          <a:effectRef idx="0"/>
+          <a:lnRef idx="0">
+            <a:scrgbClr r="0" g="0" b="0"/>
+          </a:lnRef>
+          <a:fillRef idx="0">
+            <a:scrgbClr r="0" g="0" b="0"/>
+          </a:fillRef>
+          <a:effectRef idx="0">
+            <a:scrgbClr r="0" g="0" b="0"/>
+          </a:effectRef>
           <a:fontRef idx="minor"/>
         </p:style>
         <p:txBody>
-          <a:bodyPr lIns="90000" rIns="90000" tIns="45000" bIns="45000"/>
+          <a:bodyPr lIns="90000" tIns="45000" rIns="90000" bIns="45000"/>
+          <a:lstStyle/>
           <a:p>
             <a:pPr>
               <a:lnSpc>
@@ -3039,24 +3314,24 @@
               </a:lnSpc>
             </a:pPr>
             <a:fld id="{D613F322-CFA4-4F3F-A9C8-068D78D80323}" type="slidenum">
-              <a:rPr b="0" lang="en-US" sz="1400" spc="-1" strike="noStrike">
+              <a:rPr lang="en-US" sz="1400" b="0" strike="noStrike" spc="-1">
                 <a:solidFill>
-                  <a:srgbClr val="ffffff"/>
+                  <a:srgbClr val="FFFFFF"/>
                 </a:solidFill>
                 <a:latin typeface="Trebuchet MS"/>
               </a:rPr>
-              <a:t>&lt;number&gt;</a:t>
+              <a:t>‹#›</a:t>
             </a:fld>
             <a:r>
-              <a:rPr b="0" lang="en-US" sz="1400" spc="-1" strike="noStrike">
+              <a:rPr lang="en-US" sz="1400" b="0" strike="noStrike" spc="-1">
                 <a:solidFill>
-                  <a:srgbClr val="ffffff"/>
+                  <a:srgbClr val="FFFFFF"/>
                 </a:solidFill>
                 <a:latin typeface="Trebuchet MS"/>
               </a:rPr>
               <a:t>/7</a:t>
             </a:r>
-            <a:endParaRPr b="0" lang="en-US" sz="1400" spc="-1" strike="noStrike">
+            <a:endParaRPr lang="en-US" sz="1400" b="0" strike="noStrike" spc="-1">
               <a:latin typeface="Arial"/>
             </a:endParaRPr>
           </a:p>
@@ -3083,6 +3358,7 @@
         </p:spPr>
         <p:txBody>
           <a:bodyPr anchor="ctr"/>
+          <a:lstStyle/>
           <a:p>
             <a:pPr algn="ctr">
               <a:lnSpc>
@@ -3090,15 +3366,15 @@
               </a:lnSpc>
             </a:pPr>
             <a:r>
-              <a:rPr b="1" lang="pl-PL" sz="2700" spc="-1" strike="noStrike">
+              <a:rPr lang="pl-PL" sz="2700" b="1" strike="noStrike" spc="-1">
                 <a:solidFill>
-                  <a:srgbClr val="ffffff"/>
+                  <a:srgbClr val="FFFFFF"/>
                 </a:solidFill>
                 <a:latin typeface="Trebuchet MS"/>
               </a:rPr>
               <a:t>Kliknij, aby edytować styl</a:t>
             </a:r>
-            <a:endParaRPr b="0" lang="pl-PL" sz="2700" spc="-1" strike="noStrike">
+            <a:endParaRPr lang="pl-PL" sz="2700" b="0" strike="noStrike" spc="-1">
               <a:solidFill>
                 <a:srgbClr val="000000"/>
               </a:solidFill>
@@ -3129,20 +3405,26 @@
           </a:ln>
         </p:spPr>
         <p:style>
-          <a:lnRef idx="0"/>
-          <a:fillRef idx="0"/>
-          <a:effectRef idx="0"/>
+          <a:lnRef idx="0">
+            <a:scrgbClr r="0" g="0" b="0"/>
+          </a:lnRef>
+          <a:fillRef idx="0">
+            <a:scrgbClr r="0" g="0" b="0"/>
+          </a:fillRef>
+          <a:effectRef idx="0">
+            <a:scrgbClr r="0" g="0" b="0"/>
+          </a:effectRef>
           <a:fontRef idx="minor"/>
         </p:style>
       </p:sp>
       <p:pic>
         <p:nvPicPr>
-          <p:cNvPr id="7" name="Obraz 2" descr=""/>
+          <p:cNvPr id="7" name="Obraz 2"/>
           <p:cNvPicPr/>
           <p:nvPr/>
         </p:nvPicPr>
         <p:blipFill>
-          <a:blip r:embed="rId2"/>
+          <a:blip r:embed="rId14"/>
           <a:stretch/>
         </p:blipFill>
         <p:spPr>
@@ -3178,9 +3460,10 @@
           </a:prstGeom>
         </p:spPr>
         <p:txBody>
-          <a:bodyPr lIns="0" rIns="0" tIns="0" bIns="0">
+          <a:bodyPr lIns="0" tIns="0" rIns="0" bIns="0">
             <a:normAutofit/>
           </a:bodyPr>
+          <a:lstStyle/>
           <a:p>
             <a:pPr marL="432000" indent="-324000">
               <a:spcBef>
@@ -3194,7 +3477,7 @@
               <a:buChar char=""/>
             </a:pPr>
             <a:r>
-              <a:rPr b="0" lang="pl-PL" sz="2400" spc="-1" strike="noStrike">
+              <a:rPr lang="pl-PL" sz="2400" b="0" strike="noStrike" spc="-1">
                 <a:solidFill>
                   <a:srgbClr val="000000"/>
                 </a:solidFill>
@@ -3202,15 +3485,9 @@
               </a:rPr>
               <a:t>Click to edit the outline text format</a:t>
             </a:r>
-            <a:endParaRPr b="0" lang="pl-PL" sz="2400" spc="-1" strike="noStrike">
-              <a:solidFill>
-                <a:srgbClr val="000000"/>
-              </a:solidFill>
-              <a:latin typeface="Trebuchet MS"/>
-            </a:endParaRPr>
-          </a:p>
-          <a:p>
-            <a:pPr lvl="1" marL="864000" indent="-324000">
+          </a:p>
+          <a:p>
+            <a:pPr marL="864000" lvl="1" indent="-324000">
               <a:spcBef>
                 <a:spcPts val="1134"/>
               </a:spcBef>
@@ -3222,7 +3499,7 @@
               <a:buChar char=""/>
             </a:pPr>
             <a:r>
-              <a:rPr b="0" lang="pl-PL" sz="1800" spc="-1" strike="noStrike">
+              <a:rPr lang="pl-PL" sz="1800" b="0" strike="noStrike" spc="-1">
                 <a:solidFill>
                   <a:srgbClr val="000000"/>
                 </a:solidFill>
@@ -3230,15 +3507,9 @@
               </a:rPr>
               <a:t>Second Outline Level</a:t>
             </a:r>
-            <a:endParaRPr b="0" lang="pl-PL" sz="1800" spc="-1" strike="noStrike">
-              <a:solidFill>
-                <a:srgbClr val="000000"/>
-              </a:solidFill>
-              <a:latin typeface="Trebuchet MS"/>
-            </a:endParaRPr>
-          </a:p>
-          <a:p>
-            <a:pPr lvl="2" marL="1296000" indent="-288000">
+          </a:p>
+          <a:p>
+            <a:pPr marL="1296000" lvl="2" indent="-288000">
               <a:spcBef>
                 <a:spcPts val="850"/>
               </a:spcBef>
@@ -3250,7 +3521,7 @@
               <a:buChar char=""/>
             </a:pPr>
             <a:r>
-              <a:rPr b="0" lang="pl-PL" sz="1500" spc="-1" strike="noStrike">
+              <a:rPr lang="pl-PL" sz="1500" b="0" strike="noStrike" spc="-1">
                 <a:solidFill>
                   <a:srgbClr val="000000"/>
                 </a:solidFill>
@@ -3258,15 +3529,9 @@
               </a:rPr>
               <a:t>Third Outline Level</a:t>
             </a:r>
-            <a:endParaRPr b="0" lang="pl-PL" sz="1500" spc="-1" strike="noStrike">
-              <a:solidFill>
-                <a:srgbClr val="000000"/>
-              </a:solidFill>
-              <a:latin typeface="Trebuchet MS"/>
-            </a:endParaRPr>
-          </a:p>
-          <a:p>
-            <a:pPr lvl="3" marL="1728000" indent="-216000">
+          </a:p>
+          <a:p>
+            <a:pPr marL="1728000" lvl="3" indent="-216000">
               <a:spcBef>
                 <a:spcPts val="567"/>
               </a:spcBef>
@@ -3278,7 +3543,7 @@
               <a:buChar char=""/>
             </a:pPr>
             <a:r>
-              <a:rPr b="0" lang="pl-PL" sz="1500" spc="-1" strike="noStrike">
+              <a:rPr lang="pl-PL" sz="1500" b="0" strike="noStrike" spc="-1">
                 <a:solidFill>
                   <a:srgbClr val="000000"/>
                 </a:solidFill>
@@ -3286,15 +3551,9 @@
               </a:rPr>
               <a:t>Fourth Outline Level</a:t>
             </a:r>
-            <a:endParaRPr b="0" lang="pl-PL" sz="1500" spc="-1" strike="noStrike">
-              <a:solidFill>
-                <a:srgbClr val="000000"/>
-              </a:solidFill>
-              <a:latin typeface="Trebuchet MS"/>
-            </a:endParaRPr>
-          </a:p>
-          <a:p>
-            <a:pPr lvl="4" marL="2160000" indent="-216000">
+          </a:p>
+          <a:p>
+            <a:pPr marL="2160000" lvl="4" indent="-216000">
               <a:spcBef>
                 <a:spcPts val="283"/>
               </a:spcBef>
@@ -3306,7 +3565,7 @@
               <a:buChar char=""/>
             </a:pPr>
             <a:r>
-              <a:rPr b="0" lang="pl-PL" sz="2000" spc="-1" strike="noStrike">
+              <a:rPr lang="pl-PL" sz="2000" b="0" strike="noStrike" spc="-1">
                 <a:solidFill>
                   <a:srgbClr val="000000"/>
                 </a:solidFill>
@@ -3314,15 +3573,9 @@
               </a:rPr>
               <a:t>Fifth Outline Level</a:t>
             </a:r>
-            <a:endParaRPr b="0" lang="pl-PL" sz="2000" spc="-1" strike="noStrike">
-              <a:solidFill>
-                <a:srgbClr val="000000"/>
-              </a:solidFill>
-              <a:latin typeface="Trebuchet MS"/>
-            </a:endParaRPr>
-          </a:p>
-          <a:p>
-            <a:pPr lvl="5" marL="2592000" indent="-216000">
+          </a:p>
+          <a:p>
+            <a:pPr marL="2592000" lvl="5" indent="-216000">
               <a:spcBef>
                 <a:spcPts val="283"/>
               </a:spcBef>
@@ -3334,7 +3587,7 @@
               <a:buChar char=""/>
             </a:pPr>
             <a:r>
-              <a:rPr b="0" lang="pl-PL" sz="2000" spc="-1" strike="noStrike">
+              <a:rPr lang="pl-PL" sz="2000" b="0" strike="noStrike" spc="-1">
                 <a:solidFill>
                   <a:srgbClr val="000000"/>
                 </a:solidFill>
@@ -3342,15 +3595,9 @@
               </a:rPr>
               <a:t>Sixth Outline Level</a:t>
             </a:r>
-            <a:endParaRPr b="0" lang="pl-PL" sz="2000" spc="-1" strike="noStrike">
-              <a:solidFill>
-                <a:srgbClr val="000000"/>
-              </a:solidFill>
-              <a:latin typeface="Trebuchet MS"/>
-            </a:endParaRPr>
-          </a:p>
-          <a:p>
-            <a:pPr lvl="6" marL="3024000" indent="-216000">
+          </a:p>
+          <a:p>
+            <a:pPr marL="3024000" lvl="6" indent="-216000">
               <a:spcBef>
                 <a:spcPts val="283"/>
               </a:spcBef>
@@ -3362,7 +3609,7 @@
               <a:buChar char=""/>
             </a:pPr>
             <a:r>
-              <a:rPr b="0" lang="pl-PL" sz="2000" spc="-1" strike="noStrike">
+              <a:rPr lang="pl-PL" sz="2000" b="0" strike="noStrike" spc="-1">
                 <a:solidFill>
                   <a:srgbClr val="000000"/>
                 </a:solidFill>
@@ -3370,43 +3617,43 @@
               </a:rPr>
               <a:t>Seventh Outline Level</a:t>
             </a:r>
-            <a:endParaRPr b="0" lang="pl-PL" sz="2000" spc="-1" strike="noStrike">
-              <a:solidFill>
-                <a:srgbClr val="000000"/>
-              </a:solidFill>
-              <a:latin typeface="Trebuchet MS"/>
-            </a:endParaRPr>
           </a:p>
         </p:txBody>
       </p:sp>
     </p:spTree>
   </p:cSld>
-  <p:clrMap bg1="lt1" bg2="lt2" tx1="dk1" tx2="dk2" accent1="accent1" accent2="accent2" accent3="accent3" accent4="accent4" accent5="accent5" accent6="accent6" hlink="hlink" folHlink="folHlink"/>
+  <p:clrMap bg1="lt1" tx1="dk1" bg2="lt2" tx2="dk2" accent1="accent1" accent2="accent2" accent3="accent3" accent4="accent4" accent5="accent5" accent6="accent6" hlink="hlink" folHlink="folHlink"/>
   <p:sldLayoutIdLst>
-    <p:sldLayoutId id="2147483649" r:id="rId3"/>
-    <p:sldLayoutId id="2147483650" r:id="rId4"/>
-    <p:sldLayoutId id="2147483651" r:id="rId5"/>
-    <p:sldLayoutId id="2147483652" r:id="rId6"/>
-    <p:sldLayoutId id="2147483653" r:id="rId7"/>
-    <p:sldLayoutId id="2147483654" r:id="rId8"/>
-    <p:sldLayoutId id="2147483655" r:id="rId9"/>
-    <p:sldLayoutId id="2147483656" r:id="rId10"/>
-    <p:sldLayoutId id="2147483657" r:id="rId11"/>
-    <p:sldLayoutId id="2147483658" r:id="rId12"/>
-    <p:sldLayoutId id="2147483659" r:id="rId13"/>
-    <p:sldLayoutId id="2147483660" r:id="rId14"/>
+    <p:sldLayoutId id="2147483649" r:id="rId1"/>
+    <p:sldLayoutId id="2147483650" r:id="rId2"/>
+    <p:sldLayoutId id="2147483651" r:id="rId3"/>
+    <p:sldLayoutId id="2147483652" r:id="rId4"/>
+    <p:sldLayoutId id="2147483653" r:id="rId5"/>
+    <p:sldLayoutId id="2147483654" r:id="rId6"/>
+    <p:sldLayoutId id="2147483655" r:id="rId7"/>
+    <p:sldLayoutId id="2147483656" r:id="rId8"/>
+    <p:sldLayoutId id="2147483657" r:id="rId9"/>
+    <p:sldLayoutId id="2147483658" r:id="rId10"/>
+    <p:sldLayoutId id="2147483659" r:id="rId11"/>
+    <p:sldLayoutId id="2147483660" r:id="rId12"/>
   </p:sldLayoutIdLst>
+  <p:txStyles>
+    <p:titleStyle/>
+    <p:bodyStyle/>
+    <p:otherStyle/>
+  </p:txStyles>
 </p:sldMaster>
 </file>
 
 <file path=ppt/slideMasters/slideMaster2.xml><?xml version="1.0" encoding="utf-8"?>
-<p:sldMaster xmlns:a="http://schemas.openxmlformats.org/drawingml/2006/main" xmlns:p="http://schemas.openxmlformats.org/presentationml/2006/main" xmlns:r="http://schemas.openxmlformats.org/officeDocument/2006/relationships" xmlns:p14="http://schemas.microsoft.com/office/powerpoint/2010/main" xmlns:p15="http://schemas.microsoft.com/office/powerpoint/2012/main" xmlns:mc="http://schemas.openxmlformats.org/markup-compatibility/2006">
+<p:sldMaster xmlns:a="http://schemas.openxmlformats.org/drawingml/2006/main" xmlns:r="http://schemas.openxmlformats.org/officeDocument/2006/relationships" xmlns:p="http://schemas.openxmlformats.org/presentationml/2006/main">
   <p:cSld>
     <p:bg>
       <p:bgPr>
         <a:solidFill>
-          <a:srgbClr val="ffffff"/>
+          <a:srgbClr val="FFFFFF"/>
         </a:solidFill>
+        <a:effectLst/>
       </p:bgPr>
     </p:bg>
     <p:spTree>
@@ -3445,9 +3692,15 @@
           </a:ln>
         </p:spPr>
         <p:style>
-          <a:lnRef idx="0"/>
-          <a:fillRef idx="0"/>
-          <a:effectRef idx="0"/>
+          <a:lnRef idx="0">
+            <a:scrgbClr r="0" g="0" b="0"/>
+          </a:lnRef>
+          <a:fillRef idx="0">
+            <a:scrgbClr r="0" g="0" b="0"/>
+          </a:fillRef>
+          <a:effectRef idx="0">
+            <a:scrgbClr r="0" g="0" b="0"/>
+          </a:effectRef>
           <a:fontRef idx="minor"/>
         </p:style>
       </p:sp>
@@ -3473,9 +3726,15 @@
           </a:ln>
         </p:spPr>
         <p:style>
-          <a:lnRef idx="0"/>
-          <a:fillRef idx="0"/>
-          <a:effectRef idx="0"/>
+          <a:lnRef idx="0">
+            <a:scrgbClr r="0" g="0" b="0"/>
+          </a:lnRef>
+          <a:fillRef idx="0">
+            <a:scrgbClr r="0" g="0" b="0"/>
+          </a:fillRef>
+          <a:effectRef idx="0">
+            <a:scrgbClr r="0" g="0" b="0"/>
+          </a:effectRef>
           <a:fontRef idx="minor"/>
         </p:style>
       </p:sp>
@@ -3501,9 +3760,15 @@
           </a:ln>
         </p:spPr>
         <p:style>
-          <a:lnRef idx="0"/>
-          <a:fillRef idx="0"/>
-          <a:effectRef idx="0"/>
+          <a:lnRef idx="0">
+            <a:scrgbClr r="0" g="0" b="0"/>
+          </a:lnRef>
+          <a:fillRef idx="0">
+            <a:scrgbClr r="0" g="0" b="0"/>
+          </a:fillRef>
+          <a:effectRef idx="0">
+            <a:scrgbClr r="0" g="0" b="0"/>
+          </a:effectRef>
           <a:fontRef idx="minor"/>
         </p:style>
       </p:sp>
@@ -3527,13 +3792,20 @@
           </a:ln>
         </p:spPr>
         <p:style>
-          <a:lnRef idx="0"/>
-          <a:fillRef idx="0"/>
-          <a:effectRef idx="0"/>
+          <a:lnRef idx="0">
+            <a:scrgbClr r="0" g="0" b="0"/>
+          </a:lnRef>
+          <a:fillRef idx="0">
+            <a:scrgbClr r="0" g="0" b="0"/>
+          </a:fillRef>
+          <a:effectRef idx="0">
+            <a:scrgbClr r="0" g="0" b="0"/>
+          </a:effectRef>
           <a:fontRef idx="minor"/>
         </p:style>
         <p:txBody>
-          <a:bodyPr lIns="90000" rIns="90000" tIns="45000" bIns="45000"/>
+          <a:bodyPr lIns="90000" tIns="45000" rIns="90000" bIns="45000"/>
+          <a:lstStyle/>
           <a:p>
             <a:pPr>
               <a:lnSpc>
@@ -3541,16 +3813,16 @@
               </a:lnSpc>
             </a:pPr>
             <a:fld id="{CBEF621D-DE42-4341-ADC1-7BB21CC0B5A1}" type="slidenum">
-              <a:rPr b="0" lang="en-US" sz="1400" spc="-1" strike="noStrike">
+              <a:rPr lang="en-US" sz="1400" b="0" strike="noStrike" spc="-1">
                 <a:solidFill>
                   <a:srgbClr val="000000"/>
                 </a:solidFill>
                 <a:latin typeface="Trebuchet MS"/>
               </a:rPr>
-              <a:t>1</a:t>
+              <a:t>‹#›</a:t>
             </a:fld>
             <a:r>
-              <a:rPr b="0" lang="en-US" sz="1400" spc="-1" strike="noStrike">
+              <a:rPr lang="en-US" sz="1400" b="0" strike="noStrike" spc="-1">
                 <a:solidFill>
                   <a:srgbClr val="000000"/>
                 </a:solidFill>
@@ -3558,7 +3830,7 @@
               </a:rPr>
               <a:t>/7</a:t>
             </a:r>
-            <a:endParaRPr b="0" lang="en-US" sz="1400" spc="-1" strike="noStrike">
+            <a:endParaRPr lang="en-US" sz="1400" b="0" strike="noStrike" spc="-1">
               <a:latin typeface="Arial"/>
             </a:endParaRPr>
           </a:p>
@@ -3585,6 +3857,7 @@
         </p:spPr>
         <p:txBody>
           <a:bodyPr anchor="ctr"/>
+          <a:lstStyle/>
           <a:p>
             <a:pPr>
               <a:lnSpc>
@@ -3592,15 +3865,15 @@
               </a:lnSpc>
             </a:pPr>
             <a:r>
-              <a:rPr b="1" lang="pl-PL" sz="2700" spc="-1" strike="noStrike">
+              <a:rPr lang="pl-PL" sz="2700" b="1" strike="noStrike" spc="-1">
                 <a:solidFill>
-                  <a:srgbClr val="ffffff"/>
+                  <a:srgbClr val="FFFFFF"/>
                 </a:solidFill>
                 <a:latin typeface="Trebuchet MS"/>
               </a:rPr>
               <a:t>Kliknij, aby edytować styl</a:t>
             </a:r>
-            <a:endParaRPr b="0" lang="pl-PL" sz="2700" spc="-1" strike="noStrike">
+            <a:endParaRPr lang="pl-PL" sz="2700" b="0" strike="noStrike" spc="-1">
               <a:solidFill>
                 <a:srgbClr val="000000"/>
               </a:solidFill>
@@ -3630,6 +3903,7 @@
         </p:spPr>
         <p:txBody>
           <a:bodyPr/>
+          <a:lstStyle/>
           <a:p>
             <a:pPr marL="257040" indent="-256680">
               <a:lnSpc>
@@ -3645,7 +3919,7 @@
               <a:buChar char=""/>
             </a:pPr>
             <a:r>
-              <a:rPr b="0" lang="pl-PL" sz="2400" spc="-1" strike="noStrike">
+              <a:rPr lang="pl-PL" sz="2400" b="0" strike="noStrike" spc="-1">
                 <a:solidFill>
                   <a:srgbClr val="000000"/>
                 </a:solidFill>
@@ -3653,15 +3927,9 @@
               </a:rPr>
               <a:t>Edytuj style wzorca tekstu</a:t>
             </a:r>
-            <a:endParaRPr b="0" lang="pl-PL" sz="2400" spc="-1" strike="noStrike">
-              <a:solidFill>
-                <a:srgbClr val="000000"/>
-              </a:solidFill>
-              <a:latin typeface="Trebuchet MS"/>
-            </a:endParaRPr>
-          </a:p>
-          <a:p>
-            <a:pPr lvl="1" marL="557280" indent="-213840">
+          </a:p>
+          <a:p>
+            <a:pPr marL="557280" lvl="1" indent="-213840">
               <a:lnSpc>
                 <a:spcPct val="100000"/>
               </a:lnSpc>
@@ -3675,7 +3943,7 @@
               <a:buChar char=""/>
             </a:pPr>
             <a:r>
-              <a:rPr b="0" lang="pl-PL" sz="2100" spc="-1" strike="noStrike">
+              <a:rPr lang="pl-PL" sz="2100" b="0" strike="noStrike" spc="-1">
                 <a:solidFill>
                   <a:srgbClr val="000000"/>
                 </a:solidFill>
@@ -3683,15 +3951,9 @@
               </a:rPr>
               <a:t>Drugi poziom</a:t>
             </a:r>
-            <a:endParaRPr b="0" lang="pl-PL" sz="2100" spc="-1" strike="noStrike">
-              <a:solidFill>
-                <a:srgbClr val="000000"/>
-              </a:solidFill>
-              <a:latin typeface="Trebuchet MS"/>
-            </a:endParaRPr>
-          </a:p>
-          <a:p>
-            <a:pPr lvl="2" marL="857160" indent="-171000">
+          </a:p>
+          <a:p>
+            <a:pPr marL="857160" lvl="2" indent="-171000">
               <a:lnSpc>
                 <a:spcPct val="100000"/>
               </a:lnSpc>
@@ -3705,7 +3967,7 @@
               <a:buChar char=""/>
             </a:pPr>
             <a:r>
-              <a:rPr b="0" lang="pl-PL" sz="1800" spc="-1" strike="noStrike">
+              <a:rPr lang="pl-PL" sz="1800" b="0" strike="noStrike" spc="-1">
                 <a:solidFill>
                   <a:srgbClr val="000000"/>
                 </a:solidFill>
@@ -3713,15 +3975,9 @@
               </a:rPr>
               <a:t>Trzeci poziom</a:t>
             </a:r>
-            <a:endParaRPr b="0" lang="pl-PL" sz="1800" spc="-1" strike="noStrike">
-              <a:solidFill>
-                <a:srgbClr val="000000"/>
-              </a:solidFill>
-              <a:latin typeface="Trebuchet MS"/>
-            </a:endParaRPr>
-          </a:p>
-          <a:p>
-            <a:pPr lvl="3" marL="1200240" indent="-171000">
+          </a:p>
+          <a:p>
+            <a:pPr marL="1200240" lvl="3" indent="-171000">
               <a:lnSpc>
                 <a:spcPct val="100000"/>
               </a:lnSpc>
@@ -3735,7 +3991,7 @@
               <a:buChar char=""/>
             </a:pPr>
             <a:r>
-              <a:rPr b="0" lang="pl-PL" sz="1500" spc="-1" strike="noStrike">
+              <a:rPr lang="pl-PL" sz="1500" b="0" strike="noStrike" spc="-1">
                 <a:solidFill>
                   <a:srgbClr val="000000"/>
                 </a:solidFill>
@@ -3743,15 +3999,9 @@
               </a:rPr>
               <a:t>Czwarty poziom</a:t>
             </a:r>
-            <a:endParaRPr b="0" lang="pl-PL" sz="1500" spc="-1" strike="noStrike">
-              <a:solidFill>
-                <a:srgbClr val="000000"/>
-              </a:solidFill>
-              <a:latin typeface="Trebuchet MS"/>
-            </a:endParaRPr>
-          </a:p>
-          <a:p>
-            <a:pPr lvl="4" marL="1542960" indent="-171000">
+          </a:p>
+          <a:p>
+            <a:pPr marL="1542960" lvl="4" indent="-171000">
               <a:lnSpc>
                 <a:spcPct val="100000"/>
               </a:lnSpc>
@@ -3765,7 +4015,7 @@
               <a:buChar char="»"/>
             </a:pPr>
             <a:r>
-              <a:rPr b="0" lang="pl-PL" sz="1500" spc="-1" strike="noStrike">
+              <a:rPr lang="pl-PL" sz="1500" b="0" strike="noStrike" spc="-1">
                 <a:solidFill>
                   <a:srgbClr val="000000"/>
                 </a:solidFill>
@@ -3773,23 +4023,17 @@
               </a:rPr>
               <a:t>Piąty poziom</a:t>
             </a:r>
-            <a:endParaRPr b="0" lang="pl-PL" sz="1500" spc="-1" strike="noStrike">
-              <a:solidFill>
-                <a:srgbClr val="000000"/>
-              </a:solidFill>
-              <a:latin typeface="Trebuchet MS"/>
-            </a:endParaRPr>
           </a:p>
         </p:txBody>
       </p:sp>
       <p:pic>
         <p:nvPicPr>
-          <p:cNvPr id="51" name="Obraz 4" descr=""/>
+          <p:cNvPr id="51" name="Obraz 4"/>
           <p:cNvPicPr/>
           <p:nvPr/>
         </p:nvPicPr>
         <p:blipFill>
-          <a:blip r:embed="rId2"/>
+          <a:blip r:embed="rId14"/>
           <a:stretch/>
         </p:blipFill>
         <p:spPr>
@@ -3807,26 +4051,31 @@
       </p:pic>
     </p:spTree>
   </p:cSld>
-  <p:clrMap bg1="lt1" bg2="lt2" tx1="dk1" tx2="dk2" accent1="accent1" accent2="accent2" accent3="accent3" accent4="accent4" accent5="accent5" accent6="accent6" hlink="hlink" folHlink="folHlink"/>
+  <p:clrMap bg1="lt1" tx1="dk1" bg2="lt2" tx2="dk2" accent1="accent1" accent2="accent2" accent3="accent3" accent4="accent4" accent5="accent5" accent6="accent6" hlink="hlink" folHlink="folHlink"/>
   <p:sldLayoutIdLst>
-    <p:sldLayoutId id="2147483662" r:id="rId3"/>
-    <p:sldLayoutId id="2147483663" r:id="rId4"/>
-    <p:sldLayoutId id="2147483664" r:id="rId5"/>
-    <p:sldLayoutId id="2147483665" r:id="rId6"/>
-    <p:sldLayoutId id="2147483666" r:id="rId7"/>
-    <p:sldLayoutId id="2147483667" r:id="rId8"/>
-    <p:sldLayoutId id="2147483668" r:id="rId9"/>
-    <p:sldLayoutId id="2147483669" r:id="rId10"/>
-    <p:sldLayoutId id="2147483670" r:id="rId11"/>
-    <p:sldLayoutId id="2147483671" r:id="rId12"/>
-    <p:sldLayoutId id="2147483672" r:id="rId13"/>
-    <p:sldLayoutId id="2147483673" r:id="rId14"/>
+    <p:sldLayoutId id="2147483662" r:id="rId1"/>
+    <p:sldLayoutId id="2147483663" r:id="rId2"/>
+    <p:sldLayoutId id="2147483664" r:id="rId3"/>
+    <p:sldLayoutId id="2147483665" r:id="rId4"/>
+    <p:sldLayoutId id="2147483666" r:id="rId5"/>
+    <p:sldLayoutId id="2147483667" r:id="rId6"/>
+    <p:sldLayoutId id="2147483668" r:id="rId7"/>
+    <p:sldLayoutId id="2147483669" r:id="rId8"/>
+    <p:sldLayoutId id="2147483670" r:id="rId9"/>
+    <p:sldLayoutId id="2147483671" r:id="rId10"/>
+    <p:sldLayoutId id="2147483672" r:id="rId11"/>
+    <p:sldLayoutId id="2147483673" r:id="rId12"/>
   </p:sldLayoutIdLst>
+  <p:txStyles>
+    <p:titleStyle/>
+    <p:bodyStyle/>
+    <p:otherStyle/>
+  </p:txStyles>
 </p:sldMaster>
 </file>
 
 <file path=ppt/slides/slide1.xml><?xml version="1.0" encoding="utf-8"?>
-<p:sld xmlns:a="http://schemas.openxmlformats.org/drawingml/2006/main" xmlns:p="http://schemas.openxmlformats.org/presentationml/2006/main" xmlns:r="http://schemas.openxmlformats.org/officeDocument/2006/relationships" xmlns:p14="http://schemas.microsoft.com/office/powerpoint/2010/main" xmlns:p15="http://schemas.microsoft.com/office/powerpoint/2012/main" xmlns:mc="http://schemas.openxmlformats.org/markup-compatibility/2006">
+<p:sld xmlns:a="http://schemas.openxmlformats.org/drawingml/2006/main" xmlns:r="http://schemas.openxmlformats.org/officeDocument/2006/relationships" xmlns:p="http://schemas.openxmlformats.org/presentationml/2006/main">
   <p:cSld>
     <p:spTree>
       <p:nvGrpSpPr>
@@ -3863,6 +4112,7 @@
         </p:spPr>
         <p:txBody>
           <a:bodyPr anchor="ctr"/>
+          <a:lstStyle/>
           <a:p>
             <a:pPr algn="ctr">
               <a:lnSpc>
@@ -3870,15 +4120,15 @@
               </a:lnSpc>
             </a:pPr>
             <a:r>
-              <a:rPr b="1" lang="pl-PL" sz="4400" spc="-1" strike="noStrike">
+              <a:rPr lang="pl-PL" sz="4400" b="1" strike="noStrike" spc="-1">
                 <a:solidFill>
-                  <a:srgbClr val="ffffff"/>
+                  <a:srgbClr val="FFFFFF"/>
                 </a:solidFill>
                 <a:latin typeface="Trebuchet MS"/>
               </a:rPr>
               <a:t>Healthiness of data</a:t>
             </a:r>
-            <a:endParaRPr b="0" lang="pl-PL" sz="4400" spc="-1" strike="noStrike">
+            <a:endParaRPr lang="pl-PL" sz="4400" b="0" strike="noStrike" spc="-1">
               <a:solidFill>
                 <a:srgbClr val="000000"/>
               </a:solidFill>
@@ -3908,6 +4158,7 @@
         </p:spPr>
         <p:txBody>
           <a:bodyPr anchor="b"/>
+          <a:lstStyle/>
           <a:p>
             <a:pPr algn="ctr">
               <a:lnSpc>
@@ -3918,15 +4169,15 @@
               </a:spcBef>
             </a:pPr>
             <a:r>
-              <a:rPr b="0" lang="en-US" sz="1500" spc="-1" strike="noStrike">
+              <a:rPr lang="en-US" sz="1500" b="0" strike="noStrike" spc="-1">
                 <a:solidFill>
-                  <a:srgbClr val="ffffff"/>
+                  <a:srgbClr val="FFFFFF"/>
                 </a:solidFill>
                 <a:latin typeface="Trebuchet MS"/>
               </a:rPr>
               <a:t>Wojciech Adamek, Dominika Maślanka, Jakub Walecki, Jacek Zalewski</a:t>
             </a:r>
-            <a:endParaRPr b="0" lang="en-US" sz="1500" spc="-1" strike="noStrike">
+            <a:endParaRPr lang="en-US" sz="1500" b="0" strike="noStrike" spc="-1">
               <a:latin typeface="Arial"/>
             </a:endParaRPr>
           </a:p>
@@ -3934,30 +4185,7 @@
       </p:sp>
       <p:pic>
         <p:nvPicPr>
-          <p:cNvPr id="90" name="Grafika 4" descr=""/>
-          <p:cNvPicPr/>
-          <p:nvPr/>
-        </p:nvPicPr>
-        <p:blipFill>
-          <a:blip r:embed="rId1"/>
-          <a:stretch/>
-        </p:blipFill>
-        <p:spPr>
-          <a:xfrm>
-            <a:off x="3653280" y="4377960"/>
-            <a:ext cx="914040" cy="914040"/>
-          </a:xfrm>
-          <a:prstGeom prst="rect">
-            <a:avLst/>
-          </a:prstGeom>
-          <a:ln>
-            <a:noFill/>
-          </a:ln>
-        </p:spPr>
-      </p:pic>
-      <p:pic>
-        <p:nvPicPr>
-          <p:cNvPr id="91" name="Grafika 6" descr=""/>
+          <p:cNvPr id="90" name="Grafika 4"/>
           <p:cNvPicPr/>
           <p:nvPr/>
         </p:nvPicPr>
@@ -3967,7 +4195,7 @@
         </p:blipFill>
         <p:spPr>
           <a:xfrm>
-            <a:off x="6268680" y="4412520"/>
+            <a:off x="3653280" y="4377960"/>
             <a:ext cx="914040" cy="914040"/>
           </a:xfrm>
           <a:prstGeom prst="rect">
@@ -3980,7 +4208,7 @@
       </p:pic>
       <p:pic>
         <p:nvPicPr>
-          <p:cNvPr id="92" name="Grafika 8" descr=""/>
+          <p:cNvPr id="91" name="Grafika 6"/>
           <p:cNvPicPr/>
           <p:nvPr/>
         </p:nvPicPr>
@@ -3990,7 +4218,7 @@
         </p:blipFill>
         <p:spPr>
           <a:xfrm>
-            <a:off x="4960800" y="4377960"/>
+            <a:off x="6268680" y="4412520"/>
             <a:ext cx="914040" cy="914040"/>
           </a:xfrm>
           <a:prstGeom prst="rect">
@@ -4001,10 +4229,36 @@
           </a:ln>
         </p:spPr>
       </p:pic>
+      <p:pic>
+        <p:nvPicPr>
+          <p:cNvPr id="92" name="Grafika 8"/>
+          <p:cNvPicPr/>
+          <p:nvPr/>
+        </p:nvPicPr>
+        <p:blipFill>
+          <a:blip r:embed="rId4"/>
+          <a:stretch/>
+        </p:blipFill>
+        <p:spPr>
+          <a:xfrm>
+            <a:off x="4960800" y="4377960"/>
+            <a:ext cx="914040" cy="914040"/>
+          </a:xfrm>
+          <a:prstGeom prst="rect">
+            <a:avLst/>
+          </a:prstGeom>
+          <a:ln>
+            <a:noFill/>
+          </a:ln>
+        </p:spPr>
+      </p:pic>
     </p:spTree>
   </p:cSld>
+  <p:clrMapOvr>
+    <a:masterClrMapping/>
+  </p:clrMapOvr>
   <p:transition>
-    <p:randomBar dir="horz"/>
+    <p:randomBar/>
   </p:transition>
   <p:timing>
     <p:tnLst>
@@ -4014,14 +4268,648 @@
             <p:seq>
               <p:cTn id="2" dur="indefinite" nodeType="mainSeq"/>
               <p:prevCondLst>
-                <p:cond delay="0" evt="onPrev">
+                <p:cond evt="onPrev" delay="0">
                   <p:tgtEl>
                     <p:sldTgt/>
                   </p:tgtEl>
                 </p:cond>
               </p:prevCondLst>
               <p:nextCondLst>
-                <p:cond delay="0" evt="onNext">
+                <p:cond evt="onNext" delay="0">
+                  <p:tgtEl>
+                    <p:sldTgt/>
+                  </p:tgtEl>
+                </p:cond>
+              </p:nextCondLst>
+            </p:seq>
+          </p:childTnLst>
+        </p:cTn>
+      </p:par>
+    </p:tnLst>
+  </p:timing>
+</p:sld>
+</file>
+
+<file path=ppt/slides/slide10.xml><?xml version="1.0" encoding="utf-8"?>
+<p:sld xmlns:a="http://schemas.openxmlformats.org/drawingml/2006/main" xmlns:r="http://schemas.openxmlformats.org/officeDocument/2006/relationships" xmlns:p="http://schemas.openxmlformats.org/presentationml/2006/main">
+  <p:cSld>
+    <p:spTree>
+      <p:nvGrpSpPr>
+        <p:cNvPr id="1" name=""/>
+        <p:cNvGrpSpPr/>
+        <p:nvPr/>
+      </p:nvGrpSpPr>
+      <p:grpSpPr>
+        <a:xfrm>
+          <a:off x="0" y="0"/>
+          <a:ext cx="0" cy="0"/>
+          <a:chOff x="0" y="0"/>
+          <a:chExt cx="0" cy="0"/>
+        </a:xfrm>
+      </p:grpSpPr>
+      <p:sp>
+        <p:nvSpPr>
+          <p:cNvPr id="106" name="TextShape 1"/>
+          <p:cNvSpPr txBox="1"/>
+          <p:nvPr/>
+        </p:nvSpPr>
+        <p:spPr>
+          <a:xfrm>
+            <a:off x="611280" y="630360"/>
+            <a:ext cx="8424360" cy="1034640"/>
+          </a:xfrm>
+          <a:prstGeom prst="rect">
+            <a:avLst/>
+          </a:prstGeom>
+          <a:noFill/>
+          <a:ln>
+            <a:noFill/>
+          </a:ln>
+        </p:spPr>
+        <p:txBody>
+          <a:bodyPr anchor="ctr"/>
+          <a:lstStyle/>
+          <a:p>
+            <a:pPr>
+              <a:lnSpc>
+                <a:spcPct val="100000"/>
+              </a:lnSpc>
+            </a:pPr>
+            <a:r>
+              <a:rPr lang="pl-PL" sz="3600" b="1" strike="noStrike" spc="-1" dirty="0">
+                <a:solidFill>
+                  <a:schemeClr val="tx2"/>
+                </a:solidFill>
+                <a:latin typeface="Trebuchet MS"/>
+              </a:rPr>
+              <a:t>Analiza porównawcza</a:t>
+            </a:r>
+            <a:endParaRPr lang="pl-PL" sz="3600" b="0" strike="noStrike" spc="-1" dirty="0">
+              <a:solidFill>
+                <a:schemeClr val="tx2"/>
+              </a:solidFill>
+              <a:latin typeface="Arial"/>
+            </a:endParaRPr>
+          </a:p>
+        </p:txBody>
+      </p:sp>
+      <p:pic>
+        <p:nvPicPr>
+          <p:cNvPr id="107" name="Obraz 4"/>
+          <p:cNvPicPr/>
+          <p:nvPr/>
+        </p:nvPicPr>
+        <p:blipFill>
+          <a:blip r:embed="rId2"/>
+          <a:stretch/>
+        </p:blipFill>
+        <p:spPr>
+          <a:xfrm>
+            <a:off x="510480" y="1787760"/>
+            <a:ext cx="7017840" cy="5015880"/>
+          </a:xfrm>
+          <a:prstGeom prst="rect">
+            <a:avLst/>
+          </a:prstGeom>
+          <a:ln>
+            <a:noFill/>
+          </a:ln>
+        </p:spPr>
+      </p:pic>
+    </p:spTree>
+  </p:cSld>
+  <p:clrMapOvr>
+    <a:masterClrMapping/>
+  </p:clrMapOvr>
+  <p:transition>
+    <p:randomBar/>
+  </p:transition>
+  <p:timing>
+    <p:tnLst>
+      <p:par>
+        <p:cTn id="1" dur="indefinite" restart="never" nodeType="tmRoot">
+          <p:childTnLst>
+            <p:seq>
+              <p:cTn id="2" dur="indefinite" nodeType="mainSeq"/>
+              <p:prevCondLst>
+                <p:cond evt="onPrev" delay="0">
+                  <p:tgtEl>
+                    <p:sldTgt/>
+                  </p:tgtEl>
+                </p:cond>
+              </p:prevCondLst>
+              <p:nextCondLst>
+                <p:cond evt="onNext" delay="0">
+                  <p:tgtEl>
+                    <p:sldTgt/>
+                  </p:tgtEl>
+                </p:cond>
+              </p:nextCondLst>
+            </p:seq>
+          </p:childTnLst>
+        </p:cTn>
+      </p:par>
+    </p:tnLst>
+  </p:timing>
+</p:sld>
+</file>
+
+<file path=ppt/slides/slide11.xml><?xml version="1.0" encoding="utf-8"?>
+<p:sld xmlns:a="http://schemas.openxmlformats.org/drawingml/2006/main" xmlns:r="http://schemas.openxmlformats.org/officeDocument/2006/relationships" xmlns:p="http://schemas.openxmlformats.org/presentationml/2006/main">
+  <p:cSld>
+    <p:spTree>
+      <p:nvGrpSpPr>
+        <p:cNvPr id="1" name=""/>
+        <p:cNvGrpSpPr/>
+        <p:nvPr/>
+      </p:nvGrpSpPr>
+      <p:grpSpPr>
+        <a:xfrm>
+          <a:off x="0" y="0"/>
+          <a:ext cx="0" cy="0"/>
+          <a:chOff x="0" y="0"/>
+          <a:chExt cx="0" cy="0"/>
+        </a:xfrm>
+      </p:grpSpPr>
+      <p:sp>
+        <p:nvSpPr>
+          <p:cNvPr id="106" name="TextShape 1"/>
+          <p:cNvSpPr txBox="1"/>
+          <p:nvPr/>
+        </p:nvSpPr>
+        <p:spPr>
+          <a:xfrm>
+            <a:off x="611280" y="630360"/>
+            <a:ext cx="8424360" cy="1034640"/>
+          </a:xfrm>
+          <a:prstGeom prst="rect">
+            <a:avLst/>
+          </a:prstGeom>
+          <a:noFill/>
+          <a:ln>
+            <a:noFill/>
+          </a:ln>
+        </p:spPr>
+        <p:txBody>
+          <a:bodyPr anchor="ctr"/>
+          <a:lstStyle/>
+          <a:p>
+            <a:pPr>
+              <a:lnSpc>
+                <a:spcPct val="100000"/>
+              </a:lnSpc>
+            </a:pPr>
+            <a:r>
+              <a:rPr lang="pl-PL" sz="3600" b="1" strike="noStrike" spc="-1" dirty="0">
+                <a:solidFill>
+                  <a:schemeClr val="tx2"/>
+                </a:solidFill>
+                <a:latin typeface="Trebuchet MS"/>
+              </a:rPr>
+              <a:t>Analiza porównawcza</a:t>
+            </a:r>
+            <a:endParaRPr lang="pl-PL" sz="3600" b="0" strike="noStrike" spc="-1" dirty="0">
+              <a:solidFill>
+                <a:schemeClr val="tx2"/>
+              </a:solidFill>
+              <a:latin typeface="Arial"/>
+            </a:endParaRPr>
+          </a:p>
+        </p:txBody>
+      </p:sp>
+      <p:pic>
+        <p:nvPicPr>
+          <p:cNvPr id="4098" name="Picture 2"/>
+          <p:cNvPicPr>
+            <a:picLocks noChangeAspect="1" noChangeArrowheads="1"/>
+          </p:cNvPicPr>
+          <p:nvPr/>
+        </p:nvPicPr>
+        <p:blipFill>
+          <a:blip r:embed="rId2">
+            <a:extLst>
+              <a:ext uri="{28A0092B-C50C-407E-A947-70E740481C1C}">
+                <a14:useLocalDpi xmlns:a14="http://schemas.microsoft.com/office/drawing/2010/main" val="0"/>
+              </a:ext>
+            </a:extLst>
+          </a:blip>
+          <a:srcRect/>
+          <a:stretch>
+            <a:fillRect/>
+          </a:stretch>
+        </p:blipFill>
+        <p:spPr bwMode="auto">
+          <a:xfrm>
+            <a:off x="524407" y="1772816"/>
+            <a:ext cx="8487941" cy="4620297"/>
+          </a:xfrm>
+          <a:prstGeom prst="rect">
+            <a:avLst/>
+          </a:prstGeom>
+          <a:noFill/>
+          <a:ln>
+            <a:noFill/>
+          </a:ln>
+          <a:effectLst/>
+          <a:extLst>
+            <a:ext uri="{909E8E84-426E-40DD-AFC4-6F175D3DCCD1}">
+              <a14:hiddenFill xmlns:a14="http://schemas.microsoft.com/office/drawing/2010/main">
+                <a:solidFill>
+                  <a:schemeClr val="accent1"/>
+                </a:solidFill>
+              </a14:hiddenFill>
+            </a:ext>
+            <a:ext uri="{91240B29-F687-4F45-9708-019B960494DF}">
+              <a14:hiddenLine xmlns:a14="http://schemas.microsoft.com/office/drawing/2010/main" w="9525">
+                <a:solidFill>
+                  <a:schemeClr val="tx1"/>
+                </a:solidFill>
+                <a:miter lim="800000"/>
+                <a:headEnd/>
+                <a:tailEnd/>
+              </a14:hiddenLine>
+            </a:ext>
+            <a:ext uri="{AF507438-7753-43E0-B8FC-AC1667EBCBE1}">
+              <a14:hiddenEffects xmlns:a14="http://schemas.microsoft.com/office/drawing/2010/main">
+                <a:effectLst>
+                  <a:outerShdw dist="35921" dir="2700000" algn="ctr" rotWithShape="0">
+                    <a:schemeClr val="bg2"/>
+                  </a:outerShdw>
+                </a:effectLst>
+              </a14:hiddenEffects>
+            </a:ext>
+          </a:extLst>
+        </p:spPr>
+      </p:pic>
+    </p:spTree>
+    <p:extLst>
+      <p:ext uri="{BB962C8B-B14F-4D97-AF65-F5344CB8AC3E}">
+        <p14:creationId xmlns:p14="http://schemas.microsoft.com/office/powerpoint/2010/main" val="230078530"/>
+      </p:ext>
+    </p:extLst>
+  </p:cSld>
+  <p:clrMapOvr>
+    <a:masterClrMapping/>
+  </p:clrMapOvr>
+  <p:transition>
+    <p:randomBar/>
+  </p:transition>
+  <p:timing>
+    <p:tnLst>
+      <p:par>
+        <p:cTn id="1" dur="indefinite" restart="never" nodeType="tmRoot">
+          <p:childTnLst>
+            <p:seq>
+              <p:cTn id="2" dur="indefinite" nodeType="mainSeq"/>
+              <p:prevCondLst>
+                <p:cond evt="onPrev" delay="0">
+                  <p:tgtEl>
+                    <p:sldTgt/>
+                  </p:tgtEl>
+                </p:cond>
+              </p:prevCondLst>
+              <p:nextCondLst>
+                <p:cond evt="onNext" delay="0">
+                  <p:tgtEl>
+                    <p:sldTgt/>
+                  </p:tgtEl>
+                </p:cond>
+              </p:nextCondLst>
+            </p:seq>
+          </p:childTnLst>
+        </p:cTn>
+      </p:par>
+    </p:tnLst>
+  </p:timing>
+</p:sld>
+</file>
+
+<file path=ppt/slides/slide12.xml><?xml version="1.0" encoding="utf-8"?>
+<p:sld xmlns:a="http://schemas.openxmlformats.org/drawingml/2006/main" xmlns:r="http://schemas.openxmlformats.org/officeDocument/2006/relationships" xmlns:p="http://schemas.openxmlformats.org/presentationml/2006/main">
+  <p:cSld>
+    <p:spTree>
+      <p:nvGrpSpPr>
+        <p:cNvPr id="1" name=""/>
+        <p:cNvGrpSpPr/>
+        <p:nvPr/>
+      </p:nvGrpSpPr>
+      <p:grpSpPr>
+        <a:xfrm>
+          <a:off x="0" y="0"/>
+          <a:ext cx="0" cy="0"/>
+          <a:chOff x="0" y="0"/>
+          <a:chExt cx="0" cy="0"/>
+        </a:xfrm>
+      </p:grpSpPr>
+      <p:pic>
+        <p:nvPicPr>
+          <p:cNvPr id="108" name="Picture 107"/>
+          <p:cNvPicPr/>
+          <p:nvPr/>
+        </p:nvPicPr>
+        <p:blipFill>
+          <a:blip r:embed="rId2"/>
+          <a:stretch/>
+        </p:blipFill>
+        <p:spPr>
+          <a:xfrm>
+            <a:off x="5852160" y="5346720"/>
+            <a:ext cx="2687040" cy="1511280"/>
+          </a:xfrm>
+          <a:prstGeom prst="rect">
+            <a:avLst/>
+          </a:prstGeom>
+          <a:ln>
+            <a:noFill/>
+          </a:ln>
+        </p:spPr>
+      </p:pic>
+      <p:sp>
+        <p:nvSpPr>
+          <p:cNvPr id="109" name="TextShape 1"/>
+          <p:cNvSpPr txBox="1"/>
+          <p:nvPr/>
+        </p:nvSpPr>
+        <p:spPr>
+          <a:xfrm>
+            <a:off x="611280" y="630360"/>
+            <a:ext cx="8424360" cy="1034640"/>
+          </a:xfrm>
+          <a:prstGeom prst="rect">
+            <a:avLst/>
+          </a:prstGeom>
+          <a:noFill/>
+          <a:ln>
+            <a:noFill/>
+          </a:ln>
+        </p:spPr>
+        <p:txBody>
+          <a:bodyPr anchor="ctr"/>
+          <a:lstStyle/>
+          <a:p>
+            <a:pPr>
+              <a:lnSpc>
+                <a:spcPct val="100000"/>
+              </a:lnSpc>
+            </a:pPr>
+            <a:r>
+              <a:rPr lang="pl-PL" sz="3600" b="1" strike="noStrike" spc="-1" dirty="0" smtClean="0">
+                <a:solidFill>
+                  <a:schemeClr val="tx2"/>
+                </a:solidFill>
+                <a:latin typeface="Trebuchet MS"/>
+              </a:rPr>
+              <a:t>Użyte technologie</a:t>
+            </a:r>
+            <a:endParaRPr lang="pl-PL" sz="3600" b="0" strike="noStrike" spc="-1" dirty="0">
+              <a:solidFill>
+                <a:schemeClr val="tx2"/>
+              </a:solidFill>
+              <a:latin typeface="Arial"/>
+            </a:endParaRPr>
+          </a:p>
+        </p:txBody>
+      </p:sp>
+      <p:pic>
+        <p:nvPicPr>
+          <p:cNvPr id="110" name="Picture 109"/>
+          <p:cNvPicPr/>
+          <p:nvPr/>
+        </p:nvPicPr>
+        <p:blipFill>
+          <a:blip r:embed="rId3"/>
+          <a:stretch/>
+        </p:blipFill>
+        <p:spPr>
+          <a:xfrm>
+            <a:off x="182880" y="1815840"/>
+            <a:ext cx="2926080" cy="2926080"/>
+          </a:xfrm>
+          <a:prstGeom prst="rect">
+            <a:avLst/>
+          </a:prstGeom>
+          <a:ln>
+            <a:noFill/>
+          </a:ln>
+        </p:spPr>
+      </p:pic>
+      <p:pic>
+        <p:nvPicPr>
+          <p:cNvPr id="111" name="Picture 110"/>
+          <p:cNvPicPr/>
+          <p:nvPr/>
+        </p:nvPicPr>
+        <p:blipFill>
+          <a:blip r:embed="rId4"/>
+          <a:stretch/>
+        </p:blipFill>
+        <p:spPr>
+          <a:xfrm>
+            <a:off x="3017880" y="5443200"/>
+            <a:ext cx="2247480" cy="1400760"/>
+          </a:xfrm>
+          <a:prstGeom prst="rect">
+            <a:avLst/>
+          </a:prstGeom>
+          <a:ln>
+            <a:noFill/>
+          </a:ln>
+        </p:spPr>
+      </p:pic>
+      <p:pic>
+        <p:nvPicPr>
+          <p:cNvPr id="112" name="Picture 111"/>
+          <p:cNvPicPr/>
+          <p:nvPr/>
+        </p:nvPicPr>
+        <p:blipFill>
+          <a:blip r:embed="rId5"/>
+          <a:stretch/>
+        </p:blipFill>
+        <p:spPr>
+          <a:xfrm>
+            <a:off x="548640" y="5537880"/>
+            <a:ext cx="2194560" cy="1228680"/>
+          </a:xfrm>
+          <a:prstGeom prst="rect">
+            <a:avLst/>
+          </a:prstGeom>
+          <a:ln>
+            <a:noFill/>
+          </a:ln>
+        </p:spPr>
+      </p:pic>
+      <p:pic>
+        <p:nvPicPr>
+          <p:cNvPr id="113" name="Picture 112"/>
+          <p:cNvPicPr/>
+          <p:nvPr/>
+        </p:nvPicPr>
+        <p:blipFill>
+          <a:blip r:embed="rId6"/>
+          <a:stretch/>
+        </p:blipFill>
+        <p:spPr>
+          <a:xfrm>
+            <a:off x="2926080" y="1972080"/>
+            <a:ext cx="2468880" cy="2468880"/>
+          </a:xfrm>
+          <a:prstGeom prst="rect">
+            <a:avLst/>
+          </a:prstGeom>
+          <a:ln>
+            <a:noFill/>
+          </a:ln>
+        </p:spPr>
+      </p:pic>
+      <p:pic>
+        <p:nvPicPr>
+          <p:cNvPr id="114" name="Picture 113"/>
+          <p:cNvPicPr/>
+          <p:nvPr/>
+        </p:nvPicPr>
+        <p:blipFill>
+          <a:blip r:embed="rId7"/>
+          <a:stretch/>
+        </p:blipFill>
+        <p:spPr>
+          <a:xfrm>
+            <a:off x="5311080" y="2021760"/>
+            <a:ext cx="3953520" cy="2650680"/>
+          </a:xfrm>
+          <a:prstGeom prst="rect">
+            <a:avLst/>
+          </a:prstGeom>
+          <a:ln>
+            <a:noFill/>
+          </a:ln>
+        </p:spPr>
+      </p:pic>
+    </p:spTree>
+  </p:cSld>
+  <p:clrMapOvr>
+    <a:masterClrMapping/>
+  </p:clrMapOvr>
+  <p:transition>
+    <p:randomBar/>
+  </p:transition>
+  <p:timing>
+    <p:tnLst>
+      <p:par>
+        <p:cTn id="1" dur="indefinite" restart="never" nodeType="tmRoot">
+          <p:childTnLst>
+            <p:seq>
+              <p:cTn id="2" dur="indefinite" nodeType="mainSeq"/>
+              <p:prevCondLst>
+                <p:cond evt="onPrev" delay="0">
+                  <p:tgtEl>
+                    <p:sldTgt/>
+                  </p:tgtEl>
+                </p:cond>
+              </p:prevCondLst>
+              <p:nextCondLst>
+                <p:cond evt="onNext" delay="0">
+                  <p:tgtEl>
+                    <p:sldTgt/>
+                  </p:tgtEl>
+                </p:cond>
+              </p:nextCondLst>
+            </p:seq>
+          </p:childTnLst>
+        </p:cTn>
+      </p:par>
+    </p:tnLst>
+  </p:timing>
+</p:sld>
+</file>
+
+<file path=ppt/slides/slide13.xml><?xml version="1.0" encoding="utf-8"?>
+<p:sld xmlns:a="http://schemas.openxmlformats.org/drawingml/2006/main" xmlns:r="http://schemas.openxmlformats.org/officeDocument/2006/relationships" xmlns:p="http://schemas.openxmlformats.org/presentationml/2006/main">
+  <p:cSld>
+    <p:spTree>
+      <p:nvGrpSpPr>
+        <p:cNvPr id="1" name=""/>
+        <p:cNvGrpSpPr/>
+        <p:nvPr/>
+      </p:nvGrpSpPr>
+      <p:grpSpPr>
+        <a:xfrm>
+          <a:off x="0" y="0"/>
+          <a:ext cx="0" cy="0"/>
+          <a:chOff x="0" y="0"/>
+          <a:chExt cx="0" cy="0"/>
+        </a:xfrm>
+      </p:grpSpPr>
+      <p:sp>
+        <p:nvSpPr>
+          <p:cNvPr id="115" name="TextShape 1"/>
+          <p:cNvSpPr txBox="1"/>
+          <p:nvPr/>
+        </p:nvSpPr>
+        <p:spPr>
+          <a:xfrm>
+            <a:off x="1873080" y="2130480"/>
+            <a:ext cx="7089480" cy="2018880"/>
+          </a:xfrm>
+          <a:prstGeom prst="rect">
+            <a:avLst/>
+          </a:prstGeom>
+          <a:noFill/>
+          <a:ln>
+            <a:noFill/>
+          </a:ln>
+        </p:spPr>
+        <p:txBody>
+          <a:bodyPr anchor="ctr"/>
+          <a:lstStyle/>
+          <a:p>
+            <a:pPr algn="ctr">
+              <a:lnSpc>
+                <a:spcPct val="100000"/>
+              </a:lnSpc>
+            </a:pPr>
+            <a:r>
+              <a:rPr lang="pl-PL" sz="3600" b="1" strike="noStrike" spc="-1">
+                <a:solidFill>
+                  <a:srgbClr val="FFFFFF"/>
+                </a:solidFill>
+                <a:latin typeface="Trebuchet MS"/>
+              </a:rPr>
+              <a:t>Dziękujemy za uwagę!</a:t>
+            </a:r>
+            <a:endParaRPr lang="pl-PL" sz="3600" b="0" strike="noStrike" spc="-1">
+              <a:solidFill>
+                <a:srgbClr val="000000"/>
+              </a:solidFill>
+              <a:latin typeface="Arial"/>
+            </a:endParaRPr>
+          </a:p>
+        </p:txBody>
+      </p:sp>
+    </p:spTree>
+  </p:cSld>
+  <p:clrMapOvr>
+    <a:masterClrMapping/>
+  </p:clrMapOvr>
+  <p:transition>
+    <p:randomBar/>
+  </p:transition>
+  <p:timing>
+    <p:tnLst>
+      <p:par>
+        <p:cTn id="1" dur="indefinite" restart="never" nodeType="tmRoot">
+          <p:childTnLst>
+            <p:seq>
+              <p:cTn id="2" dur="indefinite" nodeType="mainSeq"/>
+              <p:prevCondLst>
+                <p:cond evt="onPrev" delay="0">
+                  <p:tgtEl>
+                    <p:sldTgt/>
+                  </p:tgtEl>
+                </p:cond>
+              </p:prevCondLst>
+              <p:nextCondLst>
+                <p:cond evt="onNext" delay="0">
                   <p:tgtEl>
                     <p:sldTgt/>
                   </p:tgtEl>
@@ -4037,7 +4925,7 @@
 </file>
 
 <file path=ppt/slides/slide2.xml><?xml version="1.0" encoding="utf-8"?>
-<p:sld xmlns:a="http://schemas.openxmlformats.org/drawingml/2006/main" xmlns:p="http://schemas.openxmlformats.org/presentationml/2006/main" xmlns:r="http://schemas.openxmlformats.org/officeDocument/2006/relationships" xmlns:p14="http://schemas.microsoft.com/office/powerpoint/2010/main" xmlns:p15="http://schemas.microsoft.com/office/powerpoint/2012/main" xmlns:mc="http://schemas.openxmlformats.org/markup-compatibility/2006">
+<p:sld xmlns:a="http://schemas.openxmlformats.org/drawingml/2006/main" xmlns:r="http://schemas.openxmlformats.org/officeDocument/2006/relationships" xmlns:p="http://schemas.openxmlformats.org/presentationml/2006/main">
   <p:cSld>
     <p:spTree>
       <p:nvGrpSpPr>
@@ -4074,6 +4962,7 @@
         </p:spPr>
         <p:txBody>
           <a:bodyPr anchor="ctr"/>
+          <a:lstStyle/>
           <a:p>
             <a:pPr>
               <a:lnSpc>
@@ -4081,17 +4970,17 @@
               </a:lnSpc>
             </a:pPr>
             <a:r>
-              <a:rPr b="1" lang="pl-PL" sz="3600" spc="-1" strike="noStrike">
+              <a:rPr lang="pl-PL" sz="3600" b="1" strike="noStrike" spc="-1" dirty="0">
                 <a:solidFill>
-                  <a:srgbClr val="ffffff"/>
+                  <a:schemeClr val="tx2"/>
                 </a:solidFill>
                 <a:latin typeface="Arial"/>
               </a:rPr>
               <a:t>Cele projektu</a:t>
             </a:r>
-            <a:endParaRPr b="0" lang="pl-PL" sz="3600" spc="-1" strike="noStrike">
-              <a:solidFill>
-                <a:srgbClr val="000000"/>
+            <a:endParaRPr lang="pl-PL" sz="3600" b="0" strike="noStrike" spc="-1" dirty="0">
+              <a:solidFill>
+                <a:schemeClr val="tx2"/>
               </a:solidFill>
               <a:latin typeface="Arial"/>
             </a:endParaRPr>
@@ -4106,7 +4995,7 @@
         </p:nvSpPr>
         <p:spPr>
           <a:xfrm>
-            <a:off x="1280160" y="2560320"/>
+            <a:off x="533283" y="1772816"/>
             <a:ext cx="7498080" cy="2824920"/>
           </a:xfrm>
           <a:prstGeom prst="rect">
@@ -4118,119 +5007,161 @@
           </a:ln>
         </p:spPr>
         <p:txBody>
-          <a:bodyPr lIns="90000" rIns="90000" tIns="45000" bIns="45000"/>
+          <a:bodyPr lIns="90000" tIns="45000" rIns="90000" bIns="45000"/>
+          <a:lstStyle/>
+          <a:p>
+            <a:pPr marL="457200" indent="-457200">
+              <a:lnSpc>
+                <a:spcPct val="200000"/>
+              </a:lnSpc>
+              <a:buFont typeface="Arial" pitchFamily="34" charset="0"/>
+              <a:buChar char="•"/>
+            </a:pPr>
+            <a:r>
+              <a:rPr lang="pl-PL" sz="3200" b="0" strike="noStrike" spc="-1" dirty="0" smtClean="0">
+                <a:solidFill>
+                  <a:schemeClr val="tx2"/>
+                </a:solidFill>
+                <a:latin typeface="Arial"/>
+              </a:rPr>
+              <a:t>Oczyszczenie</a:t>
+            </a:r>
+            <a:r>
+              <a:rPr lang="pl-PL" sz="3200" b="0" strike="noStrike" spc="-1" dirty="0" smtClean="0">
+                <a:solidFill>
+                  <a:srgbClr val="182F7C"/>
+                </a:solidFill>
+                <a:latin typeface="Arial"/>
+              </a:rPr>
+              <a:t> dostarczanych danych</a:t>
+            </a:r>
+            <a:endParaRPr lang="en-US" sz="3200" b="0" strike="noStrike" spc="-1" dirty="0">
+              <a:solidFill>
+                <a:srgbClr val="182F7C"/>
+              </a:solidFill>
+              <a:latin typeface="Arial"/>
+            </a:endParaRPr>
+          </a:p>
+          <a:p>
+            <a:pPr marL="457200" indent="-457200">
+              <a:lnSpc>
+                <a:spcPct val="200000"/>
+              </a:lnSpc>
+              <a:buFont typeface="Arial" pitchFamily="34" charset="0"/>
+              <a:buChar char="•"/>
+            </a:pPr>
+            <a:r>
+              <a:rPr lang="pl-PL" sz="3200" b="0" strike="noStrike" spc="-1" dirty="0" smtClean="0">
+                <a:solidFill>
+                  <a:srgbClr val="182F7C"/>
+                </a:solidFill>
+                <a:latin typeface="Arial"/>
+              </a:rPr>
+              <a:t>Elastyczne </a:t>
+            </a:r>
+            <a:r>
+              <a:rPr lang="pl-PL" sz="3200" b="0" strike="noStrike" spc="-1" dirty="0">
+                <a:solidFill>
+                  <a:srgbClr val="182F7C"/>
+                </a:solidFill>
+                <a:latin typeface="Arial"/>
+              </a:rPr>
+              <a:t>narzędzia analizy</a:t>
+            </a:r>
+            <a:endParaRPr lang="en-US" sz="3200" b="0" strike="noStrike" spc="-1" dirty="0">
+              <a:solidFill>
+                <a:srgbClr val="182F7C"/>
+              </a:solidFill>
+              <a:latin typeface="Arial"/>
+            </a:endParaRPr>
+          </a:p>
+          <a:p>
+            <a:pPr marL="457200" indent="-457200">
+              <a:lnSpc>
+                <a:spcPct val="200000"/>
+              </a:lnSpc>
+              <a:buFont typeface="Arial" pitchFamily="34" charset="0"/>
+              <a:buChar char="•"/>
+            </a:pPr>
+            <a:r>
+              <a:rPr lang="pl-PL" sz="3200" b="0" strike="noStrike" spc="-1" dirty="0" smtClean="0">
+                <a:solidFill>
+                  <a:srgbClr val="182F7C"/>
+                </a:solidFill>
+                <a:latin typeface="Arial"/>
+              </a:rPr>
+              <a:t>Dobra </a:t>
+            </a:r>
+            <a:r>
+              <a:rPr lang="pl-PL" sz="3200" b="0" strike="noStrike" spc="-1" dirty="0">
+                <a:solidFill>
+                  <a:srgbClr val="182F7C"/>
+                </a:solidFill>
+                <a:latin typeface="Arial"/>
+              </a:rPr>
+              <a:t>dostępność </a:t>
+            </a:r>
+            <a:r>
+              <a:rPr lang="pl-PL" sz="3200" b="0" strike="noStrike" spc="-1" dirty="0" smtClean="0">
+                <a:solidFill>
+                  <a:srgbClr val="182F7C"/>
+                </a:solidFill>
+                <a:latin typeface="Arial"/>
+              </a:rPr>
+              <a:t>wyników</a:t>
+            </a:r>
+          </a:p>
+          <a:p>
+            <a:pPr marL="457200" indent="-457200">
+              <a:lnSpc>
+                <a:spcPct val="200000"/>
+              </a:lnSpc>
+              <a:buFont typeface="Arial" pitchFamily="34" charset="0"/>
+              <a:buChar char="•"/>
+            </a:pPr>
+            <a:r>
+              <a:rPr lang="pl-PL" sz="3200" spc="-1" dirty="0" smtClean="0">
+                <a:solidFill>
+                  <a:srgbClr val="182F7C"/>
+                </a:solidFill>
+                <a:latin typeface="Arial"/>
+              </a:rPr>
+              <a:t>Wygodny interfejs użytkownika</a:t>
+            </a:r>
+          </a:p>
+          <a:p>
+            <a:pPr marL="457200" indent="-457200">
+              <a:lnSpc>
+                <a:spcPct val="200000"/>
+              </a:lnSpc>
+              <a:buFont typeface="Arial" pitchFamily="34" charset="0"/>
+              <a:buChar char="•"/>
+            </a:pPr>
+            <a:r>
+              <a:rPr lang="pl-PL" sz="3200" spc="-1" dirty="0" smtClean="0">
+                <a:solidFill>
+                  <a:srgbClr val="182F7C"/>
+                </a:solidFill>
+                <a:latin typeface="Arial"/>
+              </a:rPr>
+              <a:t>Modułowość i łatwa rozszerzalność</a:t>
+            </a:r>
+            <a:endParaRPr lang="pl-PL" sz="3200" spc="-1" dirty="0">
+              <a:solidFill>
+                <a:srgbClr val="182F7C"/>
+              </a:solidFill>
+              <a:latin typeface="Arial"/>
+            </a:endParaRPr>
+          </a:p>
           <a:p>
             <a:pPr>
               <a:lnSpc>
                 <a:spcPct val="200000"/>
               </a:lnSpc>
             </a:pPr>
-            <a:r>
-              <a:rPr b="0" lang="pl-PL" sz="3200" spc="-1" strike="noStrike">
-                <a:solidFill>
-                  <a:srgbClr val="182f7c"/>
-                </a:solidFill>
-                <a:latin typeface="Arial"/>
-                <a:ea typeface="Arial"/>
-              </a:rPr>
-              <a:t>• </a:t>
-            </a:r>
-            <a:r>
-              <a:rPr b="0" lang="pl-PL" sz="3200" spc="-1" strike="noStrike">
-                <a:solidFill>
-                  <a:srgbClr val="182f7c"/>
-                </a:solidFill>
-                <a:latin typeface="Arial"/>
-              </a:rPr>
-              <a:t>Oczyszczenie danych dostarczanych</a:t>
-            </a:r>
-            <a:endParaRPr b="0" lang="en-US" sz="3200" spc="-1" strike="noStrike">
-              <a:solidFill>
-                <a:srgbClr val="182f7c"/>
-              </a:solidFill>
-              <a:latin typeface="Arial"/>
-            </a:endParaRPr>
-          </a:p>
-          <a:p>
-            <a:pPr>
-              <a:lnSpc>
-                <a:spcPct val="200000"/>
-              </a:lnSpc>
-            </a:pPr>
-            <a:r>
-              <a:rPr b="0" lang="pl-PL" sz="3200" spc="-1" strike="noStrike">
-                <a:solidFill>
-                  <a:srgbClr val="182f7c"/>
-                </a:solidFill>
-                <a:latin typeface="Arial"/>
-                <a:ea typeface="Arial"/>
-              </a:rPr>
-              <a:t>•</a:t>
-            </a:r>
-            <a:r>
-              <a:rPr b="0" lang="pl-PL" sz="3200" spc="-1" strike="noStrike">
-                <a:solidFill>
-                  <a:srgbClr val="182f7c"/>
-                </a:solidFill>
-                <a:latin typeface="Arial"/>
-                <a:ea typeface="Arial"/>
-              </a:rPr>
-              <a:t> </a:t>
-            </a:r>
-            <a:r>
-              <a:rPr b="0" lang="pl-PL" sz="3200" spc="-1" strike="noStrike">
-                <a:solidFill>
-                  <a:srgbClr val="182f7c"/>
-                </a:solidFill>
-                <a:latin typeface="Arial"/>
-              </a:rPr>
-              <a:t>Elastyczne narzędzia analizy</a:t>
-            </a:r>
-            <a:endParaRPr b="0" lang="en-US" sz="3200" spc="-1" strike="noStrike">
-              <a:solidFill>
-                <a:srgbClr val="182f7c"/>
-              </a:solidFill>
-              <a:latin typeface="Arial"/>
-            </a:endParaRPr>
-          </a:p>
-          <a:p>
-            <a:pPr>
-              <a:lnSpc>
-                <a:spcPct val="200000"/>
-              </a:lnSpc>
-            </a:pPr>
-            <a:r>
-              <a:rPr b="0" lang="pl-PL" sz="3200" spc="-1" strike="noStrike">
-                <a:solidFill>
-                  <a:srgbClr val="182f7c"/>
-                </a:solidFill>
-                <a:latin typeface="Arial"/>
-                <a:ea typeface="Arial"/>
-              </a:rPr>
-              <a:t>•</a:t>
-            </a:r>
-            <a:r>
-              <a:rPr b="0" lang="pl-PL" sz="3200" spc="-1" strike="noStrike">
-                <a:solidFill>
-                  <a:srgbClr val="182f7c"/>
-                </a:solidFill>
-                <a:latin typeface="Arial"/>
-                <a:ea typeface="Arial"/>
-              </a:rPr>
-              <a:t> </a:t>
-            </a:r>
-            <a:r>
-              <a:rPr b="0" lang="pl-PL" sz="3200" spc="-1" strike="noStrike">
-                <a:solidFill>
-                  <a:srgbClr val="182f7c"/>
-                </a:solidFill>
-                <a:latin typeface="Arial"/>
-              </a:rPr>
-              <a:t>Dobra dostępność wyników</a:t>
-            </a:r>
-            <a:endParaRPr b="0" lang="en-US" sz="3200" spc="-1" strike="noStrike">
-              <a:solidFill>
-                <a:srgbClr val="182f7c"/>
+            <a:endParaRPr lang="pl-PL" sz="3200" b="0" strike="noStrike" spc="-1" dirty="0" smtClean="0">
+              <a:solidFill>
+                <a:srgbClr val="182F7C"/>
               </a:solidFill>
               <a:latin typeface="Arial"/>
             </a:endParaRPr>
@@ -4239,25 +5170,28 @@
       </p:sp>
     </p:spTree>
   </p:cSld>
+  <p:clrMapOvr>
+    <a:masterClrMapping/>
+  </p:clrMapOvr>
   <p:transition>
-    <p:randomBar dir="horz"/>
+    <p:randomBar/>
   </p:transition>
   <p:timing>
     <p:tnLst>
       <p:par>
-        <p:cTn id="3" dur="indefinite" restart="never" nodeType="tmRoot">
+        <p:cTn id="1" dur="indefinite" restart="never" nodeType="tmRoot">
           <p:childTnLst>
             <p:seq>
-              <p:cTn id="4" dur="indefinite" nodeType="mainSeq"/>
+              <p:cTn id="2" dur="indefinite" nodeType="mainSeq"/>
               <p:prevCondLst>
-                <p:cond delay="0" evt="onPrev">
+                <p:cond evt="onPrev" delay="0">
                   <p:tgtEl>
                     <p:sldTgt/>
                   </p:tgtEl>
                 </p:cond>
               </p:prevCondLst>
               <p:nextCondLst>
-                <p:cond delay="0" evt="onNext">
+                <p:cond evt="onNext" delay="0">
                   <p:tgtEl>
                     <p:sldTgt/>
                   </p:tgtEl>
@@ -4273,7 +5207,7 @@
 </file>
 
 <file path=ppt/slides/slide3.xml><?xml version="1.0" encoding="utf-8"?>
-<p:sld xmlns:a="http://schemas.openxmlformats.org/drawingml/2006/main" xmlns:p="http://schemas.openxmlformats.org/presentationml/2006/main" xmlns:r="http://schemas.openxmlformats.org/officeDocument/2006/relationships" xmlns:p14="http://schemas.microsoft.com/office/powerpoint/2010/main" xmlns:p15="http://schemas.microsoft.com/office/powerpoint/2012/main" xmlns:mc="http://schemas.openxmlformats.org/markup-compatibility/2006">
+<p:sld xmlns:a="http://schemas.openxmlformats.org/drawingml/2006/main" xmlns:r="http://schemas.openxmlformats.org/officeDocument/2006/relationships" xmlns:p="http://schemas.openxmlformats.org/presentationml/2006/main">
   <p:cSld>
     <p:spTree>
       <p:nvGrpSpPr>
@@ -4310,6 +5244,7 @@
         </p:spPr>
         <p:txBody>
           <a:bodyPr anchor="ctr"/>
+          <a:lstStyle/>
           <a:p>
             <a:pPr>
               <a:lnSpc>
@@ -4317,17 +5252,17 @@
               </a:lnSpc>
             </a:pPr>
             <a:r>
-              <a:rPr b="1" lang="pl-PL" sz="3600" spc="-1" strike="noStrike">
+              <a:rPr lang="pl-PL" sz="3600" b="1" strike="noStrike" spc="-1" dirty="0">
                 <a:solidFill>
-                  <a:srgbClr val="ffffff"/>
+                  <a:schemeClr val="tx2"/>
                 </a:solidFill>
                 <a:latin typeface="Arial"/>
               </a:rPr>
               <a:t>Agregaty i histogramy</a:t>
             </a:r>
-            <a:endParaRPr b="0" lang="pl-PL" sz="3600" spc="-1" strike="noStrike">
-              <a:solidFill>
-                <a:srgbClr val="000000"/>
+            <a:endParaRPr lang="pl-PL" sz="3600" b="0" strike="noStrike" spc="-1" dirty="0">
+              <a:solidFill>
+                <a:schemeClr val="tx2"/>
               </a:solidFill>
               <a:latin typeface="Arial"/>
             </a:endParaRPr>
@@ -4336,12 +5271,12 @@
       </p:sp>
       <p:pic>
         <p:nvPicPr>
-          <p:cNvPr id="96" name="Obraz 4" descr=""/>
+          <p:cNvPr id="96" name="Obraz 4"/>
           <p:cNvPicPr/>
           <p:nvPr/>
         </p:nvPicPr>
         <p:blipFill>
-          <a:blip r:embed="rId1"/>
+          <a:blip r:embed="rId2"/>
           <a:stretch/>
         </p:blipFill>
         <p:spPr>
@@ -4359,25 +5294,28 @@
       </p:pic>
     </p:spTree>
   </p:cSld>
+  <p:clrMapOvr>
+    <a:masterClrMapping/>
+  </p:clrMapOvr>
   <p:transition>
-    <p:randomBar dir="horz"/>
+    <p:randomBar/>
   </p:transition>
   <p:timing>
     <p:tnLst>
       <p:par>
-        <p:cTn id="5" dur="indefinite" restart="never" nodeType="tmRoot">
+        <p:cTn id="1" dur="indefinite" restart="never" nodeType="tmRoot">
           <p:childTnLst>
             <p:seq>
-              <p:cTn id="6" dur="indefinite" nodeType="mainSeq"/>
+              <p:cTn id="2" dur="indefinite" nodeType="mainSeq"/>
               <p:prevCondLst>
-                <p:cond delay="0" evt="onPrev">
+                <p:cond evt="onPrev" delay="0">
                   <p:tgtEl>
                     <p:sldTgt/>
                   </p:tgtEl>
                 </p:cond>
               </p:prevCondLst>
               <p:nextCondLst>
-                <p:cond delay="0" evt="onNext">
+                <p:cond evt="onNext" delay="0">
                   <p:tgtEl>
                     <p:sldTgt/>
                   </p:tgtEl>
@@ -4393,7 +5331,7 @@
 </file>
 
 <file path=ppt/slides/slide4.xml><?xml version="1.0" encoding="utf-8"?>
-<p:sld xmlns:a="http://schemas.openxmlformats.org/drawingml/2006/main" xmlns:p="http://schemas.openxmlformats.org/presentationml/2006/main" xmlns:r="http://schemas.openxmlformats.org/officeDocument/2006/relationships" xmlns:p14="http://schemas.microsoft.com/office/powerpoint/2010/main" xmlns:p15="http://schemas.microsoft.com/office/powerpoint/2012/main" xmlns:mc="http://schemas.openxmlformats.org/markup-compatibility/2006">
+<p:sld xmlns:a="http://schemas.openxmlformats.org/drawingml/2006/main" xmlns:r="http://schemas.openxmlformats.org/officeDocument/2006/relationships" xmlns:p="http://schemas.openxmlformats.org/presentationml/2006/main">
   <p:cSld>
     <p:spTree>
       <p:nvGrpSpPr>
@@ -4411,7 +5349,7 @@
       </p:grpSpPr>
       <p:sp>
         <p:nvSpPr>
-          <p:cNvPr id="97" name="TextShape 1"/>
+          <p:cNvPr id="95" name="TextShape 1"/>
           <p:cNvSpPr txBox="1"/>
           <p:nvPr/>
         </p:nvSpPr>
@@ -4430,6 +5368,7 @@
         </p:spPr>
         <p:txBody>
           <a:bodyPr anchor="ctr"/>
+          <a:lstStyle/>
           <a:p>
             <a:pPr>
               <a:lnSpc>
@@ -4437,17 +5376,187 @@
               </a:lnSpc>
             </a:pPr>
             <a:r>
-              <a:rPr b="1" lang="pl-PL" sz="3600" spc="-1" strike="noStrike">
+              <a:rPr lang="pl-PL" sz="3600" b="1" strike="noStrike" spc="-1" dirty="0">
                 <a:solidFill>
-                  <a:srgbClr val="ffffff"/>
+                  <a:schemeClr val="tx2"/>
+                </a:solidFill>
+                <a:latin typeface="Arial"/>
+              </a:rPr>
+              <a:t>Agregaty i histogramy</a:t>
+            </a:r>
+            <a:endParaRPr lang="pl-PL" sz="3600" b="0" strike="noStrike" spc="-1" dirty="0">
+              <a:solidFill>
+                <a:schemeClr val="tx2"/>
+              </a:solidFill>
+              <a:latin typeface="Arial"/>
+            </a:endParaRPr>
+          </a:p>
+        </p:txBody>
+      </p:sp>
+      <p:pic>
+        <p:nvPicPr>
+          <p:cNvPr id="1026" name="Picture 2"/>
+          <p:cNvPicPr>
+            <a:picLocks noChangeAspect="1" noChangeArrowheads="1"/>
+          </p:cNvPicPr>
+          <p:nvPr/>
+        </p:nvPicPr>
+        <p:blipFill>
+          <a:blip r:embed="rId2">
+            <a:extLst>
+              <a:ext uri="{28A0092B-C50C-407E-A947-70E740481C1C}">
+                <a14:useLocalDpi xmlns:a14="http://schemas.microsoft.com/office/drawing/2010/main" val="0"/>
+              </a:ext>
+            </a:extLst>
+          </a:blip>
+          <a:srcRect/>
+          <a:stretch>
+            <a:fillRect/>
+          </a:stretch>
+        </p:blipFill>
+        <p:spPr bwMode="auto">
+          <a:xfrm>
+            <a:off x="527841" y="1772816"/>
+            <a:ext cx="8591237" cy="4896544"/>
+          </a:xfrm>
+          <a:prstGeom prst="rect">
+            <a:avLst/>
+          </a:prstGeom>
+          <a:noFill/>
+          <a:ln>
+            <a:noFill/>
+          </a:ln>
+          <a:effectLst/>
+          <a:extLst>
+            <a:ext uri="{909E8E84-426E-40DD-AFC4-6F175D3DCCD1}">
+              <a14:hiddenFill xmlns:a14="http://schemas.microsoft.com/office/drawing/2010/main">
+                <a:solidFill>
+                  <a:schemeClr val="accent1"/>
+                </a:solidFill>
+              </a14:hiddenFill>
+            </a:ext>
+            <a:ext uri="{91240B29-F687-4F45-9708-019B960494DF}">
+              <a14:hiddenLine xmlns:a14="http://schemas.microsoft.com/office/drawing/2010/main" w="9525">
+                <a:solidFill>
+                  <a:schemeClr val="tx1"/>
+                </a:solidFill>
+                <a:miter lim="800000"/>
+                <a:headEnd/>
+                <a:tailEnd/>
+              </a14:hiddenLine>
+            </a:ext>
+            <a:ext uri="{AF507438-7753-43E0-B8FC-AC1667EBCBE1}">
+              <a14:hiddenEffects xmlns:a14="http://schemas.microsoft.com/office/drawing/2010/main">
+                <a:effectLst>
+                  <a:outerShdw dist="35921" dir="2700000" algn="ctr" rotWithShape="0">
+                    <a:schemeClr val="bg2"/>
+                  </a:outerShdw>
+                </a:effectLst>
+              </a14:hiddenEffects>
+            </a:ext>
+          </a:extLst>
+        </p:spPr>
+      </p:pic>
+    </p:spTree>
+    <p:extLst>
+      <p:ext uri="{BB962C8B-B14F-4D97-AF65-F5344CB8AC3E}">
+        <p14:creationId xmlns:p14="http://schemas.microsoft.com/office/powerpoint/2010/main" val="3464122686"/>
+      </p:ext>
+    </p:extLst>
+  </p:cSld>
+  <p:clrMapOvr>
+    <a:masterClrMapping/>
+  </p:clrMapOvr>
+  <p:transition>
+    <p:randomBar/>
+  </p:transition>
+  <p:timing>
+    <p:tnLst>
+      <p:par>
+        <p:cTn id="1" dur="indefinite" restart="never" nodeType="tmRoot">
+          <p:childTnLst>
+            <p:seq>
+              <p:cTn id="2" dur="indefinite" nodeType="mainSeq"/>
+              <p:prevCondLst>
+                <p:cond evt="onPrev" delay="0">
+                  <p:tgtEl>
+                    <p:sldTgt/>
+                  </p:tgtEl>
+                </p:cond>
+              </p:prevCondLst>
+              <p:nextCondLst>
+                <p:cond evt="onNext" delay="0">
+                  <p:tgtEl>
+                    <p:sldTgt/>
+                  </p:tgtEl>
+                </p:cond>
+              </p:nextCondLst>
+            </p:seq>
+          </p:childTnLst>
+        </p:cTn>
+      </p:par>
+    </p:tnLst>
+  </p:timing>
+</p:sld>
+</file>
+
+<file path=ppt/slides/slide5.xml><?xml version="1.0" encoding="utf-8"?>
+<p:sld xmlns:a="http://schemas.openxmlformats.org/drawingml/2006/main" xmlns:r="http://schemas.openxmlformats.org/officeDocument/2006/relationships" xmlns:p="http://schemas.openxmlformats.org/presentationml/2006/main">
+  <p:cSld>
+    <p:spTree>
+      <p:nvGrpSpPr>
+        <p:cNvPr id="1" name=""/>
+        <p:cNvGrpSpPr/>
+        <p:nvPr/>
+      </p:nvGrpSpPr>
+      <p:grpSpPr>
+        <a:xfrm>
+          <a:off x="0" y="0"/>
+          <a:ext cx="0" cy="0"/>
+          <a:chOff x="0" y="0"/>
+          <a:chExt cx="0" cy="0"/>
+        </a:xfrm>
+      </p:grpSpPr>
+      <p:sp>
+        <p:nvSpPr>
+          <p:cNvPr id="97" name="TextShape 1"/>
+          <p:cNvSpPr txBox="1"/>
+          <p:nvPr/>
+        </p:nvSpPr>
+        <p:spPr>
+          <a:xfrm>
+            <a:off x="611280" y="630360"/>
+            <a:ext cx="8424360" cy="1034640"/>
+          </a:xfrm>
+          <a:prstGeom prst="rect">
+            <a:avLst/>
+          </a:prstGeom>
+          <a:noFill/>
+          <a:ln>
+            <a:noFill/>
+          </a:ln>
+        </p:spPr>
+        <p:txBody>
+          <a:bodyPr anchor="ctr"/>
+          <a:lstStyle/>
+          <a:p>
+            <a:pPr>
+              <a:lnSpc>
+                <a:spcPct val="100000"/>
+              </a:lnSpc>
+            </a:pPr>
+            <a:r>
+              <a:rPr lang="pl-PL" sz="3600" b="1" strike="noStrike" spc="-1" dirty="0">
+                <a:solidFill>
+                  <a:schemeClr val="tx2"/>
                 </a:solidFill>
                 <a:latin typeface="Trebuchet MS"/>
               </a:rPr>
               <a:t>Pokrycie</a:t>
             </a:r>
-            <a:endParaRPr b="0" lang="pl-PL" sz="3600" spc="-1" strike="noStrike">
-              <a:solidFill>
-                <a:srgbClr val="000000"/>
+            <a:endParaRPr lang="pl-PL" sz="3600" b="0" strike="noStrike" spc="-1" dirty="0">
+              <a:solidFill>
+                <a:schemeClr val="tx2"/>
               </a:solidFill>
               <a:latin typeface="Arial"/>
             </a:endParaRPr>
@@ -4456,12 +5565,12 @@
       </p:sp>
       <p:pic>
         <p:nvPicPr>
-          <p:cNvPr id="98" name="Obraz 10" descr=""/>
+          <p:cNvPr id="98" name="Obraz 10"/>
           <p:cNvPicPr/>
           <p:nvPr/>
         </p:nvPicPr>
         <p:blipFill>
-          <a:blip r:embed="rId1"/>
+          <a:blip r:embed="rId2"/>
           <a:stretch/>
         </p:blipFill>
         <p:spPr>
@@ -4529,6 +5638,7 @@
             <a:avLst/>
             <a:gdLst/>
             <a:ahLst/>
+            <a:cxnLst/>
             <a:rect l="l" t="t" r="r" b="b"/>
             <a:pathLst>
               <a:path w="21600" h="21600">
@@ -4547,7 +5657,7 @@
               <a:schemeClr val="tx1"/>
             </a:solidFill>
             <a:round/>
-            <a:tailEnd len="med" type="triangle" w="med"/>
+            <a:tailEnd type="triangle" w="med" len="med"/>
           </a:ln>
         </p:spPr>
         <p:style>
@@ -4565,12 +5675,12 @@
       </p:sp>
       <p:pic>
         <p:nvPicPr>
-          <p:cNvPr id="101" name="Obraz 4" descr=""/>
+          <p:cNvPr id="101" name="Obraz 4"/>
           <p:cNvPicPr/>
           <p:nvPr/>
         </p:nvPicPr>
         <p:blipFill>
-          <a:blip r:embed="rId2"/>
+          <a:blip r:embed="rId3"/>
           <a:stretch/>
         </p:blipFill>
         <p:spPr>
@@ -4588,25 +5698,28 @@
       </p:pic>
     </p:spTree>
   </p:cSld>
+  <p:clrMapOvr>
+    <a:masterClrMapping/>
+  </p:clrMapOvr>
   <p:transition>
-    <p:randomBar dir="horz"/>
+    <p:randomBar/>
   </p:transition>
   <p:timing>
     <p:tnLst>
       <p:par>
-        <p:cTn id="7" dur="indefinite" restart="never" nodeType="tmRoot">
+        <p:cTn id="1" dur="indefinite" restart="never" nodeType="tmRoot">
           <p:childTnLst>
             <p:seq>
-              <p:cTn id="8" dur="indefinite" nodeType="mainSeq"/>
+              <p:cTn id="2" dur="indefinite" nodeType="mainSeq"/>
               <p:prevCondLst>
-                <p:cond delay="0" evt="onPrev">
+                <p:cond evt="onPrev" delay="0">
                   <p:tgtEl>
                     <p:sldTgt/>
                   </p:tgtEl>
                 </p:cond>
               </p:prevCondLst>
               <p:nextCondLst>
-                <p:cond delay="0" evt="onNext">
+                <p:cond evt="onNext" delay="0">
                   <p:tgtEl>
                     <p:sldTgt/>
                   </p:tgtEl>
@@ -4621,8 +5734,8 @@
 </p:sld>
 </file>
 
-<file path=ppt/slides/slide5.xml><?xml version="1.0" encoding="utf-8"?>
-<p:sld xmlns:a="http://schemas.openxmlformats.org/drawingml/2006/main" xmlns:p="http://schemas.openxmlformats.org/presentationml/2006/main" xmlns:r="http://schemas.openxmlformats.org/officeDocument/2006/relationships" xmlns:p14="http://schemas.microsoft.com/office/powerpoint/2010/main" xmlns:p15="http://schemas.microsoft.com/office/powerpoint/2012/main" xmlns:mc="http://schemas.openxmlformats.org/markup-compatibility/2006">
+<file path=ppt/slides/slide6.xml><?xml version="1.0" encoding="utf-8"?>
+<p:sld xmlns:a="http://schemas.openxmlformats.org/drawingml/2006/main" xmlns:r="http://schemas.openxmlformats.org/officeDocument/2006/relationships" xmlns:p="http://schemas.openxmlformats.org/presentationml/2006/main">
   <p:cSld>
     <p:spTree>
       <p:nvGrpSpPr>
@@ -4659,6 +5772,7 @@
         </p:spPr>
         <p:txBody>
           <a:bodyPr anchor="ctr"/>
+          <a:lstStyle/>
           <a:p>
             <a:pPr>
               <a:lnSpc>
@@ -4666,17 +5780,17 @@
               </a:lnSpc>
             </a:pPr>
             <a:r>
-              <a:rPr b="1" lang="pl-PL" sz="3600" spc="-1" strike="noStrike">
+              <a:rPr lang="pl-PL" sz="3600" b="1" strike="noStrike" spc="-1" dirty="0">
                 <a:solidFill>
-                  <a:srgbClr val="ffffff"/>
+                  <a:schemeClr val="tx2"/>
                 </a:solidFill>
                 <a:latin typeface="Trebuchet MS"/>
               </a:rPr>
               <a:t>Dekompozycja</a:t>
             </a:r>
-            <a:endParaRPr b="0" lang="pl-PL" sz="3600" spc="-1" strike="noStrike">
-              <a:solidFill>
-                <a:srgbClr val="000000"/>
+            <a:endParaRPr lang="pl-PL" sz="3600" b="0" strike="noStrike" spc="-1" dirty="0">
+              <a:solidFill>
+                <a:schemeClr val="tx2"/>
               </a:solidFill>
               <a:latin typeface="Arial"/>
             </a:endParaRPr>
@@ -4685,12 +5799,12 @@
       </p:sp>
       <p:pic>
         <p:nvPicPr>
-          <p:cNvPr id="103" name="Obraz 3" descr=""/>
+          <p:cNvPr id="103" name="Obraz 3"/>
           <p:cNvPicPr/>
           <p:nvPr/>
         </p:nvPicPr>
         <p:blipFill>
-          <a:blip r:embed="rId1"/>
+          <a:blip r:embed="rId2"/>
           <a:stretch/>
         </p:blipFill>
         <p:spPr>
@@ -4708,25 +5822,28 @@
       </p:pic>
     </p:spTree>
   </p:cSld>
+  <p:clrMapOvr>
+    <a:masterClrMapping/>
+  </p:clrMapOvr>
   <p:transition>
-    <p:randomBar dir="horz"/>
+    <p:randomBar/>
   </p:transition>
   <p:timing>
     <p:tnLst>
       <p:par>
-        <p:cTn id="9" dur="indefinite" restart="never" nodeType="tmRoot">
+        <p:cTn id="1" dur="indefinite" restart="never" nodeType="tmRoot">
           <p:childTnLst>
             <p:seq>
-              <p:cTn id="10" dur="indefinite" nodeType="mainSeq"/>
+              <p:cTn id="2" dur="indefinite" nodeType="mainSeq"/>
               <p:prevCondLst>
-                <p:cond delay="0" evt="onPrev">
+                <p:cond evt="onPrev" delay="0">
                   <p:tgtEl>
                     <p:sldTgt/>
                   </p:tgtEl>
                 </p:cond>
               </p:prevCondLst>
               <p:nextCondLst>
-                <p:cond delay="0" evt="onNext">
+                <p:cond evt="onNext" delay="0">
                   <p:tgtEl>
                     <p:sldTgt/>
                   </p:tgtEl>
@@ -4741,8 +5858,8 @@
 </p:sld>
 </file>
 
-<file path=ppt/slides/slide6.xml><?xml version="1.0" encoding="utf-8"?>
-<p:sld xmlns:a="http://schemas.openxmlformats.org/drawingml/2006/main" xmlns:p="http://schemas.openxmlformats.org/presentationml/2006/main" xmlns:r="http://schemas.openxmlformats.org/officeDocument/2006/relationships" xmlns:p14="http://schemas.microsoft.com/office/powerpoint/2010/main" xmlns:p15="http://schemas.microsoft.com/office/powerpoint/2012/main" xmlns:mc="http://schemas.openxmlformats.org/markup-compatibility/2006">
+<file path=ppt/slides/slide7.xml><?xml version="1.0" encoding="utf-8"?>
+<p:sld xmlns:a="http://schemas.openxmlformats.org/drawingml/2006/main" xmlns:r="http://schemas.openxmlformats.org/officeDocument/2006/relationships" xmlns:p="http://schemas.openxmlformats.org/presentationml/2006/main">
   <p:cSld>
     <p:spTree>
       <p:nvGrpSpPr>
@@ -4760,7 +5877,7 @@
       </p:grpSpPr>
       <p:sp>
         <p:nvSpPr>
-          <p:cNvPr id="104" name="TextShape 1"/>
+          <p:cNvPr id="102" name="TextShape 1"/>
           <p:cNvSpPr txBox="1"/>
           <p:nvPr/>
         </p:nvSpPr>
@@ -4779,6 +5896,7 @@
         </p:spPr>
         <p:txBody>
           <a:bodyPr anchor="ctr"/>
+          <a:lstStyle/>
           <a:p>
             <a:pPr>
               <a:lnSpc>
@@ -4786,17 +5904,17 @@
               </a:lnSpc>
             </a:pPr>
             <a:r>
-              <a:rPr b="1" lang="pl-PL" sz="3600" spc="-1" strike="noStrike">
+              <a:rPr lang="pl-PL" sz="3600" b="1" strike="noStrike" spc="-1" dirty="0">
                 <a:solidFill>
-                  <a:srgbClr val="ffffff"/>
+                  <a:schemeClr val="tx2"/>
                 </a:solidFill>
                 <a:latin typeface="Trebuchet MS"/>
               </a:rPr>
-              <a:t>Dane odstające</a:t>
+              <a:t>Dekompozycja</a:t>
             </a:r>
-            <a:endParaRPr b="0" lang="pl-PL" sz="3600" spc="-1" strike="noStrike">
-              <a:solidFill>
-                <a:srgbClr val="000000"/>
+            <a:endParaRPr lang="pl-PL" sz="3600" b="0" strike="noStrike" spc="-1" dirty="0">
+              <a:solidFill>
+                <a:schemeClr val="tx2"/>
               </a:solidFill>
               <a:latin typeface="Arial"/>
             </a:endParaRPr>
@@ -4805,48 +5923,97 @@
       </p:sp>
       <p:pic>
         <p:nvPicPr>
-          <p:cNvPr id="105" name="Obraz 3" descr=""/>
-          <p:cNvPicPr/>
+          <p:cNvPr id="2050" name="Picture 2"/>
+          <p:cNvPicPr>
+            <a:picLocks noChangeAspect="1" noChangeArrowheads="1"/>
+          </p:cNvPicPr>
           <p:nvPr/>
         </p:nvPicPr>
         <p:blipFill>
-          <a:blip r:embed="rId1"/>
-          <a:stretch/>
+          <a:blip r:embed="rId2">
+            <a:extLst>
+              <a:ext uri="{28A0092B-C50C-407E-A947-70E740481C1C}">
+                <a14:useLocalDpi xmlns:a14="http://schemas.microsoft.com/office/drawing/2010/main" val="0"/>
+              </a:ext>
+            </a:extLst>
+          </a:blip>
+          <a:srcRect/>
+          <a:stretch>
+            <a:fillRect/>
+          </a:stretch>
         </p:blipFill>
-        <p:spPr>
-          <a:xfrm>
-            <a:off x="495360" y="1779840"/>
-            <a:ext cx="8648280" cy="4416840"/>
-          </a:xfrm>
-          <a:prstGeom prst="rect">
-            <a:avLst/>
-          </a:prstGeom>
+        <p:spPr bwMode="auto">
+          <a:xfrm>
+            <a:off x="524226" y="1844824"/>
+            <a:ext cx="8551531" cy="3816424"/>
+          </a:xfrm>
+          <a:prstGeom prst="rect">
+            <a:avLst/>
+          </a:prstGeom>
+          <a:noFill/>
           <a:ln>
             <a:noFill/>
           </a:ln>
+          <a:effectLst/>
+          <a:extLst>
+            <a:ext uri="{909E8E84-426E-40DD-AFC4-6F175D3DCCD1}">
+              <a14:hiddenFill xmlns:a14="http://schemas.microsoft.com/office/drawing/2010/main">
+                <a:solidFill>
+                  <a:schemeClr val="accent1"/>
+                </a:solidFill>
+              </a14:hiddenFill>
+            </a:ext>
+            <a:ext uri="{91240B29-F687-4F45-9708-019B960494DF}">
+              <a14:hiddenLine xmlns:a14="http://schemas.microsoft.com/office/drawing/2010/main" w="9525">
+                <a:solidFill>
+                  <a:schemeClr val="tx1"/>
+                </a:solidFill>
+                <a:miter lim="800000"/>
+                <a:headEnd/>
+                <a:tailEnd/>
+              </a14:hiddenLine>
+            </a:ext>
+            <a:ext uri="{AF507438-7753-43E0-B8FC-AC1667EBCBE1}">
+              <a14:hiddenEffects xmlns:a14="http://schemas.microsoft.com/office/drawing/2010/main">
+                <a:effectLst>
+                  <a:outerShdw dist="35921" dir="2700000" algn="ctr" rotWithShape="0">
+                    <a:schemeClr val="bg2"/>
+                  </a:outerShdw>
+                </a:effectLst>
+              </a14:hiddenEffects>
+            </a:ext>
+          </a:extLst>
         </p:spPr>
       </p:pic>
     </p:spTree>
+    <p:extLst>
+      <p:ext uri="{BB962C8B-B14F-4D97-AF65-F5344CB8AC3E}">
+        <p14:creationId xmlns:p14="http://schemas.microsoft.com/office/powerpoint/2010/main" val="210594886"/>
+      </p:ext>
+    </p:extLst>
   </p:cSld>
+  <p:clrMapOvr>
+    <a:masterClrMapping/>
+  </p:clrMapOvr>
   <p:transition>
-    <p:randomBar dir="horz"/>
+    <p:randomBar/>
   </p:transition>
   <p:timing>
     <p:tnLst>
       <p:par>
-        <p:cTn id="11" dur="indefinite" restart="never" nodeType="tmRoot">
+        <p:cTn id="1" dur="indefinite" restart="never" nodeType="tmRoot">
           <p:childTnLst>
             <p:seq>
-              <p:cTn id="12" dur="indefinite" nodeType="mainSeq"/>
+              <p:cTn id="2" dur="indefinite" nodeType="mainSeq"/>
               <p:prevCondLst>
-                <p:cond delay="0" evt="onPrev">
+                <p:cond evt="onPrev" delay="0">
                   <p:tgtEl>
                     <p:sldTgt/>
                   </p:tgtEl>
                 </p:cond>
               </p:prevCondLst>
               <p:nextCondLst>
-                <p:cond delay="0" evt="onNext">
+                <p:cond evt="onNext" delay="0">
                   <p:tgtEl>
                     <p:sldTgt/>
                   </p:tgtEl>
@@ -4861,8 +6028,8 @@
 </p:sld>
 </file>
 
-<file path=ppt/slides/slide7.xml><?xml version="1.0" encoding="utf-8"?>
-<p:sld xmlns:a="http://schemas.openxmlformats.org/drawingml/2006/main" xmlns:p="http://schemas.openxmlformats.org/presentationml/2006/main" xmlns:r="http://schemas.openxmlformats.org/officeDocument/2006/relationships" xmlns:p14="http://schemas.microsoft.com/office/powerpoint/2010/main" xmlns:p15="http://schemas.microsoft.com/office/powerpoint/2012/main" xmlns:mc="http://schemas.openxmlformats.org/markup-compatibility/2006">
+<file path=ppt/slides/slide8.xml><?xml version="1.0" encoding="utf-8"?>
+<p:sld xmlns:a="http://schemas.openxmlformats.org/drawingml/2006/main" xmlns:r="http://schemas.openxmlformats.org/officeDocument/2006/relationships" xmlns:p="http://schemas.openxmlformats.org/presentationml/2006/main">
   <p:cSld>
     <p:spTree>
       <p:nvGrpSpPr>
@@ -4880,7 +6047,7 @@
       </p:grpSpPr>
       <p:sp>
         <p:nvSpPr>
-          <p:cNvPr id="106" name="TextShape 1"/>
+          <p:cNvPr id="104" name="TextShape 1"/>
           <p:cNvSpPr txBox="1"/>
           <p:nvPr/>
         </p:nvSpPr>
@@ -4899,6 +6066,7 @@
         </p:spPr>
         <p:txBody>
           <a:bodyPr anchor="ctr"/>
+          <a:lstStyle/>
           <a:p>
             <a:pPr>
               <a:lnSpc>
@@ -4906,17 +6074,17 @@
               </a:lnSpc>
             </a:pPr>
             <a:r>
-              <a:rPr b="1" lang="pl-PL" sz="3600" spc="-1" strike="noStrike">
+              <a:rPr lang="pl-PL" sz="3600" b="1" strike="noStrike" spc="-1" dirty="0">
                 <a:solidFill>
-                  <a:srgbClr val="ffffff"/>
+                  <a:schemeClr val="tx2"/>
                 </a:solidFill>
                 <a:latin typeface="Trebuchet MS"/>
               </a:rPr>
-              <a:t>Analiza porównawcza</a:t>
+              <a:t>Dane odstające</a:t>
             </a:r>
-            <a:endParaRPr b="0" lang="pl-PL" sz="3600" spc="-1" strike="noStrike">
-              <a:solidFill>
-                <a:srgbClr val="000000"/>
+            <a:endParaRPr lang="pl-PL" sz="3600" b="0" strike="noStrike" spc="-1" dirty="0">
+              <a:solidFill>
+                <a:schemeClr val="tx2"/>
               </a:solidFill>
               <a:latin typeface="Arial"/>
             </a:endParaRPr>
@@ -4925,18 +6093,18 @@
       </p:sp>
       <p:pic>
         <p:nvPicPr>
-          <p:cNvPr id="107" name="Obraz 4" descr=""/>
+          <p:cNvPr id="105" name="Obraz 3"/>
           <p:cNvPicPr/>
           <p:nvPr/>
         </p:nvPicPr>
         <p:blipFill>
-          <a:blip r:embed="rId1"/>
+          <a:blip r:embed="rId2"/>
           <a:stretch/>
         </p:blipFill>
         <p:spPr>
           <a:xfrm>
-            <a:off x="510480" y="1787760"/>
-            <a:ext cx="7017840" cy="5015880"/>
+            <a:off x="495360" y="1779840"/>
+            <a:ext cx="8648280" cy="4416840"/>
           </a:xfrm>
           <a:prstGeom prst="rect">
             <a:avLst/>
@@ -4948,25 +6116,28 @@
       </p:pic>
     </p:spTree>
   </p:cSld>
+  <p:clrMapOvr>
+    <a:masterClrMapping/>
+  </p:clrMapOvr>
   <p:transition>
-    <p:randomBar dir="horz"/>
+    <p:randomBar/>
   </p:transition>
   <p:timing>
     <p:tnLst>
       <p:par>
-        <p:cTn id="13" dur="indefinite" restart="never" nodeType="tmRoot">
+        <p:cTn id="1" dur="indefinite" restart="never" nodeType="tmRoot">
           <p:childTnLst>
             <p:seq>
-              <p:cTn id="14" dur="indefinite" nodeType="mainSeq"/>
+              <p:cTn id="2" dur="indefinite" nodeType="mainSeq"/>
               <p:prevCondLst>
-                <p:cond delay="0" evt="onPrev">
+                <p:cond evt="onPrev" delay="0">
                   <p:tgtEl>
                     <p:sldTgt/>
                   </p:tgtEl>
                 </p:cond>
               </p:prevCondLst>
               <p:nextCondLst>
-                <p:cond delay="0" evt="onNext">
+                <p:cond evt="onNext" delay="0">
                   <p:tgtEl>
                     <p:sldTgt/>
                   </p:tgtEl>
@@ -4981,8 +6152,8 @@
 </p:sld>
 </file>
 
-<file path=ppt/slides/slide8.xml><?xml version="1.0" encoding="utf-8"?>
-<p:sld xmlns:a="http://schemas.openxmlformats.org/drawingml/2006/main" xmlns:p="http://schemas.openxmlformats.org/presentationml/2006/main" xmlns:r="http://schemas.openxmlformats.org/officeDocument/2006/relationships" xmlns:p14="http://schemas.microsoft.com/office/powerpoint/2010/main" xmlns:p15="http://schemas.microsoft.com/office/powerpoint/2012/main" xmlns:mc="http://schemas.openxmlformats.org/markup-compatibility/2006">
+<file path=ppt/slides/slide9.xml><?xml version="1.0" encoding="utf-8"?>
+<p:sld xmlns:a="http://schemas.openxmlformats.org/drawingml/2006/main" xmlns:r="http://schemas.openxmlformats.org/officeDocument/2006/relationships" xmlns:p="http://schemas.openxmlformats.org/presentationml/2006/main">
   <p:cSld>
     <p:spTree>
       <p:nvGrpSpPr>
@@ -4998,32 +6169,9 @@
           <a:chExt cx="0" cy="0"/>
         </a:xfrm>
       </p:grpSpPr>
-      <p:pic>
-        <p:nvPicPr>
-          <p:cNvPr id="108" name="" descr=""/>
-          <p:cNvPicPr/>
-          <p:nvPr/>
-        </p:nvPicPr>
-        <p:blipFill>
-          <a:blip r:embed="rId1"/>
-          <a:stretch/>
-        </p:blipFill>
-        <p:spPr>
-          <a:xfrm>
-            <a:off x="5852160" y="5346720"/>
-            <a:ext cx="2687040" cy="1511280"/>
-          </a:xfrm>
-          <a:prstGeom prst="rect">
-            <a:avLst/>
-          </a:prstGeom>
-          <a:ln>
-            <a:noFill/>
-          </a:ln>
-        </p:spPr>
-      </p:pic>
-      <p:sp>
-        <p:nvSpPr>
-          <p:cNvPr id="109" name="TextShape 1"/>
+      <p:sp>
+        <p:nvSpPr>
+          <p:cNvPr id="104" name="TextShape 1"/>
           <p:cNvSpPr txBox="1"/>
           <p:nvPr/>
         </p:nvSpPr>
@@ -5042,6 +6190,7 @@
         </p:spPr>
         <p:txBody>
           <a:bodyPr anchor="ctr"/>
+          <a:lstStyle/>
           <a:p>
             <a:pPr>
               <a:lnSpc>
@@ -5049,17 +6198,17 @@
               </a:lnSpc>
             </a:pPr>
             <a:r>
-              <a:rPr b="1" lang="pl-PL" sz="3600" spc="-1" strike="noStrike">
+              <a:rPr lang="pl-PL" sz="3600" b="1" strike="noStrike" spc="-1" dirty="0">
                 <a:solidFill>
-                  <a:srgbClr val="ffffff"/>
+                  <a:schemeClr val="tx2"/>
                 </a:solidFill>
                 <a:latin typeface="Trebuchet MS"/>
               </a:rPr>
-              <a:t>Stos technologiczny</a:t>
+              <a:t>Dane odstające</a:t>
             </a:r>
-            <a:endParaRPr b="0" lang="pl-PL" sz="3600" spc="-1" strike="noStrike">
-              <a:solidFill>
-                <a:srgbClr val="000000"/>
+            <a:endParaRPr lang="pl-PL" sz="3600" b="0" strike="noStrike" spc="-1" dirty="0">
+              <a:solidFill>
+                <a:schemeClr val="tx2"/>
               </a:solidFill>
               <a:latin typeface="Arial"/>
             </a:endParaRPr>
@@ -5068,237 +6217,97 @@
       </p:sp>
       <p:pic>
         <p:nvPicPr>
-          <p:cNvPr id="110" name="" descr=""/>
-          <p:cNvPicPr/>
+          <p:cNvPr id="3074" name="Picture 2"/>
+          <p:cNvPicPr>
+            <a:picLocks noChangeAspect="1" noChangeArrowheads="1"/>
+          </p:cNvPicPr>
           <p:nvPr/>
         </p:nvPicPr>
         <p:blipFill>
-          <a:blip r:embed="rId2"/>
-          <a:stretch/>
+          <a:blip r:embed="rId2">
+            <a:extLst>
+              <a:ext uri="{28A0092B-C50C-407E-A947-70E740481C1C}">
+                <a14:useLocalDpi xmlns:a14="http://schemas.microsoft.com/office/drawing/2010/main" val="0"/>
+              </a:ext>
+            </a:extLst>
+          </a:blip>
+          <a:srcRect/>
+          <a:stretch>
+            <a:fillRect/>
+          </a:stretch>
         </p:blipFill>
-        <p:spPr>
-          <a:xfrm>
-            <a:off x="182880" y="1815840"/>
-            <a:ext cx="2926080" cy="2926080"/>
-          </a:xfrm>
-          <a:prstGeom prst="rect">
-            <a:avLst/>
-          </a:prstGeom>
+        <p:spPr bwMode="auto">
+          <a:xfrm>
+            <a:off x="575209" y="1820522"/>
+            <a:ext cx="8460431" cy="2849971"/>
+          </a:xfrm>
+          <a:prstGeom prst="rect">
+            <a:avLst/>
+          </a:prstGeom>
+          <a:noFill/>
           <a:ln>
             <a:noFill/>
           </a:ln>
-        </p:spPr>
-      </p:pic>
-      <p:pic>
-        <p:nvPicPr>
-          <p:cNvPr id="111" name="" descr=""/>
-          <p:cNvPicPr/>
-          <p:nvPr/>
-        </p:nvPicPr>
-        <p:blipFill>
-          <a:blip r:embed="rId3"/>
-          <a:stretch/>
-        </p:blipFill>
-        <p:spPr>
-          <a:xfrm>
-            <a:off x="3017880" y="5443200"/>
-            <a:ext cx="2247480" cy="1400760"/>
-          </a:xfrm>
-          <a:prstGeom prst="rect">
-            <a:avLst/>
-          </a:prstGeom>
-          <a:ln>
-            <a:noFill/>
-          </a:ln>
-        </p:spPr>
-      </p:pic>
-      <p:pic>
-        <p:nvPicPr>
-          <p:cNvPr id="112" name="" descr=""/>
-          <p:cNvPicPr/>
-          <p:nvPr/>
-        </p:nvPicPr>
-        <p:blipFill>
-          <a:blip r:embed="rId4"/>
-          <a:stretch/>
-        </p:blipFill>
-        <p:spPr>
-          <a:xfrm>
-            <a:off x="548640" y="5537880"/>
-            <a:ext cx="2194560" cy="1228680"/>
-          </a:xfrm>
-          <a:prstGeom prst="rect">
-            <a:avLst/>
-          </a:prstGeom>
-          <a:ln>
-            <a:noFill/>
-          </a:ln>
-        </p:spPr>
-      </p:pic>
-      <p:pic>
-        <p:nvPicPr>
-          <p:cNvPr id="113" name="" descr=""/>
-          <p:cNvPicPr/>
-          <p:nvPr/>
-        </p:nvPicPr>
-        <p:blipFill>
-          <a:blip r:embed="rId5"/>
-          <a:stretch/>
-        </p:blipFill>
-        <p:spPr>
-          <a:xfrm>
-            <a:off x="2926080" y="1972080"/>
-            <a:ext cx="2468880" cy="2468880"/>
-          </a:xfrm>
-          <a:prstGeom prst="rect">
-            <a:avLst/>
-          </a:prstGeom>
-          <a:ln>
-            <a:noFill/>
-          </a:ln>
-        </p:spPr>
-      </p:pic>
-      <p:pic>
-        <p:nvPicPr>
-          <p:cNvPr id="114" name="" descr=""/>
-          <p:cNvPicPr/>
-          <p:nvPr/>
-        </p:nvPicPr>
-        <p:blipFill>
-          <a:blip r:embed="rId6"/>
-          <a:stretch/>
-        </p:blipFill>
-        <p:spPr>
-          <a:xfrm>
-            <a:off x="5311080" y="2021760"/>
-            <a:ext cx="3953520" cy="2650680"/>
-          </a:xfrm>
-          <a:prstGeom prst="rect">
-            <a:avLst/>
-          </a:prstGeom>
-          <a:ln>
-            <a:noFill/>
-          </a:ln>
+          <a:effectLst/>
+          <a:extLst>
+            <a:ext uri="{909E8E84-426E-40DD-AFC4-6F175D3DCCD1}">
+              <a14:hiddenFill xmlns:a14="http://schemas.microsoft.com/office/drawing/2010/main">
+                <a:solidFill>
+                  <a:schemeClr val="accent1"/>
+                </a:solidFill>
+              </a14:hiddenFill>
+            </a:ext>
+            <a:ext uri="{91240B29-F687-4F45-9708-019B960494DF}">
+              <a14:hiddenLine xmlns:a14="http://schemas.microsoft.com/office/drawing/2010/main" w="9525">
+                <a:solidFill>
+                  <a:schemeClr val="tx1"/>
+                </a:solidFill>
+                <a:miter lim="800000"/>
+                <a:headEnd/>
+                <a:tailEnd/>
+              </a14:hiddenLine>
+            </a:ext>
+            <a:ext uri="{AF507438-7753-43E0-B8FC-AC1667EBCBE1}">
+              <a14:hiddenEffects xmlns:a14="http://schemas.microsoft.com/office/drawing/2010/main">
+                <a:effectLst>
+                  <a:outerShdw dist="35921" dir="2700000" algn="ctr" rotWithShape="0">
+                    <a:schemeClr val="bg2"/>
+                  </a:outerShdw>
+                </a:effectLst>
+              </a14:hiddenEffects>
+            </a:ext>
+          </a:extLst>
         </p:spPr>
       </p:pic>
     </p:spTree>
+    <p:extLst>
+      <p:ext uri="{BB962C8B-B14F-4D97-AF65-F5344CB8AC3E}">
+        <p14:creationId xmlns:p14="http://schemas.microsoft.com/office/powerpoint/2010/main" val="144094920"/>
+      </p:ext>
+    </p:extLst>
   </p:cSld>
+  <p:clrMapOvr>
+    <a:masterClrMapping/>
+  </p:clrMapOvr>
   <p:transition>
-    <p:randomBar dir="horz"/>
+    <p:randomBar/>
   </p:transition>
   <p:timing>
     <p:tnLst>
       <p:par>
-        <p:cTn id="15" dur="indefinite" restart="never" nodeType="tmRoot">
+        <p:cTn id="1" dur="indefinite" restart="never" nodeType="tmRoot">
           <p:childTnLst>
             <p:seq>
-              <p:cTn id="16" dur="indefinite" nodeType="mainSeq"/>
+              <p:cTn id="2" dur="indefinite" nodeType="mainSeq"/>
               <p:prevCondLst>
-                <p:cond delay="0" evt="onPrev">
+                <p:cond evt="onPrev" delay="0">
                   <p:tgtEl>
                     <p:sldTgt/>
                   </p:tgtEl>
                 </p:cond>
               </p:prevCondLst>
               <p:nextCondLst>
-                <p:cond delay="0" evt="onNext">
-                  <p:tgtEl>
-                    <p:sldTgt/>
-                  </p:tgtEl>
-                </p:cond>
-              </p:nextCondLst>
-            </p:seq>
-          </p:childTnLst>
-        </p:cTn>
-      </p:par>
-    </p:tnLst>
-  </p:timing>
-</p:sld>
-</file>
-
-<file path=ppt/slides/slide9.xml><?xml version="1.0" encoding="utf-8"?>
-<p:sld xmlns:a="http://schemas.openxmlformats.org/drawingml/2006/main" xmlns:p="http://schemas.openxmlformats.org/presentationml/2006/main" xmlns:r="http://schemas.openxmlformats.org/officeDocument/2006/relationships" xmlns:p14="http://schemas.microsoft.com/office/powerpoint/2010/main" xmlns:p15="http://schemas.microsoft.com/office/powerpoint/2012/main" xmlns:mc="http://schemas.openxmlformats.org/markup-compatibility/2006">
-  <p:cSld>
-    <p:spTree>
-      <p:nvGrpSpPr>
-        <p:cNvPr id="1" name=""/>
-        <p:cNvGrpSpPr/>
-        <p:nvPr/>
-      </p:nvGrpSpPr>
-      <p:grpSpPr>
-        <a:xfrm>
-          <a:off x="0" y="0"/>
-          <a:ext cx="0" cy="0"/>
-          <a:chOff x="0" y="0"/>
-          <a:chExt cx="0" cy="0"/>
-        </a:xfrm>
-      </p:grpSpPr>
-      <p:sp>
-        <p:nvSpPr>
-          <p:cNvPr id="115" name="TextShape 1"/>
-          <p:cNvSpPr txBox="1"/>
-          <p:nvPr/>
-        </p:nvSpPr>
-        <p:spPr>
-          <a:xfrm>
-            <a:off x="1873080" y="2130480"/>
-            <a:ext cx="7089480" cy="2018880"/>
-          </a:xfrm>
-          <a:prstGeom prst="rect">
-            <a:avLst/>
-          </a:prstGeom>
-          <a:noFill/>
-          <a:ln>
-            <a:noFill/>
-          </a:ln>
-        </p:spPr>
-        <p:txBody>
-          <a:bodyPr anchor="ctr"/>
-          <a:p>
-            <a:pPr algn="ctr">
-              <a:lnSpc>
-                <a:spcPct val="100000"/>
-              </a:lnSpc>
-            </a:pPr>
-            <a:r>
-              <a:rPr b="1" lang="pl-PL" sz="3600" spc="-1" strike="noStrike">
-                <a:solidFill>
-                  <a:srgbClr val="ffffff"/>
-                </a:solidFill>
-                <a:latin typeface="Trebuchet MS"/>
-              </a:rPr>
-              <a:t>Dziękujemy za uwagę!</a:t>
-            </a:r>
-            <a:endParaRPr b="0" lang="pl-PL" sz="3600" spc="-1" strike="noStrike">
-              <a:solidFill>
-                <a:srgbClr val="000000"/>
-              </a:solidFill>
-              <a:latin typeface="Arial"/>
-            </a:endParaRPr>
-          </a:p>
-        </p:txBody>
-      </p:sp>
-    </p:spTree>
-  </p:cSld>
-  <p:transition>
-    <p:randomBar dir="horz"/>
-  </p:transition>
-  <p:timing>
-    <p:tnLst>
-      <p:par>
-        <p:cTn id="17" dur="indefinite" restart="never" nodeType="tmRoot">
-          <p:childTnLst>
-            <p:seq>
-              <p:cTn id="18" dur="indefinite" nodeType="mainSeq"/>
-              <p:prevCondLst>
-                <p:cond delay="0" evt="onPrev">
-                  <p:tgtEl>
-                    <p:sldTgt/>
-                  </p:tgtEl>
-                </p:cond>
-              </p:prevCondLst>
-              <p:nextCondLst>
-                <p:cond delay="0" evt="onNext">
+                <p:cond evt="onNext" delay="0">
                   <p:tgtEl>
                     <p:sldTgt/>
                   </p:tgtEl>
@@ -5324,34 +6333,34 @@
         <a:sysClr val="window" lastClr="FFFFFF"/>
       </a:lt1>
       <a:dk2>
-        <a:srgbClr val="ffffff"/>
+        <a:srgbClr val="FFFFFF"/>
       </a:dk2>
       <a:lt2>
-        <a:srgbClr val="0c295b"/>
+        <a:srgbClr val="0C295B"/>
       </a:lt2>
       <a:accent1>
-        <a:srgbClr val="e32213"/>
+        <a:srgbClr val="E32213"/>
       </a:accent1>
       <a:accent2>
-        <a:srgbClr val="ffd3a1"/>
+        <a:srgbClr val="FFD3A1"/>
       </a:accent2>
       <a:accent3>
-        <a:srgbClr val="ffffff"/>
+        <a:srgbClr val="FFFFFF"/>
       </a:accent3>
       <a:accent4>
         <a:srgbClr val="000000"/>
       </a:accent4>
       <a:accent5>
-        <a:srgbClr val="efabaa"/>
+        <a:srgbClr val="EFABAA"/>
       </a:accent5>
       <a:accent6>
-        <a:srgbClr val="e7bf91"/>
+        <a:srgbClr val="E7BF91"/>
       </a:accent6>
       <a:hlink>
-        <a:srgbClr val="ffd9af"/>
+        <a:srgbClr val="FFD9AF"/>
       </a:hlink>
       <a:folHlink>
-        <a:srgbClr val="ffb25d"/>
+        <a:srgbClr val="FFB25D"/>
       </a:folHlink>
     </a:clrScheme>
     <a:fontScheme name="Office">
@@ -5533,6 +6542,8 @@
       </a:bgFillStyleLst>
     </a:fmtScheme>
   </a:themeElements>
+  <a:objectDefaults/>
+  <a:extraClrSchemeLst/>
 </a:theme>
 </file>
 
@@ -5547,31 +6558,31 @@
         <a:sysClr val="window" lastClr="FFFFFF"/>
       </a:lt1>
       <a:dk2>
-        <a:srgbClr val="1f497d"/>
+        <a:srgbClr val="1F497D"/>
       </a:dk2>
       <a:lt2>
-        <a:srgbClr val="eeece1"/>
+        <a:srgbClr val="EEECE1"/>
       </a:lt2>
       <a:accent1>
-        <a:srgbClr val="4f81bd"/>
+        <a:srgbClr val="4F81BD"/>
       </a:accent1>
       <a:accent2>
-        <a:srgbClr val="c0504d"/>
+        <a:srgbClr val="C0504D"/>
       </a:accent2>
       <a:accent3>
-        <a:srgbClr val="9bbb59"/>
+        <a:srgbClr val="9BBB59"/>
       </a:accent3>
       <a:accent4>
-        <a:srgbClr val="8064a2"/>
+        <a:srgbClr val="8064A2"/>
       </a:accent4>
       <a:accent5>
-        <a:srgbClr val="4bacc6"/>
+        <a:srgbClr val="4BACC6"/>
       </a:accent5>
       <a:accent6>
-        <a:srgbClr val="f79646"/>
+        <a:srgbClr val="F79646"/>
       </a:accent6>
       <a:hlink>
-        <a:srgbClr val="0000ff"/>
+        <a:srgbClr val="0000FF"/>
       </a:hlink>
       <a:folHlink>
         <a:srgbClr val="800080"/>
@@ -5756,5 +6767,7 @@
       </a:bgFillStyleLst>
     </a:fmtScheme>
   </a:themeElements>
+  <a:objectDefaults/>
+  <a:extraClrSchemeLst/>
 </a:theme>
 </file>
</xml_diff>